<commit_message>
Added solutions and updated slides
</commit_message>
<xml_diff>
--- a/documentation/LinearAlgebra_Tutorial.pptx
+++ b/documentation/LinearAlgebra_Tutorial.pptx
@@ -5,7 +5,7 @@
     <p:sldMasterId id="2147483660" r:id="rId1"/>
   </p:sldMasterIdLst>
   <p:notesMasterIdLst>
-    <p:notesMasterId r:id="rId36"/>
+    <p:notesMasterId r:id="rId37"/>
   </p:notesMasterIdLst>
   <p:sldIdLst>
     <p:sldId id="256" r:id="rId2"/>
@@ -14,34 +14,35 @@
     <p:sldId id="261" r:id="rId5"/>
     <p:sldId id="263" r:id="rId6"/>
     <p:sldId id="262" r:id="rId7"/>
-    <p:sldId id="264" r:id="rId8"/>
-    <p:sldId id="280" r:id="rId9"/>
-    <p:sldId id="273" r:id="rId10"/>
-    <p:sldId id="284" r:id="rId11"/>
-    <p:sldId id="286" r:id="rId12"/>
-    <p:sldId id="285" r:id="rId13"/>
-    <p:sldId id="274" r:id="rId14"/>
-    <p:sldId id="287" r:id="rId15"/>
-    <p:sldId id="283" r:id="rId16"/>
-    <p:sldId id="282" r:id="rId17"/>
-    <p:sldId id="289" r:id="rId18"/>
-    <p:sldId id="291" r:id="rId19"/>
-    <p:sldId id="276" r:id="rId20"/>
-    <p:sldId id="290" r:id="rId21"/>
-    <p:sldId id="288" r:id="rId22"/>
-    <p:sldId id="279" r:id="rId23"/>
-    <p:sldId id="265" r:id="rId24"/>
-    <p:sldId id="266" r:id="rId25"/>
-    <p:sldId id="292" r:id="rId26"/>
-    <p:sldId id="267" r:id="rId27"/>
-    <p:sldId id="270" r:id="rId28"/>
-    <p:sldId id="293" r:id="rId29"/>
-    <p:sldId id="271" r:id="rId30"/>
-    <p:sldId id="272" r:id="rId31"/>
-    <p:sldId id="294" r:id="rId32"/>
-    <p:sldId id="296" r:id="rId33"/>
-    <p:sldId id="295" r:id="rId34"/>
-    <p:sldId id="258" r:id="rId35"/>
+    <p:sldId id="297" r:id="rId8"/>
+    <p:sldId id="264" r:id="rId9"/>
+    <p:sldId id="280" r:id="rId10"/>
+    <p:sldId id="273" r:id="rId11"/>
+    <p:sldId id="284" r:id="rId12"/>
+    <p:sldId id="286" r:id="rId13"/>
+    <p:sldId id="285" r:id="rId14"/>
+    <p:sldId id="274" r:id="rId15"/>
+    <p:sldId id="287" r:id="rId16"/>
+    <p:sldId id="283" r:id="rId17"/>
+    <p:sldId id="282" r:id="rId18"/>
+    <p:sldId id="289" r:id="rId19"/>
+    <p:sldId id="291" r:id="rId20"/>
+    <p:sldId id="276" r:id="rId21"/>
+    <p:sldId id="290" r:id="rId22"/>
+    <p:sldId id="288" r:id="rId23"/>
+    <p:sldId id="279" r:id="rId24"/>
+    <p:sldId id="265" r:id="rId25"/>
+    <p:sldId id="266" r:id="rId26"/>
+    <p:sldId id="292" r:id="rId27"/>
+    <p:sldId id="267" r:id="rId28"/>
+    <p:sldId id="270" r:id="rId29"/>
+    <p:sldId id="293" r:id="rId30"/>
+    <p:sldId id="271" r:id="rId31"/>
+    <p:sldId id="272" r:id="rId32"/>
+    <p:sldId id="294" r:id="rId33"/>
+    <p:sldId id="296" r:id="rId34"/>
+    <p:sldId id="295" r:id="rId35"/>
+    <p:sldId id="258" r:id="rId36"/>
   </p:sldIdLst>
   <p:sldSz cx="9144000" cy="6858000" type="screen4x3"/>
   <p:notesSz cx="6858000" cy="9144000"/>
@@ -230,7 +231,7 @@
           <a:p>
             <a:fld id="{28AA768E-F8E0-43A4-9DAB-67199E11C532}" type="datetimeFigureOut">
               <a:rPr lang="en-CA" smtClean="0"/>
-              <a:t>2019-10-04</a:t>
+              <a:t>2019-10-05</a:t>
             </a:fld>
             <a:endParaRPr lang="en-CA"/>
           </a:p>
@@ -656,7 +657,7 @@
     </p:spTree>
     <p:extLst>
       <p:ext uri="{BB962C8B-B14F-4D97-AF65-F5344CB8AC3E}">
-        <p14:creationId xmlns:p14="http://schemas.microsoft.com/office/powerpoint/2010/main" val="2376892702"/>
+        <p14:creationId xmlns:p14="http://schemas.microsoft.com/office/powerpoint/2010/main" val="1429659606"/>
       </p:ext>
     </p:extLst>
   </p:cSld>
@@ -731,7 +732,7 @@
           <a:p>
             <a:fld id="{18C1416E-D494-44F3-B292-A904148FC6F9}" type="slidenum">
               <a:rPr lang="en-CA" smtClean="0"/>
-              <a:t>14</a:t>
+              <a:t>8</a:t>
             </a:fld>
             <a:endParaRPr lang="en-CA"/>
           </a:p>
@@ -740,7 +741,7 @@
     </p:spTree>
     <p:extLst>
       <p:ext uri="{BB962C8B-B14F-4D97-AF65-F5344CB8AC3E}">
-        <p14:creationId xmlns:p14="http://schemas.microsoft.com/office/powerpoint/2010/main" val="1959286593"/>
+        <p14:creationId xmlns:p14="http://schemas.microsoft.com/office/powerpoint/2010/main" val="2376892702"/>
       </p:ext>
     </p:extLst>
   </p:cSld>
@@ -815,7 +816,91 @@
           <a:p>
             <a:fld id="{18C1416E-D494-44F3-B292-A904148FC6F9}" type="slidenum">
               <a:rPr lang="en-CA" smtClean="0"/>
-              <a:t>32</a:t>
+              <a:t>15</a:t>
+            </a:fld>
+            <a:endParaRPr lang="en-CA"/>
+          </a:p>
+        </p:txBody>
+      </p:sp>
+    </p:spTree>
+    <p:extLst>
+      <p:ext uri="{BB962C8B-B14F-4D97-AF65-F5344CB8AC3E}">
+        <p14:creationId xmlns:p14="http://schemas.microsoft.com/office/powerpoint/2010/main" val="1959286593"/>
+      </p:ext>
+    </p:extLst>
+  </p:cSld>
+  <p:clrMapOvr>
+    <a:masterClrMapping/>
+  </p:clrMapOvr>
+</p:notes>
+</file>
+
+<file path=ppt/notesSlides/notesSlide5.xml><?xml version="1.0" encoding="utf-8"?>
+<p:notes xmlns:a="http://schemas.openxmlformats.org/drawingml/2006/main" xmlns:r="http://schemas.openxmlformats.org/officeDocument/2006/relationships" xmlns:p="http://schemas.openxmlformats.org/presentationml/2006/main">
+  <p:cSld>
+    <p:spTree>
+      <p:nvGrpSpPr>
+        <p:cNvPr id="1" name=""/>
+        <p:cNvGrpSpPr/>
+        <p:nvPr/>
+      </p:nvGrpSpPr>
+      <p:grpSpPr>
+        <a:xfrm>
+          <a:off x="0" y="0"/>
+          <a:ext cx="0" cy="0"/>
+          <a:chOff x="0" y="0"/>
+          <a:chExt cx="0" cy="0"/>
+        </a:xfrm>
+      </p:grpSpPr>
+      <p:sp>
+        <p:nvSpPr>
+          <p:cNvPr id="2" name="Slide Image Placeholder 1"/>
+          <p:cNvSpPr>
+            <a:spLocks noGrp="1" noRot="1" noChangeAspect="1"/>
+          </p:cNvSpPr>
+          <p:nvPr>
+            <p:ph type="sldImg"/>
+          </p:nvPr>
+        </p:nvSpPr>
+        <p:spPr/>
+      </p:sp>
+      <p:sp>
+        <p:nvSpPr>
+          <p:cNvPr id="3" name="Notes Placeholder 2"/>
+          <p:cNvSpPr>
+            <a:spLocks noGrp="1"/>
+          </p:cNvSpPr>
+          <p:nvPr>
+            <p:ph type="body" idx="1"/>
+          </p:nvPr>
+        </p:nvSpPr>
+        <p:spPr/>
+        <p:txBody>
+          <a:bodyPr/>
+          <a:lstStyle/>
+          <a:p>
+            <a:endParaRPr lang="en-CA" dirty="0"/>
+          </a:p>
+        </p:txBody>
+      </p:sp>
+      <p:sp>
+        <p:nvSpPr>
+          <p:cNvPr id="4" name="Slide Number Placeholder 3"/>
+          <p:cNvSpPr>
+            <a:spLocks noGrp="1"/>
+          </p:cNvSpPr>
+          <p:nvPr>
+            <p:ph type="sldNum" sz="quarter" idx="5"/>
+          </p:nvPr>
+        </p:nvSpPr>
+        <p:spPr/>
+        <p:txBody>
+          <a:bodyPr/>
+          <a:lstStyle/>
+          <a:p>
+            <a:fld id="{18C1416E-D494-44F3-B292-A904148FC6F9}" type="slidenum">
+              <a:rPr lang="en-CA" smtClean="0"/>
+              <a:t>33</a:t>
             </a:fld>
             <a:endParaRPr lang="en-CA"/>
           </a:p>
@@ -967,7 +1052,7 @@
           <a:p>
             <a:fld id="{EEFF9937-7089-458F-8141-AF5369533E8C}" type="datetime1">
               <a:rPr lang="en-CA" smtClean="0"/>
-              <a:t>2019-10-04</a:t>
+              <a:t>2019-10-05</a:t>
             </a:fld>
             <a:endParaRPr lang="en-CA"/>
           </a:p>
@@ -1177,7 +1262,7 @@
           <a:p>
             <a:fld id="{0149DFB0-A796-4597-95AE-B1DFA5462110}" type="datetime1">
               <a:rPr lang="en-CA" smtClean="0"/>
-              <a:t>2019-10-04</a:t>
+              <a:t>2019-10-05</a:t>
             </a:fld>
             <a:endParaRPr lang="en-CA"/>
           </a:p>
@@ -1357,7 +1442,7 @@
           <a:p>
             <a:fld id="{4C8A52BB-DBA8-4D61-8E21-177EE8D83645}" type="datetime1">
               <a:rPr lang="en-CA" smtClean="0"/>
-              <a:t>2019-10-04</a:t>
+              <a:t>2019-10-05</a:t>
             </a:fld>
             <a:endParaRPr lang="en-CA"/>
           </a:p>
@@ -1556,7 +1641,7 @@
           <a:p>
             <a:fld id="{F9277689-7F2A-41B7-BD48-CFC305A89705}" type="datetime1">
               <a:rPr lang="en-CA" smtClean="0"/>
-              <a:t>2019-10-04</a:t>
+              <a:t>2019-10-05</a:t>
             </a:fld>
             <a:endParaRPr lang="en-CA"/>
           </a:p>
@@ -1840,7 +1925,7 @@
           <a:p>
             <a:fld id="{54A3B024-C2E2-47CF-BA55-3C4A2D1EA790}" type="datetime1">
               <a:rPr lang="en-CA" smtClean="0"/>
-              <a:t>2019-10-04</a:t>
+              <a:t>2019-10-05</a:t>
             </a:fld>
             <a:endParaRPr lang="en-CA"/>
           </a:p>
@@ -2072,7 +2157,7 @@
           <a:p>
             <a:fld id="{AE3DE944-2497-4CBA-8E94-B90292F4E9B5}" type="datetime1">
               <a:rPr lang="en-CA" smtClean="0"/>
-              <a:t>2019-10-04</a:t>
+              <a:t>2019-10-05</a:t>
             </a:fld>
             <a:endParaRPr lang="en-CA"/>
           </a:p>
@@ -2439,7 +2524,7 @@
           <a:p>
             <a:fld id="{CC53FE7D-C2D5-4606-BAA4-31F66E5E6457}" type="datetime1">
               <a:rPr lang="en-CA" smtClean="0"/>
-              <a:t>2019-10-04</a:t>
+              <a:t>2019-10-05</a:t>
             </a:fld>
             <a:endParaRPr lang="en-CA"/>
           </a:p>
@@ -2557,7 +2642,7 @@
           <a:p>
             <a:fld id="{C27D8D76-2661-49E1-854E-F03AEE801C96}" type="datetime1">
               <a:rPr lang="en-CA" smtClean="0"/>
-              <a:t>2019-10-04</a:t>
+              <a:t>2019-10-05</a:t>
             </a:fld>
             <a:endParaRPr lang="en-CA"/>
           </a:p>
@@ -2652,7 +2737,7 @@
           <a:p>
             <a:fld id="{5DD70825-C5DB-4B91-9FC6-B6BC627D3CD0}" type="datetime1">
               <a:rPr lang="en-CA" smtClean="0"/>
-              <a:t>2019-10-04</a:t>
+              <a:t>2019-10-05</a:t>
             </a:fld>
             <a:endParaRPr lang="en-CA"/>
           </a:p>
@@ -2929,7 +3014,7 @@
           <a:p>
             <a:fld id="{7A5181B9-69C9-4274-96FB-A775CDA9B197}" type="datetime1">
               <a:rPr lang="en-CA" smtClean="0"/>
-              <a:t>2019-10-04</a:t>
+              <a:t>2019-10-05</a:t>
             </a:fld>
             <a:endParaRPr lang="en-CA"/>
           </a:p>
@@ -3186,7 +3271,7 @@
           <a:p>
             <a:fld id="{7B7AB907-29CB-4B22-9220-E49B995347BC}" type="datetime1">
               <a:rPr lang="en-CA" smtClean="0"/>
-              <a:t>2019-10-04</a:t>
+              <a:t>2019-10-05</a:t>
             </a:fld>
             <a:endParaRPr lang="en-CA"/>
           </a:p>
@@ -3397,7 +3482,7 @@
           <a:p>
             <a:fld id="{B4580F54-E6A9-4C9F-A734-C5DBF20B3885}" type="datetime1">
               <a:rPr lang="en-CA" smtClean="0"/>
-              <a:t>2019-10-04</a:t>
+              <a:t>2019-10-05</a:t>
             </a:fld>
             <a:endParaRPr lang="en-CA"/>
           </a:p>
@@ -4024,13 +4109,860 @@
                 </a:solidFill>
                 <a:latin typeface="Noto Sans Regular"/>
               </a:rPr>
-              <a:t>Homogenous Coordinates Applications – Point at Infinity</a:t>
+              <a:t>Homogenous Coordinates</a:t>
             </a:r>
           </a:p>
         </p:txBody>
       </p:sp>
       <mc:AlternateContent xmlns:mc="http://schemas.openxmlformats.org/markup-compatibility/2006" xmlns:a14="http://schemas.microsoft.com/office/drawing/2010/main">
         <mc:Choice Requires="a14">
+          <p:sp>
+            <p:nvSpPr>
+              <p:cNvPr id="6" name="TextShape 2">
+                <a:extLst>
+                  <a:ext uri="{FF2B5EF4-FFF2-40B4-BE49-F238E27FC236}">
+                    <a16:creationId xmlns:a16="http://schemas.microsoft.com/office/drawing/2014/main" id="{60BEF98C-8896-4CC1-BA48-04B35A72CF20}"/>
+                  </a:ext>
+                </a:extLst>
+              </p:cNvPr>
+              <p:cNvSpPr txBox="1"/>
+              <p:nvPr/>
+            </p:nvSpPr>
+            <p:spPr>
+              <a:xfrm>
+                <a:off x="252000" y="1542091"/>
+                <a:ext cx="8640000" cy="5179385"/>
+              </a:xfrm>
+              <a:prstGeom prst="rect">
+                <a:avLst/>
+              </a:prstGeom>
+              <a:noFill/>
+              <a:ln>
+                <a:noFill/>
+              </a:ln>
+            </p:spPr>
+            <p:txBody>
+              <a:bodyPr lIns="0" tIns="0" rIns="0" bIns="0"/>
+              <a:lstStyle/>
+              <a:p>
+                <a:pPr marL="565200" indent="-457200">
+                  <a:spcAft>
+                    <a:spcPts val="1414"/>
+                  </a:spcAft>
+                  <a:buClr>
+                    <a:srgbClr val="EF2929"/>
+                  </a:buClr>
+                  <a:buSzPct val="100000"/>
+                  <a:buFont typeface="Arial" panose="020B0604020202020204" pitchFamily="34" charset="0"/>
+                  <a:buChar char="•"/>
+                </a:pPr>
+                <a:r>
+                  <a:rPr lang="en-CA" sz="2400" spc="-1" dirty="0">
+                    <a:solidFill>
+                      <a:srgbClr val="333333"/>
+                    </a:solidFill>
+                    <a:latin typeface="Noto Sans Regular"/>
+                  </a:rPr>
+                  <a:t>Point augmented with an additional coordinate to represent the point at different scales</a:t>
+                </a:r>
+              </a:p>
+              <a:p>
+                <a:pPr marL="108000">
+                  <a:spcAft>
+                    <a:spcPts val="1414"/>
+                  </a:spcAft>
+                  <a:buClr>
+                    <a:srgbClr val="EF2929"/>
+                  </a:buClr>
+                  <a:buSzPct val="100000"/>
+                </a:pPr>
+                <a:r>
+                  <a:rPr lang="en-CA" sz="2400" b="1" spc="-1" dirty="0">
+                    <a:solidFill>
+                      <a:srgbClr val="333333"/>
+                    </a:solidFill>
+                    <a:latin typeface="Noto Sans Regular"/>
+                  </a:rPr>
+                  <a:t>Normalized (scaling = 1) Homogenous Coordinates</a:t>
+                </a:r>
+              </a:p>
+              <a:p>
+                <a:pPr marL="108000">
+                  <a:spcAft>
+                    <a:spcPts val="1414"/>
+                  </a:spcAft>
+                  <a:buClr>
+                    <a:srgbClr val="EF2929"/>
+                  </a:buClr>
+                  <a:buSzPct val="100000"/>
+                </a:pPr>
+                <a:endParaRPr lang="en-CA" sz="2400" b="1" spc="-1" dirty="0">
+                  <a:solidFill>
+                    <a:srgbClr val="333333"/>
+                  </a:solidFill>
+                  <a:latin typeface="Noto Sans Regular"/>
+                </a:endParaRPr>
+              </a:p>
+              <a:p>
+                <a:pPr marL="108000">
+                  <a:spcAft>
+                    <a:spcPts val="1414"/>
+                  </a:spcAft>
+                  <a:buClr>
+                    <a:srgbClr val="EF2929"/>
+                  </a:buClr>
+                  <a:buSzPct val="100000"/>
+                </a:pPr>
+                <a:endParaRPr lang="en-CA" sz="2400" b="1" spc="-1" dirty="0">
+                  <a:solidFill>
+                    <a:srgbClr val="333333"/>
+                  </a:solidFill>
+                  <a:latin typeface="Noto Sans Regular"/>
+                </a:endParaRPr>
+              </a:p>
+              <a:p>
+                <a:pPr marL="108000">
+                  <a:spcAft>
+                    <a:spcPts val="1414"/>
+                  </a:spcAft>
+                  <a:buClr>
+                    <a:srgbClr val="EF2929"/>
+                  </a:buClr>
+                  <a:buSzPct val="100000"/>
+                </a:pPr>
+                <a:endParaRPr lang="en-CA" sz="2400" b="1" spc="-1" dirty="0">
+                  <a:solidFill>
+                    <a:srgbClr val="333333"/>
+                  </a:solidFill>
+                  <a:latin typeface="Noto Sans Regular"/>
+                </a:endParaRPr>
+              </a:p>
+              <a:p>
+                <a:pPr marL="108000">
+                  <a:spcAft>
+                    <a:spcPts val="1414"/>
+                  </a:spcAft>
+                  <a:buClr>
+                    <a:srgbClr val="EF2929"/>
+                  </a:buClr>
+                  <a:buSzPct val="100000"/>
+                </a:pPr>
+                <a:r>
+                  <a:rPr lang="en-CA" sz="2400" b="1" spc="-1" dirty="0">
+                    <a:solidFill>
+                      <a:srgbClr val="333333"/>
+                    </a:solidFill>
+                    <a:latin typeface="Noto Sans Regular"/>
+                  </a:rPr>
+                  <a:t>Non-Normalized (scaling </a:t>
+                </a:r>
+                <a14:m>
+                  <m:oMath xmlns:m="http://schemas.openxmlformats.org/officeDocument/2006/math">
+                    <m:r>
+                      <a:rPr lang="en-CA" sz="2400" b="1" i="1" spc="-1">
+                        <a:solidFill>
+                          <a:srgbClr val="333333"/>
+                        </a:solidFill>
+                        <a:latin typeface="Cambria Math" panose="02040503050406030204" pitchFamily="18" charset="0"/>
+                      </a:rPr>
+                      <m:t>≠</m:t>
+                    </m:r>
+                    <m:r>
+                      <a:rPr lang="en-CA" sz="2400" b="1" spc="-1">
+                        <a:solidFill>
+                          <a:srgbClr val="333333"/>
+                        </a:solidFill>
+                        <a:latin typeface="Cambria Math" panose="02040503050406030204" pitchFamily="18" charset="0"/>
+                      </a:rPr>
+                      <m:t>𝟏</m:t>
+                    </m:r>
+                  </m:oMath>
+                </a14:m>
+                <a:r>
+                  <a:rPr lang="en-CA" sz="2400" b="1" spc="-1" dirty="0">
+                    <a:solidFill>
+                      <a:srgbClr val="333333"/>
+                    </a:solidFill>
+                    <a:latin typeface="Noto Sans Regular"/>
+                  </a:rPr>
+                  <a:t>) Homogenous Coordinates</a:t>
+                </a:r>
+              </a:p>
+              <a:p>
+                <a:pPr marL="108000">
+                  <a:spcAft>
+                    <a:spcPts val="1414"/>
+                  </a:spcAft>
+                  <a:buClr>
+                    <a:srgbClr val="EF2929"/>
+                  </a:buClr>
+                  <a:buSzPct val="100000"/>
+                </a:pPr>
+                <a:endParaRPr lang="en-CA" sz="2400" b="1" spc="-1" dirty="0">
+                  <a:solidFill>
+                    <a:srgbClr val="333333"/>
+                  </a:solidFill>
+                  <a:latin typeface="Noto Sans Regular"/>
+                </a:endParaRPr>
+              </a:p>
+            </p:txBody>
+          </p:sp>
+        </mc:Choice>
+        <mc:Fallback xmlns="">
+          <p:sp>
+            <p:nvSpPr>
+              <p:cNvPr id="6" name="TextShape 2">
+                <a:extLst>
+                  <a:ext uri="{FF2B5EF4-FFF2-40B4-BE49-F238E27FC236}">
+                    <a16:creationId xmlns:a16="http://schemas.microsoft.com/office/drawing/2014/main" id="{60BEF98C-8896-4CC1-BA48-04B35A72CF20}"/>
+                  </a:ext>
+                </a:extLst>
+              </p:cNvPr>
+              <p:cNvSpPr txBox="1">
+                <a:spLocks noRot="1" noChangeAspect="1" noMove="1" noResize="1" noEditPoints="1" noAdjustHandles="1" noChangeArrowheads="1" noChangeShapeType="1" noTextEdit="1"/>
+              </p:cNvSpPr>
+              <p:nvPr/>
+            </p:nvSpPr>
+            <p:spPr>
+              <a:xfrm>
+                <a:off x="252000" y="1542091"/>
+                <a:ext cx="8640000" cy="5179385"/>
+              </a:xfrm>
+              <a:prstGeom prst="rect">
+                <a:avLst/>
+              </a:prstGeom>
+              <a:blipFill>
+                <a:blip r:embed="rId2"/>
+                <a:stretch>
+                  <a:fillRect l="-846" t="-1882" r="-917"/>
+                </a:stretch>
+              </a:blipFill>
+              <a:ln>
+                <a:noFill/>
+              </a:ln>
+            </p:spPr>
+            <p:txBody>
+              <a:bodyPr/>
+              <a:lstStyle/>
+              <a:p>
+                <a:r>
+                  <a:rPr lang="en-CA">
+                    <a:noFill/>
+                  </a:rPr>
+                  <a:t> </a:t>
+                </a:r>
+              </a:p>
+            </p:txBody>
+          </p:sp>
+        </mc:Fallback>
+      </mc:AlternateContent>
+      <p:pic>
+        <p:nvPicPr>
+          <p:cNvPr id="7" name="Picture 6">
+            <a:extLst>
+              <a:ext uri="{FF2B5EF4-FFF2-40B4-BE49-F238E27FC236}">
+                <a16:creationId xmlns:a16="http://schemas.microsoft.com/office/drawing/2014/main" id="{C8DEFF1D-B58C-47A2-B5F6-61244DE67FC8}"/>
+              </a:ext>
+            </a:extLst>
+          </p:cNvPr>
+          <p:cNvPicPr/>
+          <p:nvPr/>
+        </p:nvPicPr>
+        <p:blipFill>
+          <a:blip r:embed="rId3"/>
+          <a:stretch>
+            <a:fillRect/>
+          </a:stretch>
+        </p:blipFill>
+        <p:spPr>
+          <a:xfrm>
+            <a:off x="3634248" y="3030263"/>
+            <a:ext cx="1488358" cy="1474012"/>
+          </a:xfrm>
+          <a:prstGeom prst="rect">
+            <a:avLst/>
+          </a:prstGeom>
+        </p:spPr>
+      </p:pic>
+      <mc:AlternateContent xmlns:mc="http://schemas.openxmlformats.org/markup-compatibility/2006" xmlns:a14="http://schemas.microsoft.com/office/drawing/2010/main">
+        <mc:Choice Requires="a14">
+          <p:sp>
+            <p:nvSpPr>
+              <p:cNvPr id="3" name="TextBox 2">
+                <a:extLst>
+                  <a:ext uri="{FF2B5EF4-FFF2-40B4-BE49-F238E27FC236}">
+                    <a16:creationId xmlns:a16="http://schemas.microsoft.com/office/drawing/2014/main" id="{7C862544-5F38-488A-A13B-C5EA3E19F210}"/>
+                  </a:ext>
+                </a:extLst>
+              </p:cNvPr>
+              <p:cNvSpPr txBox="1"/>
+              <p:nvPr/>
+            </p:nvSpPr>
+            <p:spPr>
+              <a:xfrm>
+                <a:off x="1779639" y="5315909"/>
+                <a:ext cx="2989006" cy="1314912"/>
+              </a:xfrm>
+              <a:prstGeom prst="rect">
+                <a:avLst/>
+              </a:prstGeom>
+              <a:noFill/>
+            </p:spPr>
+            <p:txBody>
+              <a:bodyPr wrap="square" rtlCol="0">
+                <a:spAutoFit/>
+              </a:bodyPr>
+              <a:lstStyle/>
+              <a:p>
+                <a:pPr/>
+                <a14:m>
+                  <m:oMathPara xmlns:m="http://schemas.openxmlformats.org/officeDocument/2006/math">
+                    <m:oMathParaPr>
+                      <m:jc m:val="centerGroup"/>
+                    </m:oMathParaPr>
+                    <m:oMath xmlns:m="http://schemas.openxmlformats.org/officeDocument/2006/math">
+                      <m:r>
+                        <a:rPr lang="en-CA" sz="2400" b="0" i="1" smtClean="0">
+                          <a:latin typeface="Cambria Math" panose="02040503050406030204" pitchFamily="18" charset="0"/>
+                        </a:rPr>
+                        <m:t>𝑝</m:t>
+                      </m:r>
+                      <m:r>
+                        <a:rPr lang="en-CA" sz="2400" b="0" i="1" smtClean="0">
+                          <a:latin typeface="Cambria Math" panose="02040503050406030204" pitchFamily="18" charset="0"/>
+                        </a:rPr>
+                        <m:t>=</m:t>
+                      </m:r>
+                      <m:d>
+                        <m:dPr>
+                          <m:begChr m:val="["/>
+                          <m:endChr m:val="]"/>
+                          <m:ctrlPr>
+                            <a:rPr lang="en-CA" sz="2400" b="0" i="1" smtClean="0">
+                              <a:latin typeface="Cambria Math" panose="02040503050406030204" pitchFamily="18" charset="0"/>
+                            </a:rPr>
+                          </m:ctrlPr>
+                        </m:dPr>
+                        <m:e>
+                          <m:m>
+                            <m:mPr>
+                              <m:mcs>
+                                <m:mc>
+                                  <m:mcPr>
+                                    <m:count m:val="1"/>
+                                    <m:mcJc m:val="center"/>
+                                  </m:mcPr>
+                                </m:mc>
+                              </m:mcs>
+                              <m:ctrlPr>
+                                <a:rPr lang="en-CA" sz="2400" i="1" smtClean="0">
+                                  <a:latin typeface="Cambria Math" panose="02040503050406030204" pitchFamily="18" charset="0"/>
+                                </a:rPr>
+                              </m:ctrlPr>
+                            </m:mPr>
+                            <m:mr>
+                              <m:e>
+                                <m:r>
+                                  <m:rPr>
+                                    <m:brk m:alnAt="7"/>
+                                  </m:rPr>
+                                  <a:rPr lang="en-CA" sz="2400" b="0" i="1" smtClean="0">
+                                    <a:latin typeface="Cambria Math" panose="02040503050406030204" pitchFamily="18" charset="0"/>
+                                  </a:rPr>
+                                  <m:t>𝑥</m:t>
+                                </m:r>
+                              </m:e>
+                            </m:mr>
+                            <m:mr>
+                              <m:e>
+                                <m:r>
+                                  <a:rPr lang="en-CA" sz="2400" b="0" i="1" smtClean="0">
+                                    <a:latin typeface="Cambria Math" panose="02040503050406030204" pitchFamily="18" charset="0"/>
+                                  </a:rPr>
+                                  <m:t>𝑦</m:t>
+                                </m:r>
+                              </m:e>
+                            </m:mr>
+                            <m:mr>
+                              <m:e>
+                                <m:m>
+                                  <m:mPr>
+                                    <m:mcs>
+                                      <m:mc>
+                                        <m:mcPr>
+                                          <m:count m:val="1"/>
+                                          <m:mcJc m:val="center"/>
+                                        </m:mcPr>
+                                      </m:mc>
+                                    </m:mcs>
+                                    <m:ctrlPr>
+                                      <a:rPr lang="en-CA" sz="2400" i="1" smtClean="0">
+                                        <a:latin typeface="Cambria Math" panose="02040503050406030204" pitchFamily="18" charset="0"/>
+                                      </a:rPr>
+                                    </m:ctrlPr>
+                                  </m:mPr>
+                                  <m:mr>
+                                    <m:e>
+                                      <m:r>
+                                        <m:rPr>
+                                          <m:brk m:alnAt="7"/>
+                                        </m:rPr>
+                                        <a:rPr lang="en-CA" sz="2400" b="0" i="1" smtClean="0">
+                                          <a:latin typeface="Cambria Math" panose="02040503050406030204" pitchFamily="18" charset="0"/>
+                                        </a:rPr>
+                                        <m:t>𝑧</m:t>
+                                      </m:r>
+                                    </m:e>
+                                  </m:mr>
+                                  <m:mr>
+                                    <m:e>
+                                      <m:r>
+                                        <a:rPr lang="en-CA" sz="2400" b="0" i="1" smtClean="0">
+                                          <a:latin typeface="Cambria Math" panose="02040503050406030204" pitchFamily="18" charset="0"/>
+                                        </a:rPr>
+                                        <m:t>1</m:t>
+                                      </m:r>
+                                    </m:e>
+                                  </m:mr>
+                                </m:m>
+                              </m:e>
+                            </m:mr>
+                          </m:m>
+                        </m:e>
+                      </m:d>
+                      <m:r>
+                        <a:rPr lang="en-CA" sz="2400" b="0" i="1" smtClean="0">
+                          <a:latin typeface="Cambria Math" panose="02040503050406030204" pitchFamily="18" charset="0"/>
+                        </a:rPr>
+                        <m:t>→</m:t>
+                      </m:r>
+                      <m:acc>
+                        <m:accPr>
+                          <m:chr m:val="̃"/>
+                          <m:ctrlPr>
+                            <a:rPr lang="en-CA" sz="2400" b="0" i="1" smtClean="0">
+                              <a:latin typeface="Cambria Math" panose="02040503050406030204" pitchFamily="18" charset="0"/>
+                            </a:rPr>
+                          </m:ctrlPr>
+                        </m:accPr>
+                        <m:e>
+                          <m:r>
+                            <a:rPr lang="en-CA" sz="2400" b="0" i="1" smtClean="0">
+                              <a:latin typeface="Cambria Math" panose="02040503050406030204" pitchFamily="18" charset="0"/>
+                            </a:rPr>
+                            <m:t>𝑝</m:t>
+                          </m:r>
+                        </m:e>
+                      </m:acc>
+                      <m:r>
+                        <a:rPr lang="en-CA" sz="2400" b="0" i="1" smtClean="0">
+                          <a:latin typeface="Cambria Math" panose="02040503050406030204" pitchFamily="18" charset="0"/>
+                        </a:rPr>
+                        <m:t>=</m:t>
+                      </m:r>
+                      <m:d>
+                        <m:dPr>
+                          <m:begChr m:val="["/>
+                          <m:endChr m:val="]"/>
+                          <m:ctrlPr>
+                            <a:rPr lang="en-CA" sz="2400" i="1">
+                              <a:latin typeface="Cambria Math" panose="02040503050406030204" pitchFamily="18" charset="0"/>
+                            </a:rPr>
+                          </m:ctrlPr>
+                        </m:dPr>
+                        <m:e>
+                          <m:m>
+                            <m:mPr>
+                              <m:mcs>
+                                <m:mc>
+                                  <m:mcPr>
+                                    <m:count m:val="1"/>
+                                    <m:mcJc m:val="center"/>
+                                  </m:mcPr>
+                                </m:mc>
+                              </m:mcs>
+                              <m:ctrlPr>
+                                <a:rPr lang="en-CA" sz="2400" i="1">
+                                  <a:latin typeface="Cambria Math" panose="02040503050406030204" pitchFamily="18" charset="0"/>
+                                </a:rPr>
+                              </m:ctrlPr>
+                            </m:mPr>
+                            <m:mr>
+                              <m:e>
+                                <m:r>
+                                  <m:rPr>
+                                    <m:brk m:alnAt="7"/>
+                                  </m:rPr>
+                                  <a:rPr lang="en-CA" sz="2400" b="0" i="1" smtClean="0">
+                                    <a:latin typeface="Cambria Math" panose="02040503050406030204" pitchFamily="18" charset="0"/>
+                                  </a:rPr>
+                                  <m:t>𝑤</m:t>
+                                </m:r>
+                                <m:r>
+                                  <a:rPr lang="en-CA" sz="2400" b="0" i="1" smtClean="0">
+                                    <a:latin typeface="Cambria Math" panose="02040503050406030204" pitchFamily="18" charset="0"/>
+                                  </a:rPr>
+                                  <m:t>𝑥</m:t>
+                                </m:r>
+                              </m:e>
+                            </m:mr>
+                            <m:mr>
+                              <m:e>
+                                <m:r>
+                                  <a:rPr lang="en-CA" sz="2400" b="0" i="1" smtClean="0">
+                                    <a:latin typeface="Cambria Math" panose="02040503050406030204" pitchFamily="18" charset="0"/>
+                                  </a:rPr>
+                                  <m:t>𝑤𝑦</m:t>
+                                </m:r>
+                              </m:e>
+                            </m:mr>
+                            <m:mr>
+                              <m:e>
+                                <m:m>
+                                  <m:mPr>
+                                    <m:mcs>
+                                      <m:mc>
+                                        <m:mcPr>
+                                          <m:count m:val="1"/>
+                                          <m:mcJc m:val="center"/>
+                                        </m:mcPr>
+                                      </m:mc>
+                                    </m:mcs>
+                                    <m:ctrlPr>
+                                      <a:rPr lang="en-CA" sz="2400" i="1">
+                                        <a:latin typeface="Cambria Math" panose="02040503050406030204" pitchFamily="18" charset="0"/>
+                                      </a:rPr>
+                                    </m:ctrlPr>
+                                  </m:mPr>
+                                  <m:mr>
+                                    <m:e>
+                                      <m:r>
+                                        <m:rPr>
+                                          <m:brk m:alnAt="7"/>
+                                        </m:rPr>
+                                        <a:rPr lang="en-CA" sz="2400" b="0" i="1" smtClean="0">
+                                          <a:latin typeface="Cambria Math" panose="02040503050406030204" pitchFamily="18" charset="0"/>
+                                        </a:rPr>
+                                        <m:t>𝑤</m:t>
+                                      </m:r>
+                                      <m:r>
+                                        <a:rPr lang="en-CA" sz="2400" b="0" i="1" smtClean="0">
+                                          <a:latin typeface="Cambria Math" panose="02040503050406030204" pitchFamily="18" charset="0"/>
+                                        </a:rPr>
+                                        <m:t>𝑧</m:t>
+                                      </m:r>
+                                    </m:e>
+                                  </m:mr>
+                                  <m:mr>
+                                    <m:e>
+                                      <m:r>
+                                        <a:rPr lang="en-CA" sz="2400" b="0" i="1" smtClean="0">
+                                          <a:latin typeface="Cambria Math" panose="02040503050406030204" pitchFamily="18" charset="0"/>
+                                        </a:rPr>
+                                        <m:t>𝑤</m:t>
+                                      </m:r>
+                                    </m:e>
+                                  </m:mr>
+                                </m:m>
+                              </m:e>
+                            </m:mr>
+                          </m:m>
+                        </m:e>
+                      </m:d>
+                    </m:oMath>
+                  </m:oMathPara>
+                </a14:m>
+                <a:endParaRPr lang="en-CA" sz="2400" dirty="0"/>
+              </a:p>
+            </p:txBody>
+          </p:sp>
+        </mc:Choice>
+        <mc:Fallback xmlns="">
+          <p:sp>
+            <p:nvSpPr>
+              <p:cNvPr id="3" name="TextBox 2">
+                <a:extLst>
+                  <a:ext uri="{FF2B5EF4-FFF2-40B4-BE49-F238E27FC236}">
+                    <a16:creationId xmlns:a16="http://schemas.microsoft.com/office/drawing/2014/main" id="{7C862544-5F38-488A-A13B-C5EA3E19F210}"/>
+                  </a:ext>
+                </a:extLst>
+              </p:cNvPr>
+              <p:cNvSpPr txBox="1">
+                <a:spLocks noRot="1" noChangeAspect="1" noMove="1" noResize="1" noEditPoints="1" noAdjustHandles="1" noChangeArrowheads="1" noChangeShapeType="1" noTextEdit="1"/>
+              </p:cNvSpPr>
+              <p:nvPr/>
+            </p:nvSpPr>
+            <p:spPr>
+              <a:xfrm>
+                <a:off x="1779639" y="5315909"/>
+                <a:ext cx="2989006" cy="1314912"/>
+              </a:xfrm>
+              <a:prstGeom prst="rect">
+                <a:avLst/>
+              </a:prstGeom>
+              <a:blipFill>
+                <a:blip r:embed="rId4"/>
+                <a:stretch>
+                  <a:fillRect/>
+                </a:stretch>
+              </a:blipFill>
+            </p:spPr>
+            <p:txBody>
+              <a:bodyPr/>
+              <a:lstStyle/>
+              <a:p>
+                <a:r>
+                  <a:rPr lang="en-CA">
+                    <a:noFill/>
+                  </a:rPr>
+                  <a:t> </a:t>
+                </a:r>
+              </a:p>
+            </p:txBody>
+          </p:sp>
+        </mc:Fallback>
+      </mc:AlternateContent>
+      <mc:AlternateContent xmlns:mc="http://schemas.openxmlformats.org/markup-compatibility/2006" xmlns:a14="http://schemas.microsoft.com/office/drawing/2010/main">
+        <mc:Choice Requires="a14">
+          <p:sp>
+            <p:nvSpPr>
+              <p:cNvPr id="9" name="TextBox 8">
+                <a:extLst>
+                  <a:ext uri="{FF2B5EF4-FFF2-40B4-BE49-F238E27FC236}">
+                    <a16:creationId xmlns:a16="http://schemas.microsoft.com/office/drawing/2014/main" id="{1F79E1D9-E84B-4DDF-8681-4E88A8194AAA}"/>
+                  </a:ext>
+                </a:extLst>
+              </p:cNvPr>
+              <p:cNvSpPr txBox="1"/>
+              <p:nvPr/>
+            </p:nvSpPr>
+            <p:spPr>
+              <a:xfrm>
+                <a:off x="4803691" y="5636150"/>
+                <a:ext cx="2251587" cy="784767"/>
+              </a:xfrm>
+              <a:prstGeom prst="rect">
+                <a:avLst/>
+              </a:prstGeom>
+              <a:noFill/>
+            </p:spPr>
+            <p:txBody>
+              <a:bodyPr wrap="square" rtlCol="0">
+                <a:spAutoFit/>
+              </a:bodyPr>
+              <a:lstStyle/>
+              <a:p>
+                <a:pPr/>
+                <a14:m>
+                  <m:oMathPara xmlns:m="http://schemas.openxmlformats.org/officeDocument/2006/math">
+                    <m:oMathParaPr>
+                      <m:jc m:val="centerGroup"/>
+                    </m:oMathParaPr>
+                    <m:oMath xmlns:m="http://schemas.openxmlformats.org/officeDocument/2006/math">
+                      <m:r>
+                        <a:rPr lang="en-CA" sz="2400" b="0" i="1" smtClean="0">
+                          <a:latin typeface="Cambria Math" panose="02040503050406030204" pitchFamily="18" charset="0"/>
+                        </a:rPr>
+                        <m:t>𝑝</m:t>
+                      </m:r>
+                      <m:r>
+                        <a:rPr lang="en-CA" sz="2400" b="0" i="1" smtClean="0">
+                          <a:latin typeface="Cambria Math" panose="02040503050406030204" pitchFamily="18" charset="0"/>
+                        </a:rPr>
+                        <m:t>=</m:t>
+                      </m:r>
+                      <m:acc>
+                        <m:accPr>
+                          <m:chr m:val="̃"/>
+                          <m:ctrlPr>
+                            <a:rPr lang="en-CA" sz="2400" b="0" i="1" smtClean="0">
+                              <a:latin typeface="Cambria Math" panose="02040503050406030204" pitchFamily="18" charset="0"/>
+                            </a:rPr>
+                          </m:ctrlPr>
+                        </m:accPr>
+                        <m:e>
+                          <m:f>
+                            <m:fPr>
+                              <m:ctrlPr>
+                                <a:rPr lang="en-CA" sz="2400" b="0" i="1" smtClean="0">
+                                  <a:latin typeface="Cambria Math" panose="02040503050406030204" pitchFamily="18" charset="0"/>
+                                </a:rPr>
+                              </m:ctrlPr>
+                            </m:fPr>
+                            <m:num>
+                              <m:r>
+                                <a:rPr lang="en-CA" sz="2400" b="0" i="1" smtClean="0">
+                                  <a:latin typeface="Cambria Math" panose="02040503050406030204" pitchFamily="18" charset="0"/>
+                                </a:rPr>
+                                <m:t>𝑝</m:t>
+                              </m:r>
+                            </m:num>
+                            <m:den>
+                              <m:r>
+                                <a:rPr lang="en-CA" sz="2400" b="0" i="1" smtClean="0">
+                                  <a:latin typeface="Cambria Math" panose="02040503050406030204" pitchFamily="18" charset="0"/>
+                                </a:rPr>
+                                <m:t>𝑤</m:t>
+                              </m:r>
+                            </m:den>
+                          </m:f>
+                        </m:e>
+                      </m:acc>
+                    </m:oMath>
+                  </m:oMathPara>
+                </a14:m>
+                <a:endParaRPr lang="en-CA" sz="2400" dirty="0"/>
+              </a:p>
+            </p:txBody>
+          </p:sp>
+        </mc:Choice>
+        <mc:Fallback xmlns="">
+          <p:sp>
+            <p:nvSpPr>
+              <p:cNvPr id="9" name="TextBox 8">
+                <a:extLst>
+                  <a:ext uri="{FF2B5EF4-FFF2-40B4-BE49-F238E27FC236}">
+                    <a16:creationId xmlns:a16="http://schemas.microsoft.com/office/drawing/2014/main" id="{1F79E1D9-E84B-4DDF-8681-4E88A8194AAA}"/>
+                  </a:ext>
+                </a:extLst>
+              </p:cNvPr>
+              <p:cNvSpPr txBox="1">
+                <a:spLocks noRot="1" noChangeAspect="1" noMove="1" noResize="1" noEditPoints="1" noAdjustHandles="1" noChangeArrowheads="1" noChangeShapeType="1" noTextEdit="1"/>
+              </p:cNvSpPr>
+              <p:nvPr/>
+            </p:nvSpPr>
+            <p:spPr>
+              <a:xfrm>
+                <a:off x="4803691" y="5636150"/>
+                <a:ext cx="2251587" cy="784767"/>
+              </a:xfrm>
+              <a:prstGeom prst="rect">
+                <a:avLst/>
+              </a:prstGeom>
+              <a:blipFill>
+                <a:blip r:embed="rId5"/>
+                <a:stretch>
+                  <a:fillRect/>
+                </a:stretch>
+              </a:blipFill>
+            </p:spPr>
+            <p:txBody>
+              <a:bodyPr/>
+              <a:lstStyle/>
+              <a:p>
+                <a:r>
+                  <a:rPr lang="en-CA">
+                    <a:noFill/>
+                  </a:rPr>
+                  <a:t> </a:t>
+                </a:r>
+              </a:p>
+            </p:txBody>
+          </p:sp>
+        </mc:Fallback>
+      </mc:AlternateContent>
+    </p:spTree>
+    <p:extLst>
+      <p:ext uri="{BB962C8B-B14F-4D97-AF65-F5344CB8AC3E}">
+        <p14:creationId xmlns:p14="http://schemas.microsoft.com/office/powerpoint/2010/main" val="2988499868"/>
+      </p:ext>
+    </p:extLst>
+  </p:cSld>
+  <p:clrMapOvr>
+    <a:masterClrMapping/>
+  </p:clrMapOvr>
+</p:sld>
+</file>
+
+<file path=ppt/slides/slide11.xml><?xml version="1.0" encoding="utf-8"?>
+<p:sld xmlns:a="http://schemas.openxmlformats.org/drawingml/2006/main" xmlns:r="http://schemas.openxmlformats.org/officeDocument/2006/relationships" xmlns:p="http://schemas.openxmlformats.org/presentationml/2006/main">
+  <p:cSld>
+    <p:spTree>
+      <p:nvGrpSpPr>
+        <p:cNvPr id="1" name=""/>
+        <p:cNvGrpSpPr/>
+        <p:nvPr/>
+      </p:nvGrpSpPr>
+      <p:grpSpPr>
+        <a:xfrm>
+          <a:off x="0" y="0"/>
+          <a:ext cx="0" cy="0"/>
+          <a:chOff x="0" y="0"/>
+          <a:chExt cx="0" cy="0"/>
+        </a:xfrm>
+      </p:grpSpPr>
+      <p:sp>
+        <p:nvSpPr>
+          <p:cNvPr id="4" name="Slide Number Placeholder 3">
+            <a:extLst>
+              <a:ext uri="{FF2B5EF4-FFF2-40B4-BE49-F238E27FC236}">
+                <a16:creationId xmlns:a16="http://schemas.microsoft.com/office/drawing/2014/main" id="{BB42BA6F-63F1-47A7-9EC4-AEB3F8AEE033}"/>
+              </a:ext>
+            </a:extLst>
+          </p:cNvPr>
+          <p:cNvSpPr>
+            <a:spLocks noGrp="1"/>
+          </p:cNvSpPr>
+          <p:nvPr>
+            <p:ph type="sldNum" sz="quarter" idx="12"/>
+          </p:nvPr>
+        </p:nvSpPr>
+        <p:spPr/>
+        <p:txBody>
+          <a:bodyPr/>
+          <a:lstStyle/>
+          <a:p>
+            <a:fld id="{8F2D09F1-5447-4EA4-8EA6-0865537200C5}" type="slidenum">
+              <a:rPr lang="en-CA" smtClean="0"/>
+              <a:t>11</a:t>
+            </a:fld>
+            <a:endParaRPr lang="en-CA"/>
+          </a:p>
+        </p:txBody>
+      </p:sp>
+      <p:sp>
+        <p:nvSpPr>
+          <p:cNvPr id="5" name="TextShape 1">
+            <a:extLst>
+              <a:ext uri="{FF2B5EF4-FFF2-40B4-BE49-F238E27FC236}">
+                <a16:creationId xmlns:a16="http://schemas.microsoft.com/office/drawing/2014/main" id="{4E464BCD-5165-4EA8-A7C4-01702A446797}"/>
+              </a:ext>
+            </a:extLst>
+          </p:cNvPr>
+          <p:cNvSpPr txBox="1"/>
+          <p:nvPr/>
+        </p:nvSpPr>
+        <p:spPr>
+          <a:xfrm>
+            <a:off x="720000" y="300960"/>
+            <a:ext cx="8855640" cy="1262520"/>
+          </a:xfrm>
+          <a:prstGeom prst="rect">
+            <a:avLst/>
+          </a:prstGeom>
+          <a:noFill/>
+          <a:ln>
+            <a:noFill/>
+          </a:ln>
+        </p:spPr>
+        <p:txBody>
+          <a:bodyPr lIns="0" tIns="0" rIns="0" bIns="0" anchor="ctr"/>
+          <a:lstStyle/>
+          <a:p>
+            <a:r>
+              <a:rPr lang="en-CA" sz="4400" b="1" strike="noStrike" spc="-1" dirty="0">
+                <a:solidFill>
+                  <a:srgbClr val="333333"/>
+                </a:solidFill>
+                <a:latin typeface="Noto Sans Regular"/>
+              </a:rPr>
+              <a:t>Homogenous Coordinates Applications – Point at Infinity </a:t>
+            </a:r>
+          </a:p>
+        </p:txBody>
+      </p:sp>
+      <mc:AlternateContent xmlns:mc="http://schemas.openxmlformats.org/markup-compatibility/2006">
+        <mc:Choice xmlns:a14="http://schemas.microsoft.com/office/drawing/2010/main" Requires="a14">
           <p:sp>
             <p:nvSpPr>
               <p:cNvPr id="6" name="TextShape 2">
@@ -4131,7 +5063,7 @@
                     </a:solidFill>
                     <a:latin typeface="Noto Sans Regular"/>
                   </a:rPr>
-                  <a:t>Normative division causes resulting point to be at infinity</a:t>
+                  <a:t>Normative division causes resulting point to possess values at infinity</a:t>
                 </a:r>
                 <a:r>
                   <a:rPr lang="en-CA" sz="2600" spc="-1" dirty="0">
@@ -4346,7 +5278,7 @@
             </p:txBody>
           </p:sp>
         </mc:Choice>
-        <mc:Fallback xmlns="">
+        <mc:Fallback>
           <p:sp>
             <p:nvSpPr>
               <p:cNvPr id="6" name="TextShape 2">
@@ -4545,7 +5477,7 @@
 </p:sld>
 </file>
 
-<file path=ppt/slides/slide11.xml><?xml version="1.0" encoding="utf-8"?>
+<file path=ppt/slides/slide12.xml><?xml version="1.0" encoding="utf-8"?>
 <p:sld xmlns:a="http://schemas.openxmlformats.org/drawingml/2006/main" xmlns:r="http://schemas.openxmlformats.org/officeDocument/2006/relationships" xmlns:p="http://schemas.openxmlformats.org/presentationml/2006/main">
   <p:cSld>
     <p:spTree>
@@ -4585,7 +5517,7 @@
           <a:p>
             <a:fld id="{8F2D09F1-5447-4EA4-8EA6-0865537200C5}" type="slidenum">
               <a:rPr lang="en-CA" smtClean="0"/>
-              <a:t>11</a:t>
+              <a:t>12</a:t>
             </a:fld>
             <a:endParaRPr lang="en-CA"/>
           </a:p>
@@ -4632,8 +5564,8 @@
           </a:p>
         </p:txBody>
       </p:sp>
-      <mc:AlternateContent xmlns:mc="http://schemas.openxmlformats.org/markup-compatibility/2006">
-        <mc:Choice xmlns:a14="http://schemas.microsoft.com/office/drawing/2010/main" Requires="a14">
+      <mc:AlternateContent xmlns:mc="http://schemas.openxmlformats.org/markup-compatibility/2006" xmlns:a14="http://schemas.microsoft.com/office/drawing/2010/main">
+        <mc:Choice Requires="a14">
           <p:sp>
             <p:nvSpPr>
               <p:cNvPr id="6" name="TextShape 2">
@@ -4839,7 +5771,7 @@
             </p:txBody>
           </p:sp>
         </mc:Choice>
-        <mc:Fallback>
+        <mc:Fallback xmlns="">
           <p:sp>
             <p:nvSpPr>
               <p:cNvPr id="6" name="TextShape 2">
@@ -5977,7 +6909,7 @@
 </p:sld>
 </file>
 
-<file path=ppt/slides/slide12.xml><?xml version="1.0" encoding="utf-8"?>
+<file path=ppt/slides/slide13.xml><?xml version="1.0" encoding="utf-8"?>
 <p:sld xmlns:a="http://schemas.openxmlformats.org/drawingml/2006/main" xmlns:r="http://schemas.openxmlformats.org/officeDocument/2006/relationships" xmlns:p="http://schemas.openxmlformats.org/presentationml/2006/main">
   <p:cSld>
     <p:spTree>
@@ -6017,7 +6949,7 @@
           <a:p>
             <a:fld id="{8F2D09F1-5447-4EA4-8EA6-0865537200C5}" type="slidenum">
               <a:rPr lang="en-CA" smtClean="0"/>
-              <a:t>12</a:t>
+              <a:t>13</a:t>
             </a:fld>
             <a:endParaRPr lang="en-CA"/>
           </a:p>
@@ -6891,7 +7823,7 @@
 </p:sld>
 </file>
 
-<file path=ppt/slides/slide13.xml><?xml version="1.0" encoding="utf-8"?>
+<file path=ppt/slides/slide14.xml><?xml version="1.0" encoding="utf-8"?>
 <p:sld xmlns:a="http://schemas.openxmlformats.org/drawingml/2006/main" xmlns:r="http://schemas.openxmlformats.org/officeDocument/2006/relationships" xmlns:p="http://schemas.openxmlformats.org/presentationml/2006/main">
   <p:cSld>
     <p:spTree>
@@ -6931,7 +7863,7 @@
           <a:p>
             <a:fld id="{8F2D09F1-5447-4EA4-8EA6-0865537200C5}" type="slidenum">
               <a:rPr lang="en-CA" smtClean="0"/>
-              <a:t>13</a:t>
+              <a:t>14</a:t>
             </a:fld>
             <a:endParaRPr lang="en-CA"/>
           </a:p>
@@ -6978,8 +7910,8 @@
           </a:p>
         </p:txBody>
       </p:sp>
-      <mc:AlternateContent xmlns:mc="http://schemas.openxmlformats.org/markup-compatibility/2006">
-        <mc:Choice xmlns:a14="http://schemas.microsoft.com/office/drawing/2010/main" Requires="a14">
+      <mc:AlternateContent xmlns:mc="http://schemas.openxmlformats.org/markup-compatibility/2006" xmlns:a14="http://schemas.microsoft.com/office/drawing/2010/main">
+        <mc:Choice Requires="a14">
           <p:sp>
             <p:nvSpPr>
               <p:cNvPr id="6" name="TextShape 2">
@@ -7227,7 +8159,7 @@
             </p:txBody>
           </p:sp>
         </mc:Choice>
-        <mc:Fallback>
+        <mc:Fallback xmlns="">
           <p:sp>
             <p:nvSpPr>
               <p:cNvPr id="6" name="TextShape 2">
@@ -7818,8 +8750,8 @@
           </p:sp>
         </mc:Fallback>
       </mc:AlternateContent>
-      <mc:AlternateContent xmlns:mc="http://schemas.openxmlformats.org/markup-compatibility/2006">
-        <mc:Choice xmlns:a14="http://schemas.microsoft.com/office/drawing/2010/main" Requires="a14">
+      <mc:AlternateContent xmlns:mc="http://schemas.openxmlformats.org/markup-compatibility/2006" xmlns:a14="http://schemas.microsoft.com/office/drawing/2010/main">
+        <mc:Choice Requires="a14">
           <p:sp>
             <p:nvSpPr>
               <p:cNvPr id="2" name="TextBox 1">
@@ -8078,7 +9010,7 @@
             </p:txBody>
           </p:sp>
         </mc:Choice>
-        <mc:Fallback>
+        <mc:Fallback xmlns="">
           <p:sp>
             <p:nvSpPr>
               <p:cNvPr id="2" name="TextBox 1">
@@ -8136,7 +9068,7 @@
 </p:sld>
 </file>
 
-<file path=ppt/slides/slide14.xml><?xml version="1.0" encoding="utf-8"?>
+<file path=ppt/slides/slide15.xml><?xml version="1.0" encoding="utf-8"?>
 <p:sld xmlns:a="http://schemas.openxmlformats.org/drawingml/2006/main" xmlns:r="http://schemas.openxmlformats.org/officeDocument/2006/relationships" xmlns:p="http://schemas.openxmlformats.org/presentationml/2006/main">
   <p:cSld>
     <p:spTree>
@@ -8176,7 +9108,7 @@
           <a:p>
             <a:fld id="{8F2D09F1-5447-4EA4-8EA6-0865537200C5}" type="slidenum">
               <a:rPr lang="en-CA" smtClean="0"/>
-              <a:t>14</a:t>
+              <a:t>15</a:t>
             </a:fld>
             <a:endParaRPr lang="en-CA"/>
           </a:p>
@@ -9720,7 +10652,7 @@
 </p:sld>
 </file>
 
-<file path=ppt/slides/slide15.xml><?xml version="1.0" encoding="utf-8"?>
+<file path=ppt/slides/slide16.xml><?xml version="1.0" encoding="utf-8"?>
 <p:sld xmlns:a="http://schemas.openxmlformats.org/drawingml/2006/main" xmlns:r="http://schemas.openxmlformats.org/officeDocument/2006/relationships" xmlns:p="http://schemas.openxmlformats.org/presentationml/2006/main">
   <p:cSld>
     <p:spTree>
@@ -9760,7 +10692,7 @@
           <a:p>
             <a:fld id="{8F2D09F1-5447-4EA4-8EA6-0865537200C5}" type="slidenum">
               <a:rPr lang="en-CA" smtClean="0"/>
-              <a:t>15</a:t>
+              <a:t>16</a:t>
             </a:fld>
             <a:endParaRPr lang="en-CA" dirty="0"/>
           </a:p>
@@ -11578,7 +12510,7 @@
 </p:sld>
 </file>
 
-<file path=ppt/slides/slide16.xml><?xml version="1.0" encoding="utf-8"?>
+<file path=ppt/slides/slide17.xml><?xml version="1.0" encoding="utf-8"?>
 <p:sld xmlns:a="http://schemas.openxmlformats.org/drawingml/2006/main" xmlns:r="http://schemas.openxmlformats.org/officeDocument/2006/relationships" xmlns:p="http://schemas.openxmlformats.org/presentationml/2006/main">
   <p:cSld>
     <p:spTree>
@@ -11648,7 +12580,7 @@
           <a:p>
             <a:fld id="{8F2D09F1-5447-4EA4-8EA6-0865537200C5}" type="slidenum">
               <a:rPr lang="en-CA" smtClean="0"/>
-              <a:t>16</a:t>
+              <a:t>17</a:t>
             </a:fld>
             <a:endParaRPr lang="en-CA"/>
           </a:p>
@@ -11695,8 +12627,8 @@
           </a:p>
         </p:txBody>
       </p:sp>
-      <mc:AlternateContent xmlns:mc="http://schemas.openxmlformats.org/markup-compatibility/2006">
-        <mc:Choice xmlns:a14="http://schemas.microsoft.com/office/drawing/2010/main" Requires="a14">
+      <mc:AlternateContent xmlns:mc="http://schemas.openxmlformats.org/markup-compatibility/2006" xmlns:a14="http://schemas.microsoft.com/office/drawing/2010/main">
+        <mc:Choice Requires="a14">
           <p:sp>
             <p:nvSpPr>
               <p:cNvPr id="6" name="TextShape 2">
@@ -11945,7 +12877,7 @@
             </p:txBody>
           </p:sp>
         </mc:Choice>
-        <mc:Fallback>
+        <mc:Fallback xmlns="">
           <p:sp>
             <p:nvSpPr>
               <p:cNvPr id="6" name="TextShape 2">
@@ -11993,8 +12925,8 @@
           </p:sp>
         </mc:Fallback>
       </mc:AlternateContent>
-      <mc:AlternateContent xmlns:mc="http://schemas.openxmlformats.org/markup-compatibility/2006">
-        <mc:Choice xmlns:a14="http://schemas.microsoft.com/office/drawing/2010/main" Requires="a14">
+      <mc:AlternateContent xmlns:mc="http://schemas.openxmlformats.org/markup-compatibility/2006" xmlns:a14="http://schemas.microsoft.com/office/drawing/2010/main">
+        <mc:Choice Requires="a14">
           <p:sp>
             <p:nvSpPr>
               <p:cNvPr id="2" name="Rectangle 1">
@@ -12228,7 +13160,7 @@
             </p:txBody>
           </p:sp>
         </mc:Choice>
-        <mc:Fallback>
+        <mc:Fallback xmlns="">
           <p:sp>
             <p:nvSpPr>
               <p:cNvPr id="2" name="Rectangle 1">
@@ -13072,7 +14004,7 @@
 </p:sld>
 </file>
 
-<file path=ppt/slides/slide17.xml><?xml version="1.0" encoding="utf-8"?>
+<file path=ppt/slides/slide18.xml><?xml version="1.0" encoding="utf-8"?>
 <p:sld xmlns:a="http://schemas.openxmlformats.org/drawingml/2006/main" xmlns:r="http://schemas.openxmlformats.org/officeDocument/2006/relationships" xmlns:p="http://schemas.openxmlformats.org/presentationml/2006/main">
   <p:cSld>
     <p:spTree>
@@ -13117,7 +14049,7 @@
           <a:p>
             <a:fld id="{8F2D09F1-5447-4EA4-8EA6-0865537200C5}" type="slidenum">
               <a:rPr lang="en-CA" smtClean="0"/>
-              <a:t>17</a:t>
+              <a:t>18</a:t>
             </a:fld>
             <a:endParaRPr lang="en-CA"/>
           </a:p>
@@ -13164,8 +14096,8 @@
           </a:p>
         </p:txBody>
       </p:sp>
-      <mc:AlternateContent xmlns:mc="http://schemas.openxmlformats.org/markup-compatibility/2006">
-        <mc:Choice xmlns:a14="http://schemas.microsoft.com/office/drawing/2010/main" Requires="a14">
+      <mc:AlternateContent xmlns:mc="http://schemas.openxmlformats.org/markup-compatibility/2006" xmlns:a14="http://schemas.microsoft.com/office/drawing/2010/main">
+        <mc:Choice Requires="a14">
           <p:sp>
             <p:nvSpPr>
               <p:cNvPr id="8" name="TextShape 2">
@@ -13363,7 +14295,7 @@
             </p:txBody>
           </p:sp>
         </mc:Choice>
-        <mc:Fallback>
+        <mc:Fallback xmlns="">
           <p:sp>
             <p:nvSpPr>
               <p:cNvPr id="8" name="TextShape 2">
@@ -13411,8 +14343,8 @@
           </p:sp>
         </mc:Fallback>
       </mc:AlternateContent>
-      <mc:AlternateContent xmlns:mc="http://schemas.openxmlformats.org/markup-compatibility/2006">
-        <mc:Choice xmlns:a14="http://schemas.microsoft.com/office/drawing/2010/main" Requires="a14">
+      <mc:AlternateContent xmlns:mc="http://schemas.openxmlformats.org/markup-compatibility/2006" xmlns:a14="http://schemas.microsoft.com/office/drawing/2010/main">
+        <mc:Choice Requires="a14">
           <p:sp>
             <p:nvSpPr>
               <p:cNvPr id="9" name="Rectangle 8">
@@ -13985,7 +14917,7 @@
             </p:txBody>
           </p:sp>
         </mc:Choice>
-        <mc:Fallback>
+        <mc:Fallback xmlns="">
           <p:sp>
             <p:nvSpPr>
               <p:cNvPr id="9" name="Rectangle 8">
@@ -14282,8 +15214,8 @@
           </a:p>
         </p:txBody>
       </p:sp>
-      <mc:AlternateContent xmlns:mc="http://schemas.openxmlformats.org/markup-compatibility/2006">
-        <mc:Choice xmlns:a14="http://schemas.microsoft.com/office/drawing/2010/main" Requires="a14">
+      <mc:AlternateContent xmlns:mc="http://schemas.openxmlformats.org/markup-compatibility/2006" xmlns:a14="http://schemas.microsoft.com/office/drawing/2010/main">
+        <mc:Choice Requires="a14">
           <p:sp>
             <p:nvSpPr>
               <p:cNvPr id="23" name="Rectangle 22">
@@ -14354,7 +15286,7 @@
             </p:txBody>
           </p:sp>
         </mc:Choice>
-        <mc:Fallback>
+        <mc:Fallback xmlns="">
           <p:sp>
             <p:nvSpPr>
               <p:cNvPr id="23" name="Rectangle 22">
@@ -14399,8 +15331,8 @@
           </p:sp>
         </mc:Fallback>
       </mc:AlternateContent>
-      <mc:AlternateContent xmlns:mc="http://schemas.openxmlformats.org/markup-compatibility/2006">
-        <mc:Choice xmlns:a14="http://schemas.microsoft.com/office/drawing/2010/main" Requires="a14">
+      <mc:AlternateContent xmlns:mc="http://schemas.openxmlformats.org/markup-compatibility/2006" xmlns:a14="http://schemas.microsoft.com/office/drawing/2010/main">
+        <mc:Choice Requires="a14">
           <p:sp>
             <p:nvSpPr>
               <p:cNvPr id="24" name="Rectangle 23">
@@ -14449,7 +15381,7 @@
             </p:txBody>
           </p:sp>
         </mc:Choice>
-        <mc:Fallback>
+        <mc:Fallback xmlns="">
           <p:sp>
             <p:nvSpPr>
               <p:cNvPr id="24" name="Rectangle 23">
@@ -14494,8 +15426,8 @@
           </p:sp>
         </mc:Fallback>
       </mc:AlternateContent>
-      <mc:AlternateContent xmlns:mc="http://schemas.openxmlformats.org/markup-compatibility/2006">
-        <mc:Choice xmlns:a14="http://schemas.microsoft.com/office/drawing/2010/main" Requires="a14">
+      <mc:AlternateContent xmlns:mc="http://schemas.openxmlformats.org/markup-compatibility/2006" xmlns:a14="http://schemas.microsoft.com/office/drawing/2010/main">
+        <mc:Choice Requires="a14">
           <p:sp>
             <p:nvSpPr>
               <p:cNvPr id="25" name="Rectangle 24">
@@ -14581,7 +15513,7 @@
             </p:txBody>
           </p:sp>
         </mc:Choice>
-        <mc:Fallback>
+        <mc:Fallback xmlns="">
           <p:sp>
             <p:nvSpPr>
               <p:cNvPr id="25" name="Rectangle 24">
@@ -14626,8 +15558,8 @@
           </p:sp>
         </mc:Fallback>
       </mc:AlternateContent>
-      <mc:AlternateContent xmlns:mc="http://schemas.openxmlformats.org/markup-compatibility/2006">
-        <mc:Choice xmlns:a14="http://schemas.microsoft.com/office/drawing/2010/main" Requires="a14">
+      <mc:AlternateContent xmlns:mc="http://schemas.openxmlformats.org/markup-compatibility/2006" xmlns:a14="http://schemas.microsoft.com/office/drawing/2010/main">
+        <mc:Choice Requires="a14">
           <p:sp>
             <p:nvSpPr>
               <p:cNvPr id="26" name="Rectangle 25">
@@ -14713,7 +15645,7 @@
             </p:txBody>
           </p:sp>
         </mc:Choice>
-        <mc:Fallback>
+        <mc:Fallback xmlns="">
           <p:sp>
             <p:nvSpPr>
               <p:cNvPr id="26" name="Rectangle 25">
@@ -14758,8 +15690,8 @@
           </p:sp>
         </mc:Fallback>
       </mc:AlternateContent>
-      <mc:AlternateContent xmlns:mc="http://schemas.openxmlformats.org/markup-compatibility/2006">
-        <mc:Choice xmlns:a14="http://schemas.microsoft.com/office/drawing/2010/main" Requires="a14">
+      <mc:AlternateContent xmlns:mc="http://schemas.openxmlformats.org/markup-compatibility/2006" xmlns:a14="http://schemas.microsoft.com/office/drawing/2010/main">
+        <mc:Choice Requires="a14">
           <p:sp>
             <p:nvSpPr>
               <p:cNvPr id="27" name="Rectangle 26">
@@ -14845,7 +15777,7 @@
             </p:txBody>
           </p:sp>
         </mc:Choice>
-        <mc:Fallback>
+        <mc:Fallback xmlns="">
           <p:sp>
             <p:nvSpPr>
               <p:cNvPr id="27" name="Rectangle 26">
@@ -14989,7 +15921,7 @@
 </p:sld>
 </file>
 
-<file path=ppt/slides/slide18.xml><?xml version="1.0" encoding="utf-8"?>
+<file path=ppt/slides/slide19.xml><?xml version="1.0" encoding="utf-8"?>
 <p:sld xmlns:a="http://schemas.openxmlformats.org/drawingml/2006/main" xmlns:r="http://schemas.openxmlformats.org/officeDocument/2006/relationships" xmlns:p="http://schemas.openxmlformats.org/presentationml/2006/main">
   <p:cSld>
     <p:spTree>
@@ -15029,7 +15961,7 @@
           <a:p>
             <a:fld id="{8F2D09F1-5447-4EA4-8EA6-0865537200C5}" type="slidenum">
               <a:rPr lang="en-CA" smtClean="0"/>
-              <a:t>18</a:t>
+              <a:t>19</a:t>
             </a:fld>
             <a:endParaRPr lang="en-CA"/>
           </a:p>
@@ -15796,7 +16728,255 @@
 </p:sld>
 </file>
 
-<file path=ppt/slides/slide19.xml><?xml version="1.0" encoding="utf-8"?>
+<file path=ppt/slides/slide2.xml><?xml version="1.0" encoding="utf-8"?>
+<p:sld xmlns:a="http://schemas.openxmlformats.org/drawingml/2006/main" xmlns:r="http://schemas.openxmlformats.org/officeDocument/2006/relationships" xmlns:p="http://schemas.openxmlformats.org/presentationml/2006/main">
+  <p:cSld>
+    <p:spTree>
+      <p:nvGrpSpPr>
+        <p:cNvPr id="1" name=""/>
+        <p:cNvGrpSpPr/>
+        <p:nvPr/>
+      </p:nvGrpSpPr>
+      <p:grpSpPr>
+        <a:xfrm>
+          <a:off x="0" y="0"/>
+          <a:ext cx="0" cy="0"/>
+          <a:chOff x="0" y="0"/>
+          <a:chExt cx="0" cy="0"/>
+        </a:xfrm>
+      </p:grpSpPr>
+      <p:sp>
+        <p:nvSpPr>
+          <p:cNvPr id="4" name="Slide Number Placeholder 3">
+            <a:extLst>
+              <a:ext uri="{FF2B5EF4-FFF2-40B4-BE49-F238E27FC236}">
+                <a16:creationId xmlns:a16="http://schemas.microsoft.com/office/drawing/2014/main" id="{BB42BA6F-63F1-47A7-9EC4-AEB3F8AEE033}"/>
+              </a:ext>
+            </a:extLst>
+          </p:cNvPr>
+          <p:cNvSpPr>
+            <a:spLocks noGrp="1"/>
+          </p:cNvSpPr>
+          <p:nvPr>
+            <p:ph type="sldNum" sz="quarter" idx="12"/>
+          </p:nvPr>
+        </p:nvSpPr>
+        <p:spPr/>
+        <p:txBody>
+          <a:bodyPr/>
+          <a:lstStyle/>
+          <a:p>
+            <a:fld id="{8F2D09F1-5447-4EA4-8EA6-0865537200C5}" type="slidenum">
+              <a:rPr lang="en-CA" smtClean="0"/>
+              <a:t>2</a:t>
+            </a:fld>
+            <a:endParaRPr lang="en-CA"/>
+          </a:p>
+        </p:txBody>
+      </p:sp>
+      <p:sp>
+        <p:nvSpPr>
+          <p:cNvPr id="5" name="TextShape 1">
+            <a:extLst>
+              <a:ext uri="{FF2B5EF4-FFF2-40B4-BE49-F238E27FC236}">
+                <a16:creationId xmlns:a16="http://schemas.microsoft.com/office/drawing/2014/main" id="{4E464BCD-5165-4EA8-A7C4-01702A446797}"/>
+              </a:ext>
+            </a:extLst>
+          </p:cNvPr>
+          <p:cNvSpPr txBox="1"/>
+          <p:nvPr/>
+        </p:nvSpPr>
+        <p:spPr>
+          <a:xfrm>
+            <a:off x="720000" y="300960"/>
+            <a:ext cx="8855640" cy="1262520"/>
+          </a:xfrm>
+          <a:prstGeom prst="rect">
+            <a:avLst/>
+          </a:prstGeom>
+          <a:noFill/>
+          <a:ln>
+            <a:noFill/>
+          </a:ln>
+        </p:spPr>
+        <p:txBody>
+          <a:bodyPr lIns="0" tIns="0" rIns="0" bIns="0" anchor="ctr"/>
+          <a:lstStyle/>
+          <a:p>
+            <a:r>
+              <a:rPr lang="en-CA" sz="4400" b="1" strike="noStrike" spc="-1" dirty="0">
+                <a:solidFill>
+                  <a:srgbClr val="333333"/>
+                </a:solidFill>
+                <a:latin typeface="Noto Sans Regular"/>
+              </a:rPr>
+              <a:t>Outline</a:t>
+            </a:r>
+          </a:p>
+        </p:txBody>
+      </p:sp>
+      <p:sp>
+        <p:nvSpPr>
+          <p:cNvPr id="6" name="TextShape 2">
+            <a:extLst>
+              <a:ext uri="{FF2B5EF4-FFF2-40B4-BE49-F238E27FC236}">
+                <a16:creationId xmlns:a16="http://schemas.microsoft.com/office/drawing/2014/main" id="{60BEF98C-8896-4CC1-BA48-04B35A72CF20}"/>
+              </a:ext>
+            </a:extLst>
+          </p:cNvPr>
+          <p:cNvSpPr txBox="1"/>
+          <p:nvPr/>
+        </p:nvSpPr>
+        <p:spPr>
+          <a:xfrm>
+            <a:off x="252000" y="1767515"/>
+            <a:ext cx="8855640" cy="4384800"/>
+          </a:xfrm>
+          <a:prstGeom prst="rect">
+            <a:avLst/>
+          </a:prstGeom>
+          <a:noFill/>
+          <a:ln>
+            <a:noFill/>
+          </a:ln>
+        </p:spPr>
+        <p:txBody>
+          <a:bodyPr lIns="0" tIns="0" rIns="0" bIns="0"/>
+          <a:lstStyle/>
+          <a:p>
+            <a:pPr marL="432000" indent="-324000">
+              <a:spcAft>
+                <a:spcPts val="1414"/>
+              </a:spcAft>
+              <a:buClr>
+                <a:srgbClr val="EF2929"/>
+              </a:buClr>
+              <a:buSzPct val="45000"/>
+              <a:buFont typeface="Wingdings" charset="2"/>
+              <a:buChar char=""/>
+            </a:pPr>
+            <a:r>
+              <a:rPr lang="en-CA" sz="2400" spc="-1" dirty="0">
+                <a:solidFill>
+                  <a:srgbClr val="333333"/>
+                </a:solidFill>
+                <a:latin typeface="Noto Sans Regular"/>
+              </a:rPr>
+              <a:t>Basic matrix and vector operations review</a:t>
+            </a:r>
+          </a:p>
+          <a:p>
+            <a:pPr marL="432000" indent="-324000">
+              <a:spcAft>
+                <a:spcPts val="1414"/>
+              </a:spcAft>
+              <a:buClr>
+                <a:srgbClr val="EF2929"/>
+              </a:buClr>
+              <a:buSzPct val="45000"/>
+              <a:buFont typeface="Wingdings" charset="2"/>
+              <a:buChar char=""/>
+            </a:pPr>
+            <a:r>
+              <a:rPr lang="en-CA" sz="2400" spc="-1" dirty="0">
+                <a:solidFill>
+                  <a:srgbClr val="333333"/>
+                </a:solidFill>
+                <a:latin typeface="Noto Sans Regular"/>
+              </a:rPr>
+              <a:t>Coordinate transforms</a:t>
+            </a:r>
+            <a:endParaRPr lang="en-CA" sz="2400" b="0" strike="noStrike" spc="-1" dirty="0">
+              <a:solidFill>
+                <a:srgbClr val="333333"/>
+              </a:solidFill>
+              <a:latin typeface="Noto Sans Regular"/>
+            </a:endParaRPr>
+          </a:p>
+          <a:p>
+            <a:pPr marL="432000" indent="-324000">
+              <a:spcAft>
+                <a:spcPts val="1414"/>
+              </a:spcAft>
+              <a:buClr>
+                <a:srgbClr val="EF2929"/>
+              </a:buClr>
+              <a:buSzPct val="45000"/>
+              <a:buFont typeface="Wingdings" charset="2"/>
+              <a:buChar char=""/>
+            </a:pPr>
+            <a:r>
+              <a:rPr lang="en-CA" sz="2400" b="0" strike="noStrike" spc="-1" dirty="0">
+                <a:solidFill>
+                  <a:srgbClr val="333333"/>
+                </a:solidFill>
+                <a:latin typeface="Noto Sans Regular"/>
+              </a:rPr>
+              <a:t>Optimization: Least Squares, Total Least Squares, </a:t>
+            </a:r>
+            <a:r>
+              <a:rPr lang="en-CA" sz="2400" spc="-1" dirty="0">
+                <a:solidFill>
+                  <a:srgbClr val="333333"/>
+                </a:solidFill>
+                <a:latin typeface="Noto Sans Regular"/>
+              </a:rPr>
+              <a:t>relation to SVD and </a:t>
+            </a:r>
+            <a:r>
+              <a:rPr lang="en-CA" sz="2400" spc="-1" dirty="0" err="1">
+                <a:solidFill>
+                  <a:srgbClr val="333333"/>
+                </a:solidFill>
+                <a:latin typeface="Noto Sans Regular"/>
+              </a:rPr>
+              <a:t>eigendecomposition</a:t>
+            </a:r>
+            <a:endParaRPr lang="en-CA" sz="2400" b="0" strike="noStrike" spc="-1" dirty="0">
+              <a:solidFill>
+                <a:srgbClr val="333333"/>
+              </a:solidFill>
+              <a:latin typeface="Noto Sans Regular"/>
+            </a:endParaRPr>
+          </a:p>
+          <a:p>
+            <a:pPr marL="432000" indent="-324000">
+              <a:spcAft>
+                <a:spcPts val="1414"/>
+              </a:spcAft>
+              <a:buClr>
+                <a:srgbClr val="EF2929"/>
+              </a:buClr>
+              <a:buSzPct val="45000"/>
+              <a:buFont typeface="Wingdings" charset="2"/>
+              <a:buChar char=""/>
+            </a:pPr>
+            <a:r>
+              <a:rPr lang="en-CA" sz="2400" b="0" strike="noStrike" spc="-1" dirty="0">
+                <a:solidFill>
+                  <a:srgbClr val="333333"/>
+                </a:solidFill>
+                <a:latin typeface="Noto Sans Regular"/>
+              </a:rPr>
+              <a:t>Optional ROS coordinate transform exercise</a:t>
+            </a:r>
+          </a:p>
+        </p:txBody>
+      </p:sp>
+    </p:spTree>
+    <p:extLst>
+      <p:ext uri="{BB962C8B-B14F-4D97-AF65-F5344CB8AC3E}">
+        <p14:creationId xmlns:p14="http://schemas.microsoft.com/office/powerpoint/2010/main" val="150097050"/>
+      </p:ext>
+    </p:extLst>
+  </p:cSld>
+  <p:clrMapOvr>
+    <a:masterClrMapping/>
+  </p:clrMapOvr>
+</p:sld>
+</file>
+
+<file path=ppt/slides/slide20.xml><?xml version="1.0" encoding="utf-8"?>
 <p:sld xmlns:a="http://schemas.openxmlformats.org/drawingml/2006/main" xmlns:r="http://schemas.openxmlformats.org/officeDocument/2006/relationships" xmlns:p="http://schemas.openxmlformats.org/presentationml/2006/main">
   <p:cSld>
     <p:spTree>
@@ -15866,7 +17046,7 @@
           <a:p>
             <a:fld id="{8F2D09F1-5447-4EA4-8EA6-0865537200C5}" type="slidenum">
               <a:rPr lang="en-CA" smtClean="0"/>
-              <a:t>19</a:t>
+              <a:t>20</a:t>
             </a:fld>
             <a:endParaRPr lang="en-CA" dirty="0"/>
           </a:p>
@@ -16679,7 +17859,7 @@
 </p:sld>
 </file>
 
-<file path=ppt/slides/slide2.xml><?xml version="1.0" encoding="utf-8"?>
+<file path=ppt/slides/slide21.xml><?xml version="1.0" encoding="utf-8"?>
 <p:sld xmlns:a="http://schemas.openxmlformats.org/drawingml/2006/main" xmlns:r="http://schemas.openxmlformats.org/officeDocument/2006/relationships" xmlns:p="http://schemas.openxmlformats.org/presentationml/2006/main">
   <p:cSld>
     <p:spTree>
@@ -16719,231 +17899,7 @@
           <a:p>
             <a:fld id="{8F2D09F1-5447-4EA4-8EA6-0865537200C5}" type="slidenum">
               <a:rPr lang="en-CA" smtClean="0"/>
-              <a:t>2</a:t>
-            </a:fld>
-            <a:endParaRPr lang="en-CA"/>
-          </a:p>
-        </p:txBody>
-      </p:sp>
-      <p:sp>
-        <p:nvSpPr>
-          <p:cNvPr id="5" name="TextShape 1">
-            <a:extLst>
-              <a:ext uri="{FF2B5EF4-FFF2-40B4-BE49-F238E27FC236}">
-                <a16:creationId xmlns:a16="http://schemas.microsoft.com/office/drawing/2014/main" id="{4E464BCD-5165-4EA8-A7C4-01702A446797}"/>
-              </a:ext>
-            </a:extLst>
-          </p:cNvPr>
-          <p:cNvSpPr txBox="1"/>
-          <p:nvPr/>
-        </p:nvSpPr>
-        <p:spPr>
-          <a:xfrm>
-            <a:off x="720000" y="300960"/>
-            <a:ext cx="8855640" cy="1262520"/>
-          </a:xfrm>
-          <a:prstGeom prst="rect">
-            <a:avLst/>
-          </a:prstGeom>
-          <a:noFill/>
-          <a:ln>
-            <a:noFill/>
-          </a:ln>
-        </p:spPr>
-        <p:txBody>
-          <a:bodyPr lIns="0" tIns="0" rIns="0" bIns="0" anchor="ctr"/>
-          <a:lstStyle/>
-          <a:p>
-            <a:r>
-              <a:rPr lang="en-CA" sz="4400" b="1" strike="noStrike" spc="-1" dirty="0">
-                <a:solidFill>
-                  <a:srgbClr val="333333"/>
-                </a:solidFill>
-                <a:latin typeface="Noto Sans Regular"/>
-              </a:rPr>
-              <a:t>Outline</a:t>
-            </a:r>
-          </a:p>
-        </p:txBody>
-      </p:sp>
-      <p:sp>
-        <p:nvSpPr>
-          <p:cNvPr id="6" name="TextShape 2">
-            <a:extLst>
-              <a:ext uri="{FF2B5EF4-FFF2-40B4-BE49-F238E27FC236}">
-                <a16:creationId xmlns:a16="http://schemas.microsoft.com/office/drawing/2014/main" id="{60BEF98C-8896-4CC1-BA48-04B35A72CF20}"/>
-              </a:ext>
-            </a:extLst>
-          </p:cNvPr>
-          <p:cNvSpPr txBox="1"/>
-          <p:nvPr/>
-        </p:nvSpPr>
-        <p:spPr>
-          <a:xfrm>
-            <a:off x="252000" y="1767515"/>
-            <a:ext cx="8855640" cy="4384800"/>
-          </a:xfrm>
-          <a:prstGeom prst="rect">
-            <a:avLst/>
-          </a:prstGeom>
-          <a:noFill/>
-          <a:ln>
-            <a:noFill/>
-          </a:ln>
-        </p:spPr>
-        <p:txBody>
-          <a:bodyPr lIns="0" tIns="0" rIns="0" bIns="0"/>
-          <a:lstStyle/>
-          <a:p>
-            <a:pPr marL="432000" indent="-324000">
-              <a:spcAft>
-                <a:spcPts val="1414"/>
-              </a:spcAft>
-              <a:buClr>
-                <a:srgbClr val="EF2929"/>
-              </a:buClr>
-              <a:buSzPct val="45000"/>
-              <a:buFont typeface="Wingdings" charset="2"/>
-              <a:buChar char=""/>
-            </a:pPr>
-            <a:r>
-              <a:rPr lang="en-CA" sz="2400" spc="-1" dirty="0">
-                <a:solidFill>
-                  <a:srgbClr val="333333"/>
-                </a:solidFill>
-                <a:latin typeface="Noto Sans Regular"/>
-              </a:rPr>
-              <a:t>Basic matrix and vector operations review</a:t>
-            </a:r>
-          </a:p>
-          <a:p>
-            <a:pPr marL="432000" indent="-324000">
-              <a:spcAft>
-                <a:spcPts val="1414"/>
-              </a:spcAft>
-              <a:buClr>
-                <a:srgbClr val="EF2929"/>
-              </a:buClr>
-              <a:buSzPct val="45000"/>
-              <a:buFont typeface="Wingdings" charset="2"/>
-              <a:buChar char=""/>
-            </a:pPr>
-            <a:r>
-              <a:rPr lang="en-CA" sz="2400" spc="-1" dirty="0">
-                <a:solidFill>
-                  <a:srgbClr val="333333"/>
-                </a:solidFill>
-                <a:latin typeface="Noto Sans Regular"/>
-              </a:rPr>
-              <a:t>Coordinate transforms</a:t>
-            </a:r>
-            <a:endParaRPr lang="en-CA" sz="2400" b="0" strike="noStrike" spc="-1" dirty="0">
-              <a:solidFill>
-                <a:srgbClr val="333333"/>
-              </a:solidFill>
-              <a:latin typeface="Noto Sans Regular"/>
-            </a:endParaRPr>
-          </a:p>
-          <a:p>
-            <a:pPr marL="432000" indent="-324000">
-              <a:spcAft>
-                <a:spcPts val="1414"/>
-              </a:spcAft>
-              <a:buClr>
-                <a:srgbClr val="EF2929"/>
-              </a:buClr>
-              <a:buSzPct val="45000"/>
-              <a:buFont typeface="Wingdings" charset="2"/>
-              <a:buChar char=""/>
-            </a:pPr>
-            <a:r>
-              <a:rPr lang="en-CA" sz="2400" b="0" strike="noStrike" spc="-1" dirty="0">
-                <a:solidFill>
-                  <a:srgbClr val="333333"/>
-                </a:solidFill>
-                <a:latin typeface="Noto Sans Regular"/>
-              </a:rPr>
-              <a:t>Optimization: Least Squares, Total Least Squares, SVD relation</a:t>
-            </a:r>
-          </a:p>
-          <a:p>
-            <a:pPr marL="432000" indent="-324000">
-              <a:spcAft>
-                <a:spcPts val="1414"/>
-              </a:spcAft>
-              <a:buClr>
-                <a:srgbClr val="EF2929"/>
-              </a:buClr>
-              <a:buSzPct val="45000"/>
-              <a:buFont typeface="Wingdings" charset="2"/>
-              <a:buChar char=""/>
-            </a:pPr>
-            <a:r>
-              <a:rPr lang="en-CA" sz="2400" b="0" strike="noStrike" spc="-1" dirty="0">
-                <a:solidFill>
-                  <a:srgbClr val="333333"/>
-                </a:solidFill>
-                <a:latin typeface="Noto Sans Regular"/>
-              </a:rPr>
-              <a:t>ROS exercise</a:t>
-            </a:r>
-          </a:p>
-        </p:txBody>
-      </p:sp>
-    </p:spTree>
-    <p:extLst>
-      <p:ext uri="{BB962C8B-B14F-4D97-AF65-F5344CB8AC3E}">
-        <p14:creationId xmlns:p14="http://schemas.microsoft.com/office/powerpoint/2010/main" val="150097050"/>
-      </p:ext>
-    </p:extLst>
-  </p:cSld>
-  <p:clrMapOvr>
-    <a:masterClrMapping/>
-  </p:clrMapOvr>
-</p:sld>
-</file>
-
-<file path=ppt/slides/slide20.xml><?xml version="1.0" encoding="utf-8"?>
-<p:sld xmlns:a="http://schemas.openxmlformats.org/drawingml/2006/main" xmlns:r="http://schemas.openxmlformats.org/officeDocument/2006/relationships" xmlns:p="http://schemas.openxmlformats.org/presentationml/2006/main">
-  <p:cSld>
-    <p:spTree>
-      <p:nvGrpSpPr>
-        <p:cNvPr id="1" name=""/>
-        <p:cNvGrpSpPr/>
-        <p:nvPr/>
-      </p:nvGrpSpPr>
-      <p:grpSpPr>
-        <a:xfrm>
-          <a:off x="0" y="0"/>
-          <a:ext cx="0" cy="0"/>
-          <a:chOff x="0" y="0"/>
-          <a:chExt cx="0" cy="0"/>
-        </a:xfrm>
-      </p:grpSpPr>
-      <p:sp>
-        <p:nvSpPr>
-          <p:cNvPr id="4" name="Slide Number Placeholder 3">
-            <a:extLst>
-              <a:ext uri="{FF2B5EF4-FFF2-40B4-BE49-F238E27FC236}">
-                <a16:creationId xmlns:a16="http://schemas.microsoft.com/office/drawing/2014/main" id="{BB42BA6F-63F1-47A7-9EC4-AEB3F8AEE033}"/>
-              </a:ext>
-            </a:extLst>
-          </p:cNvPr>
-          <p:cNvSpPr>
-            <a:spLocks noGrp="1"/>
-          </p:cNvSpPr>
-          <p:nvPr>
-            <p:ph type="sldNum" sz="quarter" idx="12"/>
-          </p:nvPr>
-        </p:nvSpPr>
-        <p:spPr/>
-        <p:txBody>
-          <a:bodyPr/>
-          <a:lstStyle/>
-          <a:p>
-            <a:fld id="{8F2D09F1-5447-4EA4-8EA6-0865537200C5}" type="slidenum">
-              <a:rPr lang="en-CA" smtClean="0"/>
-              <a:t>20</a:t>
+              <a:t>21</a:t>
             </a:fld>
             <a:endParaRPr lang="en-CA"/>
           </a:p>
@@ -17150,8 +18106,8 @@
           </a:p>
         </p:txBody>
       </p:sp>
-      <mc:AlternateContent xmlns:mc="http://schemas.openxmlformats.org/markup-compatibility/2006">
-        <mc:Choice xmlns:a14="http://schemas.microsoft.com/office/drawing/2010/main" Requires="a14">
+      <mc:AlternateContent xmlns:mc="http://schemas.openxmlformats.org/markup-compatibility/2006" xmlns:a14="http://schemas.microsoft.com/office/drawing/2010/main">
+        <mc:Choice Requires="a14">
           <p:sp>
             <p:nvSpPr>
               <p:cNvPr id="2" name="Rectangle 1">
@@ -17995,7 +18951,7 @@
             </p:txBody>
           </p:sp>
         </mc:Choice>
-        <mc:Fallback>
+        <mc:Fallback xmlns="">
           <p:sp>
             <p:nvSpPr>
               <p:cNvPr id="2" name="Rectangle 1">
@@ -18040,8 +18996,8 @@
           </p:sp>
         </mc:Fallback>
       </mc:AlternateContent>
-      <mc:AlternateContent xmlns:mc="http://schemas.openxmlformats.org/markup-compatibility/2006">
-        <mc:Choice xmlns:a14="http://schemas.microsoft.com/office/drawing/2010/main" Requires="a14">
+      <mc:AlternateContent xmlns:mc="http://schemas.openxmlformats.org/markup-compatibility/2006" xmlns:a14="http://schemas.microsoft.com/office/drawing/2010/main">
+        <mc:Choice Requires="a14">
           <p:sp>
             <p:nvSpPr>
               <p:cNvPr id="7" name="Rectangle 6">
@@ -18144,7 +19100,13 @@
                                 <a:rPr lang="en-CA" sz="2000" b="0" i="1" smtClean="0">
                                   <a:latin typeface="Cambria Math" panose="02040503050406030204" pitchFamily="18" charset="0"/>
                                 </a:rPr>
-                                <m:t>0.5</m:t>
+                                <m:t>0</m:t>
+                              </m:r>
+                              <m:r>
+                                <a:rPr lang="en-CA" sz="2000" b="0" i="1" smtClean="0">
+                                  <a:latin typeface="Cambria Math" panose="02040503050406030204" pitchFamily="18" charset="0"/>
+                                </a:rPr>
+                                <m:t>.5</m:t>
                               </m:r>
                             </m:e>
                           </m:mr>
@@ -18539,7 +19501,13 @@
                                 <a:rPr lang="en-CA" sz="2000" b="0" i="1" smtClean="0">
                                   <a:latin typeface="Cambria Math" panose="02040503050406030204" pitchFamily="18" charset="0"/>
                                 </a:rPr>
-                                <m:t>0.5</m:t>
+                                <m:t>0</m:t>
+                              </m:r>
+                              <m:r>
+                                <a:rPr lang="en-CA" sz="2000" b="0" i="1" smtClean="0">
+                                  <a:latin typeface="Cambria Math" panose="02040503050406030204" pitchFamily="18" charset="0"/>
+                                </a:rPr>
+                                <m:t>.5</m:t>
                               </m:r>
                             </m:e>
                           </m:mr>
@@ -18656,7 +19624,7 @@
             </p:txBody>
           </p:sp>
         </mc:Choice>
-        <mc:Fallback>
+        <mc:Fallback xmlns="">
           <p:sp>
             <p:nvSpPr>
               <p:cNvPr id="7" name="Rectangle 6">
@@ -18714,7 +19682,7 @@
 </p:sld>
 </file>
 
-<file path=ppt/slides/slide21.xml><?xml version="1.0" encoding="utf-8"?>
+<file path=ppt/slides/slide22.xml><?xml version="1.0" encoding="utf-8"?>
 <p:sld xmlns:a="http://schemas.openxmlformats.org/drawingml/2006/main" xmlns:r="http://schemas.openxmlformats.org/officeDocument/2006/relationships" xmlns:p="http://schemas.openxmlformats.org/presentationml/2006/main">
   <p:cSld>
     <p:spTree>
@@ -18754,7 +19722,7 @@
           <a:p>
             <a:fld id="{8F2D09F1-5447-4EA4-8EA6-0865537200C5}" type="slidenum">
               <a:rPr lang="en-CA" smtClean="0"/>
-              <a:t>21</a:t>
+              <a:t>22</a:t>
             </a:fld>
             <a:endParaRPr lang="en-CA"/>
           </a:p>
@@ -19413,7 +20381,7 @@
 </p:sld>
 </file>
 
-<file path=ppt/slides/slide22.xml><?xml version="1.0" encoding="utf-8"?>
+<file path=ppt/slides/slide23.xml><?xml version="1.0" encoding="utf-8"?>
 <p:sld xmlns:a="http://schemas.openxmlformats.org/drawingml/2006/main" xmlns:r="http://schemas.openxmlformats.org/officeDocument/2006/relationships" xmlns:p="http://schemas.openxmlformats.org/presentationml/2006/main">
   <p:cSld>
     <p:spTree>
@@ -19468,7 +20436,7 @@
                 </a:solidFill>
                 <a:latin typeface="Noto Sans Regular"/>
               </a:rPr>
-              <a:t>Optimization</a:t>
+              <a:t>Optimization and Decomposition Methods</a:t>
             </a:r>
           </a:p>
         </p:txBody>
@@ -19486,7 +20454,7 @@
 </p:sld>
 </file>
 
-<file path=ppt/slides/slide23.xml><?xml version="1.0" encoding="utf-8"?>
+<file path=ppt/slides/slide24.xml><?xml version="1.0" encoding="utf-8"?>
 <p:sld xmlns:a="http://schemas.openxmlformats.org/drawingml/2006/main" xmlns:r="http://schemas.openxmlformats.org/officeDocument/2006/relationships" xmlns:p="http://schemas.openxmlformats.org/presentationml/2006/main">
   <p:cSld>
     <p:spTree>
@@ -19526,7 +20494,7 @@
           <a:p>
             <a:fld id="{8F2D09F1-5447-4EA4-8EA6-0865537200C5}" type="slidenum">
               <a:rPr lang="en-CA" smtClean="0"/>
-              <a:t>23</a:t>
+              <a:t>24</a:t>
             </a:fld>
             <a:endParaRPr lang="en-CA"/>
           </a:p>
@@ -19573,8 +20541,8 @@
           </a:p>
         </p:txBody>
       </p:sp>
-      <mc:AlternateContent xmlns:mc="http://schemas.openxmlformats.org/markup-compatibility/2006">
-        <mc:Choice xmlns:a14="http://schemas.microsoft.com/office/drawing/2010/main" Requires="a14">
+      <mc:AlternateContent xmlns:mc="http://schemas.openxmlformats.org/markup-compatibility/2006" xmlns:a14="http://schemas.microsoft.com/office/drawing/2010/main">
+        <mc:Choice Requires="a14">
           <p:sp>
             <p:nvSpPr>
               <p:cNvPr id="6" name="TextShape 2">
@@ -20419,7 +21387,7 @@
             </p:txBody>
           </p:sp>
         </mc:Choice>
-        <mc:Fallback>
+        <mc:Fallback xmlns="">
           <p:sp>
             <p:nvSpPr>
               <p:cNvPr id="6" name="TextShape 2">
@@ -20480,7 +21448,7 @@
 </p:sld>
 </file>
 
-<file path=ppt/slides/slide24.xml><?xml version="1.0" encoding="utf-8"?>
+<file path=ppt/slides/slide25.xml><?xml version="1.0" encoding="utf-8"?>
 <p:sld xmlns:a="http://schemas.openxmlformats.org/drawingml/2006/main" xmlns:r="http://schemas.openxmlformats.org/officeDocument/2006/relationships" xmlns:p="http://schemas.openxmlformats.org/presentationml/2006/main">
   <p:cSld>
     <p:spTree>
@@ -20520,7 +21488,7 @@
           <a:p>
             <a:fld id="{8F2D09F1-5447-4EA4-8EA6-0865537200C5}" type="slidenum">
               <a:rPr lang="en-CA" smtClean="0"/>
-              <a:t>24</a:t>
+              <a:t>25</a:t>
             </a:fld>
             <a:endParaRPr lang="en-CA"/>
           </a:p>
@@ -21705,7 +22673,7 @@
 </p:sld>
 </file>
 
-<file path=ppt/slides/slide25.xml><?xml version="1.0" encoding="utf-8"?>
+<file path=ppt/slides/slide26.xml><?xml version="1.0" encoding="utf-8"?>
 <p:sld xmlns:a="http://schemas.openxmlformats.org/drawingml/2006/main" xmlns:r="http://schemas.openxmlformats.org/officeDocument/2006/relationships" xmlns:p="http://schemas.openxmlformats.org/presentationml/2006/main">
   <p:cSld>
     <p:spTree>
@@ -21745,7 +22713,7 @@
           <a:p>
             <a:fld id="{8F2D09F1-5447-4EA4-8EA6-0865537200C5}" type="slidenum">
               <a:rPr lang="en-CA" smtClean="0"/>
-              <a:t>25</a:t>
+              <a:t>26</a:t>
             </a:fld>
             <a:endParaRPr lang="en-CA"/>
           </a:p>
@@ -21792,8 +22760,8 @@
           </a:p>
         </p:txBody>
       </p:sp>
-      <mc:AlternateContent xmlns:mc="http://schemas.openxmlformats.org/markup-compatibility/2006">
-        <mc:Choice xmlns:a14="http://schemas.microsoft.com/office/drawing/2010/main" Requires="a14">
+      <mc:AlternateContent xmlns:mc="http://schemas.openxmlformats.org/markup-compatibility/2006" xmlns:a14="http://schemas.microsoft.com/office/drawing/2010/main">
+        <mc:Choice Requires="a14">
           <p:sp>
             <p:nvSpPr>
               <p:cNvPr id="6" name="TextShape 2">
@@ -22297,7 +23265,7 @@
             </p:txBody>
           </p:sp>
         </mc:Choice>
-        <mc:Fallback>
+        <mc:Fallback xmlns="">
           <p:sp>
             <p:nvSpPr>
               <p:cNvPr id="6" name="TextShape 2">
@@ -22388,7 +23356,7 @@
 </p:sld>
 </file>
 
-<file path=ppt/slides/slide26.xml><?xml version="1.0" encoding="utf-8"?>
+<file path=ppt/slides/slide27.xml><?xml version="1.0" encoding="utf-8"?>
 <p:sld xmlns:a="http://schemas.openxmlformats.org/drawingml/2006/main" xmlns:r="http://schemas.openxmlformats.org/officeDocument/2006/relationships" xmlns:p="http://schemas.openxmlformats.org/presentationml/2006/main">
   <p:cSld>
     <p:spTree>
@@ -22428,7 +23396,7 @@
           <a:p>
             <a:fld id="{8F2D09F1-5447-4EA4-8EA6-0865537200C5}" type="slidenum">
               <a:rPr lang="en-CA" smtClean="0"/>
-              <a:t>26</a:t>
+              <a:t>27</a:t>
             </a:fld>
             <a:endParaRPr lang="en-CA"/>
           </a:p>
@@ -23738,7 +24706,7 @@
 </p:sld>
 </file>
 
-<file path=ppt/slides/slide27.xml><?xml version="1.0" encoding="utf-8"?>
+<file path=ppt/slides/slide28.xml><?xml version="1.0" encoding="utf-8"?>
 <p:sld xmlns:a="http://schemas.openxmlformats.org/drawingml/2006/main" xmlns:r="http://schemas.openxmlformats.org/officeDocument/2006/relationships" xmlns:p="http://schemas.openxmlformats.org/presentationml/2006/main">
   <p:cSld>
     <p:spTree>
@@ -23778,7 +24746,7 @@
           <a:p>
             <a:fld id="{8F2D09F1-5447-4EA4-8EA6-0865537200C5}" type="slidenum">
               <a:rPr lang="en-CA" smtClean="0"/>
-              <a:t>27</a:t>
+              <a:t>28</a:t>
             </a:fld>
             <a:endParaRPr lang="en-CA"/>
           </a:p>
@@ -24029,8 +24997,8 @@
           </p:sp>
         </mc:Fallback>
       </mc:AlternateContent>
-      <mc:AlternateContent xmlns:mc="http://schemas.openxmlformats.org/markup-compatibility/2006">
-        <mc:Choice xmlns:a14="http://schemas.microsoft.com/office/drawing/2010/main" Requires="a14">
+      <mc:AlternateContent xmlns:mc="http://schemas.openxmlformats.org/markup-compatibility/2006" xmlns:a14="http://schemas.microsoft.com/office/drawing/2010/main">
+        <mc:Choice Requires="a14">
           <p:sp>
             <p:nvSpPr>
               <p:cNvPr id="2" name="TextBox 1">
@@ -24141,7 +25109,7 @@
             </p:txBody>
           </p:sp>
         </mc:Choice>
-        <mc:Fallback>
+        <mc:Fallback xmlns="">
           <p:sp>
             <p:nvSpPr>
               <p:cNvPr id="2" name="TextBox 1">
@@ -24380,7 +25348,7 @@
 </p:sld>
 </file>
 
-<file path=ppt/slides/slide28.xml><?xml version="1.0" encoding="utf-8"?>
+<file path=ppt/slides/slide29.xml><?xml version="1.0" encoding="utf-8"?>
 <p:sld xmlns:a="http://schemas.openxmlformats.org/drawingml/2006/main" xmlns:r="http://schemas.openxmlformats.org/officeDocument/2006/relationships" xmlns:p="http://schemas.openxmlformats.org/presentationml/2006/main">
   <p:cSld>
     <p:spTree>
@@ -24420,7 +25388,7 @@
           <a:p>
             <a:fld id="{8F2D09F1-5447-4EA4-8EA6-0865537200C5}" type="slidenum">
               <a:rPr lang="en-CA" smtClean="0"/>
-              <a:t>28</a:t>
+              <a:t>29</a:t>
             </a:fld>
             <a:endParaRPr lang="en-CA" dirty="0"/>
           </a:p>
@@ -24564,8 +25532,8 @@
           </a:p>
         </p:txBody>
       </p:sp>
-      <mc:AlternateContent xmlns:mc="http://schemas.openxmlformats.org/markup-compatibility/2006">
-        <mc:Choice xmlns:a14="http://schemas.microsoft.com/office/drawing/2010/main" Requires="a14">
+      <mc:AlternateContent xmlns:mc="http://schemas.openxmlformats.org/markup-compatibility/2006" xmlns:a14="http://schemas.microsoft.com/office/drawing/2010/main">
+        <mc:Choice Requires="a14">
           <p:sp>
             <p:nvSpPr>
               <p:cNvPr id="2" name="TextBox 1">
@@ -24699,7 +25667,7 @@
             </p:txBody>
           </p:sp>
         </mc:Choice>
-        <mc:Fallback>
+        <mc:Fallback xmlns="">
           <p:sp>
             <p:nvSpPr>
               <p:cNvPr id="2" name="TextBox 1">
@@ -24744,8 +25712,8 @@
           </p:sp>
         </mc:Fallback>
       </mc:AlternateContent>
-      <mc:AlternateContent xmlns:mc="http://schemas.openxmlformats.org/markup-compatibility/2006">
-        <mc:Choice xmlns:a14="http://schemas.microsoft.com/office/drawing/2010/main" Requires="a14">
+      <mc:AlternateContent xmlns:mc="http://schemas.openxmlformats.org/markup-compatibility/2006" xmlns:a14="http://schemas.microsoft.com/office/drawing/2010/main">
+        <mc:Choice Requires="a14">
           <p:sp>
             <p:nvSpPr>
               <p:cNvPr id="3" name="Rectangle 2">
@@ -24898,14 +25866,14 @@
                     </a:solidFill>
                     <a:latin typeface="Noto Sans Regular"/>
                   </a:rPr>
-                  <a:t> acts as constant scale </a:t>
+                  <a:t> acts as simple scaling </a:t>
                 </a:r>
                 <a14:m>
                   <m:oMath xmlns:m="http://schemas.openxmlformats.org/officeDocument/2006/math">
                     <m:d>
                       <m:dPr>
                         <m:ctrlPr>
-                          <a:rPr lang="en-CA" sz="2400" b="0" i="0" spc="-1" smtClean="0">
+                          <a:rPr lang="en-CA" sz="2400" b="0" i="1" spc="-1" smtClean="0">
                             <a:solidFill>
                               <a:srgbClr val="333333"/>
                             </a:solidFill>
@@ -24980,7 +25948,7 @@
             </p:txBody>
           </p:sp>
         </mc:Choice>
-        <mc:Fallback>
+        <mc:Fallback xmlns="">
           <p:sp>
             <p:nvSpPr>
               <p:cNvPr id="3" name="Rectangle 2">
@@ -25093,8 +26061,8 @@
           </a:p>
         </p:txBody>
       </p:sp>
-      <mc:AlternateContent xmlns:mc="http://schemas.openxmlformats.org/markup-compatibility/2006">
-        <mc:Choice xmlns:a14="http://schemas.microsoft.com/office/drawing/2010/main" Requires="a14">
+      <mc:AlternateContent xmlns:mc="http://schemas.openxmlformats.org/markup-compatibility/2006" xmlns:a14="http://schemas.microsoft.com/office/drawing/2010/main">
+        <mc:Choice Requires="a14">
           <p:sp>
             <p:nvSpPr>
               <p:cNvPr id="9" name="TextBox 8">
@@ -25123,6 +26091,7 @@
               </a:bodyPr>
               <a:lstStyle/>
               <a:p>
+                <a:pPr/>
                 <a14:m>
                   <m:oMathPara xmlns:m="http://schemas.openxmlformats.org/officeDocument/2006/math">
                     <m:oMathParaPr>
@@ -25259,7 +26228,7 @@
             </p:txBody>
           </p:sp>
         </mc:Choice>
-        <mc:Fallback>
+        <mc:Fallback xmlns="">
           <p:sp>
             <p:nvSpPr>
               <p:cNvPr id="9" name="TextBox 8">
@@ -25465,7 +26434,80 @@
 </p:sld>
 </file>
 
-<file path=ppt/slides/slide29.xml><?xml version="1.0" encoding="utf-8"?>
+<file path=ppt/slides/slide3.xml><?xml version="1.0" encoding="utf-8"?>
+<p:sld xmlns:a="http://schemas.openxmlformats.org/drawingml/2006/main" xmlns:r="http://schemas.openxmlformats.org/officeDocument/2006/relationships" xmlns:p="http://schemas.openxmlformats.org/presentationml/2006/main">
+  <p:cSld>
+    <p:spTree>
+      <p:nvGrpSpPr>
+        <p:cNvPr id="1" name=""/>
+        <p:cNvGrpSpPr/>
+        <p:nvPr/>
+      </p:nvGrpSpPr>
+      <p:grpSpPr>
+        <a:xfrm>
+          <a:off x="0" y="0"/>
+          <a:ext cx="0" cy="0"/>
+          <a:chOff x="0" y="0"/>
+          <a:chExt cx="0" cy="0"/>
+        </a:xfrm>
+      </p:grpSpPr>
+      <p:sp>
+        <p:nvSpPr>
+          <p:cNvPr id="6" name="TextShape 1">
+            <a:extLst>
+              <a:ext uri="{FF2B5EF4-FFF2-40B4-BE49-F238E27FC236}">
+                <a16:creationId xmlns:a16="http://schemas.microsoft.com/office/drawing/2014/main" id="{5198075E-8A47-443E-BF81-9B6A987451C8}"/>
+              </a:ext>
+            </a:extLst>
+          </p:cNvPr>
+          <p:cNvSpPr txBox="1"/>
+          <p:nvPr/>
+        </p:nvSpPr>
+        <p:spPr>
+          <a:xfrm>
+            <a:off x="792000" y="3993480"/>
+            <a:ext cx="8568000" cy="1661400"/>
+          </a:xfrm>
+          <a:prstGeom prst="rect">
+            <a:avLst/>
+          </a:prstGeom>
+          <a:noFill/>
+          <a:ln>
+            <a:noFill/>
+          </a:ln>
+        </p:spPr>
+        <p:txBody>
+          <a:bodyPr lIns="0" tIns="0" rIns="0" bIns="0" anchor="ctr">
+            <a:normAutofit/>
+          </a:bodyPr>
+          <a:lstStyle/>
+          <a:p>
+            <a:r>
+              <a:rPr lang="en-CA" sz="4800" b="1" strike="noStrike" spc="-1" dirty="0">
+                <a:solidFill>
+                  <a:srgbClr val="333333"/>
+                </a:solidFill>
+                <a:latin typeface="Noto Sans Regular"/>
+              </a:rPr>
+              <a:t>Basic Matrix and Vector Operations</a:t>
+            </a:r>
+          </a:p>
+        </p:txBody>
+      </p:sp>
+    </p:spTree>
+    <p:extLst>
+      <p:ext uri="{BB962C8B-B14F-4D97-AF65-F5344CB8AC3E}">
+        <p14:creationId xmlns:p14="http://schemas.microsoft.com/office/powerpoint/2010/main" val="2140260824"/>
+      </p:ext>
+    </p:extLst>
+  </p:cSld>
+  <p:clrMapOvr>
+    <a:masterClrMapping/>
+  </p:clrMapOvr>
+</p:sld>
+</file>
+
+<file path=ppt/slides/slide30.xml><?xml version="1.0" encoding="utf-8"?>
 <p:sld xmlns:a="http://schemas.openxmlformats.org/drawingml/2006/main" xmlns:r="http://schemas.openxmlformats.org/officeDocument/2006/relationships" xmlns:p="http://schemas.openxmlformats.org/presentationml/2006/main">
   <p:cSld>
     <p:spTree>
@@ -25505,7 +26547,7 @@
           <a:p>
             <a:fld id="{8F2D09F1-5447-4EA4-8EA6-0865537200C5}" type="slidenum">
               <a:rPr lang="en-CA" smtClean="0"/>
-              <a:t>29</a:t>
+              <a:t>30</a:t>
             </a:fld>
             <a:endParaRPr lang="en-CA"/>
           </a:p>
@@ -27350,80 +28392,7 @@
 </p:sld>
 </file>
 
-<file path=ppt/slides/slide3.xml><?xml version="1.0" encoding="utf-8"?>
-<p:sld xmlns:a="http://schemas.openxmlformats.org/drawingml/2006/main" xmlns:r="http://schemas.openxmlformats.org/officeDocument/2006/relationships" xmlns:p="http://schemas.openxmlformats.org/presentationml/2006/main">
-  <p:cSld>
-    <p:spTree>
-      <p:nvGrpSpPr>
-        <p:cNvPr id="1" name=""/>
-        <p:cNvGrpSpPr/>
-        <p:nvPr/>
-      </p:nvGrpSpPr>
-      <p:grpSpPr>
-        <a:xfrm>
-          <a:off x="0" y="0"/>
-          <a:ext cx="0" cy="0"/>
-          <a:chOff x="0" y="0"/>
-          <a:chExt cx="0" cy="0"/>
-        </a:xfrm>
-      </p:grpSpPr>
-      <p:sp>
-        <p:nvSpPr>
-          <p:cNvPr id="6" name="TextShape 1">
-            <a:extLst>
-              <a:ext uri="{FF2B5EF4-FFF2-40B4-BE49-F238E27FC236}">
-                <a16:creationId xmlns:a16="http://schemas.microsoft.com/office/drawing/2014/main" id="{5198075E-8A47-443E-BF81-9B6A987451C8}"/>
-              </a:ext>
-            </a:extLst>
-          </p:cNvPr>
-          <p:cNvSpPr txBox="1"/>
-          <p:nvPr/>
-        </p:nvSpPr>
-        <p:spPr>
-          <a:xfrm>
-            <a:off x="792000" y="3993480"/>
-            <a:ext cx="8568000" cy="1661400"/>
-          </a:xfrm>
-          <a:prstGeom prst="rect">
-            <a:avLst/>
-          </a:prstGeom>
-          <a:noFill/>
-          <a:ln>
-            <a:noFill/>
-          </a:ln>
-        </p:spPr>
-        <p:txBody>
-          <a:bodyPr lIns="0" tIns="0" rIns="0" bIns="0" anchor="ctr">
-            <a:normAutofit/>
-          </a:bodyPr>
-          <a:lstStyle/>
-          <a:p>
-            <a:r>
-              <a:rPr lang="en-CA" sz="4800" b="1" strike="noStrike" spc="-1" dirty="0">
-                <a:solidFill>
-                  <a:srgbClr val="333333"/>
-                </a:solidFill>
-                <a:latin typeface="Noto Sans Regular"/>
-              </a:rPr>
-              <a:t>Basic Matrix and Vector Operations</a:t>
-            </a:r>
-          </a:p>
-        </p:txBody>
-      </p:sp>
-    </p:spTree>
-    <p:extLst>
-      <p:ext uri="{BB962C8B-B14F-4D97-AF65-F5344CB8AC3E}">
-        <p14:creationId xmlns:p14="http://schemas.microsoft.com/office/powerpoint/2010/main" val="2140260824"/>
-      </p:ext>
-    </p:extLst>
-  </p:cSld>
-  <p:clrMapOvr>
-    <a:masterClrMapping/>
-  </p:clrMapOvr>
-</p:sld>
-</file>
-
-<file path=ppt/slides/slide30.xml><?xml version="1.0" encoding="utf-8"?>
+<file path=ppt/slides/slide31.xml><?xml version="1.0" encoding="utf-8"?>
 <p:sld xmlns:a="http://schemas.openxmlformats.org/drawingml/2006/main" xmlns:r="http://schemas.openxmlformats.org/officeDocument/2006/relationships" xmlns:p="http://schemas.openxmlformats.org/presentationml/2006/main">
   <p:cSld>
     <p:spTree>
@@ -27463,7 +28432,7 @@
           <a:p>
             <a:fld id="{8F2D09F1-5447-4EA4-8EA6-0865537200C5}" type="slidenum">
               <a:rPr lang="en-CA" smtClean="0"/>
-              <a:t>30</a:t>
+              <a:t>31</a:t>
             </a:fld>
             <a:endParaRPr lang="en-CA"/>
           </a:p>
@@ -27510,8 +28479,8 @@
           </a:p>
         </p:txBody>
       </p:sp>
-      <mc:AlternateContent xmlns:mc="http://schemas.openxmlformats.org/markup-compatibility/2006">
-        <mc:Choice xmlns:a14="http://schemas.microsoft.com/office/drawing/2010/main" Requires="a14">
+      <mc:AlternateContent xmlns:mc="http://schemas.openxmlformats.org/markup-compatibility/2006" xmlns:a14="http://schemas.microsoft.com/office/drawing/2010/main">
+        <mc:Choice Requires="a14">
           <p:sp>
             <p:nvSpPr>
               <p:cNvPr id="6" name="TextShape 2">
@@ -27700,7 +28669,7 @@
             </p:txBody>
           </p:sp>
         </mc:Choice>
-        <mc:Fallback>
+        <mc:Fallback xmlns="">
           <p:sp>
             <p:nvSpPr>
               <p:cNvPr id="6" name="TextShape 2">
@@ -27778,6 +28747,104 @@
           </a:prstGeom>
         </p:spPr>
       </p:pic>
+      <mc:AlternateContent xmlns:mc="http://schemas.openxmlformats.org/markup-compatibility/2006" xmlns:a14="http://schemas.microsoft.com/office/drawing/2010/main">
+        <mc:Choice Requires="a14">
+          <p:sp>
+            <p:nvSpPr>
+              <p:cNvPr id="2" name="TextBox 1">
+                <a:extLst>
+                  <a:ext uri="{FF2B5EF4-FFF2-40B4-BE49-F238E27FC236}">
+                    <a16:creationId xmlns:a16="http://schemas.microsoft.com/office/drawing/2014/main" id="{4438593B-4915-4DD5-9544-F71BB4A0D97E}"/>
+                  </a:ext>
+                </a:extLst>
+              </p:cNvPr>
+              <p:cNvSpPr txBox="1"/>
+              <p:nvPr/>
+            </p:nvSpPr>
+            <p:spPr>
+              <a:xfrm>
+                <a:off x="3600450" y="5938749"/>
+                <a:ext cx="428625" cy="430887"/>
+              </a:xfrm>
+              <a:prstGeom prst="rect">
+                <a:avLst/>
+              </a:prstGeom>
+              <a:solidFill>
+                <a:schemeClr val="bg1"/>
+              </a:solidFill>
+            </p:spPr>
+            <p:txBody>
+              <a:bodyPr wrap="square" rtlCol="0">
+                <a:spAutoFit/>
+              </a:bodyPr>
+              <a:lstStyle/>
+              <a:p>
+                <a:pPr/>
+                <a14:m>
+                  <m:oMathPara xmlns:m="http://schemas.openxmlformats.org/officeDocument/2006/math">
+                    <m:oMathParaPr>
+                      <m:jc m:val="centerGroup"/>
+                    </m:oMathParaPr>
+                    <m:oMath xmlns:m="http://schemas.openxmlformats.org/officeDocument/2006/math">
+                      <m:r>
+                        <a:rPr lang="en-CA" sz="2200" b="0" i="1" smtClean="0">
+                          <a:latin typeface="Cambria Math" panose="02040503050406030204" pitchFamily="18" charset="0"/>
+                        </a:rPr>
+                        <m:t>𝐴</m:t>
+                      </m:r>
+                    </m:oMath>
+                  </m:oMathPara>
+                </a14:m>
+                <a:endParaRPr lang="en-CA" sz="2200" dirty="0"/>
+              </a:p>
+            </p:txBody>
+          </p:sp>
+        </mc:Choice>
+        <mc:Fallback xmlns="">
+          <p:sp>
+            <p:nvSpPr>
+              <p:cNvPr id="2" name="TextBox 1">
+                <a:extLst>
+                  <a:ext uri="{FF2B5EF4-FFF2-40B4-BE49-F238E27FC236}">
+                    <a16:creationId xmlns:a16="http://schemas.microsoft.com/office/drawing/2014/main" id="{4438593B-4915-4DD5-9544-F71BB4A0D97E}"/>
+                  </a:ext>
+                </a:extLst>
+              </p:cNvPr>
+              <p:cNvSpPr txBox="1">
+                <a:spLocks noRot="1" noChangeAspect="1" noMove="1" noResize="1" noEditPoints="1" noAdjustHandles="1" noChangeArrowheads="1" noChangeShapeType="1" noTextEdit="1"/>
+              </p:cNvSpPr>
+              <p:nvPr/>
+            </p:nvSpPr>
+            <p:spPr>
+              <a:xfrm>
+                <a:off x="3600450" y="5938749"/>
+                <a:ext cx="428625" cy="430887"/>
+              </a:xfrm>
+              <a:prstGeom prst="rect">
+                <a:avLst/>
+              </a:prstGeom>
+              <a:blipFill>
+                <a:blip r:embed="rId4"/>
+                <a:stretch>
+                  <a:fillRect/>
+                </a:stretch>
+              </a:blipFill>
+            </p:spPr>
+            <p:txBody>
+              <a:bodyPr/>
+              <a:lstStyle/>
+              <a:p>
+                <a:r>
+                  <a:rPr lang="en-CA">
+                    <a:noFill/>
+                  </a:rPr>
+                  <a:t> </a:t>
+                </a:r>
+              </a:p>
+            </p:txBody>
+          </p:sp>
+        </mc:Fallback>
+      </mc:AlternateContent>
     </p:spTree>
     <p:extLst>
       <p:ext uri="{BB962C8B-B14F-4D97-AF65-F5344CB8AC3E}">
@@ -27791,7 +28858,7 @@
 </p:sld>
 </file>
 
-<file path=ppt/slides/slide31.xml><?xml version="1.0" encoding="utf-8"?>
+<file path=ppt/slides/slide32.xml><?xml version="1.0" encoding="utf-8"?>
 <p:sld xmlns:a="http://schemas.openxmlformats.org/drawingml/2006/main" xmlns:r="http://schemas.openxmlformats.org/officeDocument/2006/relationships" xmlns:p="http://schemas.openxmlformats.org/presentationml/2006/main">
   <p:cSld>
     <p:spTree>
@@ -27831,7 +28898,7 @@
           <a:p>
             <a:fld id="{8F2D09F1-5447-4EA4-8EA6-0865537200C5}" type="slidenum">
               <a:rPr lang="en-CA" smtClean="0"/>
-              <a:t>31</a:t>
+              <a:t>32</a:t>
             </a:fld>
             <a:endParaRPr lang="en-CA"/>
           </a:p>
@@ -27878,8 +28945,8 @@
           </a:p>
         </p:txBody>
       </p:sp>
-      <mc:AlternateContent xmlns:mc="http://schemas.openxmlformats.org/markup-compatibility/2006">
-        <mc:Choice xmlns:a14="http://schemas.microsoft.com/office/drawing/2010/main" Requires="a14">
+      <mc:AlternateContent xmlns:mc="http://schemas.openxmlformats.org/markup-compatibility/2006" xmlns:a14="http://schemas.microsoft.com/office/drawing/2010/main">
+        <mc:Choice Requires="a14">
           <p:sp>
             <p:nvSpPr>
               <p:cNvPr id="6" name="TextShape 2">
@@ -29101,7 +30168,7 @@
             </p:txBody>
           </p:sp>
         </mc:Choice>
-        <mc:Fallback>
+        <mc:Fallback xmlns="">
           <p:sp>
             <p:nvSpPr>
               <p:cNvPr id="6" name="TextShape 2">
@@ -29162,7 +30229,7 @@
 </p:sld>
 </file>
 
-<file path=ppt/slides/slide32.xml><?xml version="1.0" encoding="utf-8"?>
+<file path=ppt/slides/slide33.xml><?xml version="1.0" encoding="utf-8"?>
 <p:sld xmlns:a="http://schemas.openxmlformats.org/drawingml/2006/main" xmlns:r="http://schemas.openxmlformats.org/officeDocument/2006/relationships" xmlns:p="http://schemas.openxmlformats.org/presentationml/2006/main">
   <p:cSld>
     <p:spTree>
@@ -29202,7 +30269,7 @@
           <a:p>
             <a:fld id="{8F2D09F1-5447-4EA4-8EA6-0865537200C5}" type="slidenum">
               <a:rPr lang="en-CA" smtClean="0"/>
-              <a:t>32</a:t>
+              <a:t>33</a:t>
             </a:fld>
             <a:endParaRPr lang="en-CA"/>
           </a:p>
@@ -29249,8 +30316,8 @@
           </a:p>
         </p:txBody>
       </p:sp>
-      <mc:AlternateContent xmlns:mc="http://schemas.openxmlformats.org/markup-compatibility/2006">
-        <mc:Choice xmlns:a14="http://schemas.microsoft.com/office/drawing/2010/main" Requires="a14">
+      <mc:AlternateContent xmlns:mc="http://schemas.openxmlformats.org/markup-compatibility/2006" xmlns:a14="http://schemas.microsoft.com/office/drawing/2010/main">
+        <mc:Choice Requires="a14">
           <p:sp>
             <p:nvSpPr>
               <p:cNvPr id="6" name="TextShape 2">
@@ -30168,7 +31235,7 @@
             </p:txBody>
           </p:sp>
         </mc:Choice>
-        <mc:Fallback>
+        <mc:Fallback xmlns="">
           <p:sp>
             <p:nvSpPr>
               <p:cNvPr id="6" name="TextShape 2">
@@ -30277,7 +31344,7 @@
 </p:sld>
 </file>
 
-<file path=ppt/slides/slide33.xml><?xml version="1.0" encoding="utf-8"?>
+<file path=ppt/slides/slide34.xml><?xml version="1.0" encoding="utf-8"?>
 <p:sld xmlns:a="http://schemas.openxmlformats.org/drawingml/2006/main" xmlns:r="http://schemas.openxmlformats.org/officeDocument/2006/relationships" xmlns:p="http://schemas.openxmlformats.org/presentationml/2006/main">
   <p:cSld>
     <p:spTree>
@@ -30317,7 +31384,7 @@
           <a:p>
             <a:fld id="{8F2D09F1-5447-4EA4-8EA6-0865537200C5}" type="slidenum">
               <a:rPr lang="en-CA" smtClean="0"/>
-              <a:t>33</a:t>
+              <a:t>34</a:t>
             </a:fld>
             <a:endParaRPr lang="en-CA"/>
           </a:p>
@@ -30382,8 +31449,8 @@
           </a:p>
         </p:txBody>
       </p:sp>
-      <mc:AlternateContent xmlns:mc="http://schemas.openxmlformats.org/markup-compatibility/2006">
-        <mc:Choice xmlns:a14="http://schemas.microsoft.com/office/drawing/2010/main" Requires="a14">
+      <mc:AlternateContent xmlns:mc="http://schemas.openxmlformats.org/markup-compatibility/2006" xmlns:a14="http://schemas.microsoft.com/office/drawing/2010/main">
+        <mc:Choice Requires="a14">
           <p:sp>
             <p:nvSpPr>
               <p:cNvPr id="6" name="TextShape 2">
@@ -31195,7 +32262,7 @@
             </p:txBody>
           </p:sp>
         </mc:Choice>
-        <mc:Fallback>
+        <mc:Fallback xmlns="">
           <p:sp>
             <p:nvSpPr>
               <p:cNvPr id="6" name="TextShape 2">
@@ -32076,7 +33143,7 @@
 </p:sld>
 </file>
 
-<file path=ppt/slides/slide34.xml><?xml version="1.0" encoding="utf-8"?>
+<file path=ppt/slides/slide35.xml><?xml version="1.0" encoding="utf-8"?>
 <p:sld xmlns:a="http://schemas.openxmlformats.org/drawingml/2006/main" xmlns:r="http://schemas.openxmlformats.org/officeDocument/2006/relationships" xmlns:p="http://schemas.openxmlformats.org/presentationml/2006/main">
   <p:cSld>
     <p:spTree>
@@ -32221,7 +33288,7 @@
           <a:p>
             <a:fld id="{8F2D09F1-5447-4EA4-8EA6-0865537200C5}" type="slidenum">
               <a:rPr lang="en-CA" smtClean="0"/>
-              <a:t>34</a:t>
+              <a:t>35</a:t>
             </a:fld>
             <a:endParaRPr lang="en-CA"/>
           </a:p>
@@ -32267,7 +33334,7 @@
                 </a:solidFill>
                 <a:latin typeface="Noto Sans Regular"/>
               </a:rPr>
-              <a:t>ROS Exercise</a:t>
+              <a:t>Optional ROS Coordinate Frame Exercise</a:t>
             </a:r>
           </a:p>
         </p:txBody>
@@ -34120,8 +35187,8 @@
           </a:p>
         </p:txBody>
       </p:sp>
-      <mc:AlternateContent xmlns:mc="http://schemas.openxmlformats.org/markup-compatibility/2006">
-        <mc:Choice xmlns:a14="http://schemas.microsoft.com/office/drawing/2010/main" Requires="a14">
+      <mc:AlternateContent xmlns:mc="http://schemas.openxmlformats.org/markup-compatibility/2006" xmlns:a14="http://schemas.microsoft.com/office/drawing/2010/main">
+        <mc:Choice Requires="a14">
           <p:sp>
             <p:nvSpPr>
               <p:cNvPr id="6" name="TextShape 2">
@@ -34896,7 +35963,7 @@
             </p:txBody>
           </p:sp>
         </mc:Choice>
-        <mc:Fallback>
+        <mc:Fallback xmlns="">
           <p:sp>
             <p:nvSpPr>
               <p:cNvPr id="6" name="TextShape 2">
@@ -34958,7 +36025,7 @@
 </file>
 
 <file path=ppt/slides/slide7.xml><?xml version="1.0" encoding="utf-8"?>
-<p:sld xmlns:a="http://schemas.openxmlformats.org/drawingml/2006/main" xmlns:r="http://schemas.openxmlformats.org/officeDocument/2006/relationships" xmlns:p="http://schemas.openxmlformats.org/presentationml/2006/main" show="0">
+<p:sld xmlns:a="http://schemas.openxmlformats.org/drawingml/2006/main" xmlns:r="http://schemas.openxmlformats.org/officeDocument/2006/relationships" xmlns:p="http://schemas.openxmlformats.org/presentationml/2006/main">
   <p:cSld>
     <p:spTree>
       <p:nvGrpSpPr>
@@ -34998,6 +36065,1020 @@
             <a:fld id="{8F2D09F1-5447-4EA4-8EA6-0865537200C5}" type="slidenum">
               <a:rPr lang="en-CA" smtClean="0"/>
               <a:t>7</a:t>
+            </a:fld>
+            <a:endParaRPr lang="en-CA"/>
+          </a:p>
+        </p:txBody>
+      </p:sp>
+      <p:sp>
+        <p:nvSpPr>
+          <p:cNvPr id="5" name="TextShape 1">
+            <a:extLst>
+              <a:ext uri="{FF2B5EF4-FFF2-40B4-BE49-F238E27FC236}">
+                <a16:creationId xmlns:a16="http://schemas.microsoft.com/office/drawing/2014/main" id="{4E464BCD-5165-4EA8-A7C4-01702A446797}"/>
+              </a:ext>
+            </a:extLst>
+          </p:cNvPr>
+          <p:cNvSpPr txBox="1"/>
+          <p:nvPr/>
+        </p:nvSpPr>
+        <p:spPr>
+          <a:xfrm>
+            <a:off x="720000" y="300960"/>
+            <a:ext cx="8855640" cy="1262520"/>
+          </a:xfrm>
+          <a:prstGeom prst="rect">
+            <a:avLst/>
+          </a:prstGeom>
+          <a:noFill/>
+          <a:ln>
+            <a:noFill/>
+          </a:ln>
+        </p:spPr>
+        <p:txBody>
+          <a:bodyPr lIns="0" tIns="0" rIns="0" bIns="0" anchor="ctr"/>
+          <a:lstStyle/>
+          <a:p>
+            <a:r>
+              <a:rPr lang="en-CA" sz="4400" b="1" strike="noStrike" spc="-1" dirty="0">
+                <a:solidFill>
+                  <a:srgbClr val="333333"/>
+                </a:solidFill>
+                <a:latin typeface="Noto Sans Regular"/>
+              </a:rPr>
+              <a:t>Vector Norms</a:t>
+            </a:r>
+          </a:p>
+        </p:txBody>
+      </p:sp>
+      <p:sp>
+        <p:nvSpPr>
+          <p:cNvPr id="6" name="TextShape 2">
+            <a:extLst>
+              <a:ext uri="{FF2B5EF4-FFF2-40B4-BE49-F238E27FC236}">
+                <a16:creationId xmlns:a16="http://schemas.microsoft.com/office/drawing/2014/main" id="{60BEF98C-8896-4CC1-BA48-04B35A72CF20}"/>
+              </a:ext>
+            </a:extLst>
+          </p:cNvPr>
+          <p:cNvSpPr txBox="1"/>
+          <p:nvPr/>
+        </p:nvSpPr>
+        <p:spPr>
+          <a:xfrm>
+            <a:off x="153677" y="1517501"/>
+            <a:ext cx="8990323" cy="3139892"/>
+          </a:xfrm>
+          <a:prstGeom prst="rect">
+            <a:avLst/>
+          </a:prstGeom>
+          <a:noFill/>
+          <a:ln>
+            <a:noFill/>
+          </a:ln>
+        </p:spPr>
+        <p:txBody>
+          <a:bodyPr lIns="0" tIns="0" rIns="0" bIns="0"/>
+          <a:lstStyle/>
+          <a:p>
+            <a:pPr marL="108000">
+              <a:spcAft>
+                <a:spcPts val="1414"/>
+              </a:spcAft>
+              <a:buClr>
+                <a:srgbClr val="EF2929"/>
+              </a:buClr>
+              <a:buSzPct val="100000"/>
+            </a:pPr>
+            <a:r>
+              <a:rPr lang="en-CA" sz="2400" b="1" strike="noStrike" spc="-1" dirty="0">
+                <a:solidFill>
+                  <a:srgbClr val="333333"/>
+                </a:solidFill>
+                <a:latin typeface="Noto Sans Regular"/>
+              </a:rPr>
+              <a:t>Norm Function: </a:t>
+            </a:r>
+            <a:r>
+              <a:rPr lang="en-CA" sz="2400" strike="noStrike" spc="-1" dirty="0">
+                <a:solidFill>
+                  <a:srgbClr val="333333"/>
+                </a:solidFill>
+                <a:latin typeface="Noto Sans Regular"/>
+              </a:rPr>
+              <a:t>Assigns a positive length to a vector </a:t>
+            </a:r>
+          </a:p>
+          <a:p>
+            <a:pPr marL="450900" indent="-342900">
+              <a:spcAft>
+                <a:spcPts val="1414"/>
+              </a:spcAft>
+              <a:buClr>
+                <a:srgbClr val="EF2929"/>
+              </a:buClr>
+              <a:buSzPct val="100000"/>
+              <a:buFont typeface="Arial" panose="020B0604020202020204" pitchFamily="34" charset="0"/>
+              <a:buChar char="•"/>
+            </a:pPr>
+            <a:r>
+              <a:rPr lang="en-CA" sz="2400" strike="noStrike" spc="-1" dirty="0">
+                <a:solidFill>
+                  <a:srgbClr val="333333"/>
+                </a:solidFill>
+                <a:latin typeface="Noto Sans Regular"/>
+              </a:rPr>
+              <a:t>Length </a:t>
+            </a:r>
+            <a:r>
+              <a:rPr lang="en-CA" sz="2400" spc="-1" dirty="0">
+                <a:solidFill>
+                  <a:srgbClr val="333333"/>
+                </a:solidFill>
+                <a:latin typeface="Noto Sans Regular"/>
+              </a:rPr>
+              <a:t>value depends on norm variant</a:t>
+            </a:r>
+          </a:p>
+          <a:p>
+            <a:pPr marL="108000">
+              <a:spcAft>
+                <a:spcPts val="1414"/>
+              </a:spcAft>
+              <a:buClr>
+                <a:srgbClr val="EF2929"/>
+              </a:buClr>
+              <a:buSzPct val="100000"/>
+            </a:pPr>
+            <a:r>
+              <a:rPr lang="en-CA" sz="2400" b="1" spc="-1" dirty="0">
+                <a:solidFill>
+                  <a:srgbClr val="333333"/>
+                </a:solidFill>
+                <a:latin typeface="Noto Sans Regular"/>
+              </a:rPr>
+              <a:t>P-norm general equation:</a:t>
+            </a:r>
+            <a:endParaRPr lang="en-CA" sz="2400" b="1" strike="noStrike" spc="-1" dirty="0">
+              <a:solidFill>
+                <a:srgbClr val="333333"/>
+              </a:solidFill>
+              <a:latin typeface="Noto Sans Regular"/>
+            </a:endParaRPr>
+          </a:p>
+          <a:p>
+            <a:pPr marL="108000">
+              <a:spcAft>
+                <a:spcPts val="1414"/>
+              </a:spcAft>
+              <a:buClr>
+                <a:srgbClr val="EF2929"/>
+              </a:buClr>
+              <a:buSzPct val="45000"/>
+            </a:pPr>
+            <a:endParaRPr lang="en-CA" sz="2400" spc="-1" dirty="0">
+              <a:solidFill>
+                <a:srgbClr val="333333"/>
+              </a:solidFill>
+              <a:latin typeface="Noto Sans Regular"/>
+            </a:endParaRPr>
+          </a:p>
+          <a:p>
+            <a:pPr marL="108000">
+              <a:spcAft>
+                <a:spcPts val="1414"/>
+              </a:spcAft>
+              <a:buClr>
+                <a:srgbClr val="EF2929"/>
+              </a:buClr>
+              <a:buSzPct val="45000"/>
+            </a:pPr>
+            <a:endParaRPr lang="en-CA" sz="2400" spc="-1" dirty="0">
+              <a:solidFill>
+                <a:srgbClr val="333333"/>
+              </a:solidFill>
+              <a:latin typeface="Noto Sans Regular"/>
+            </a:endParaRPr>
+          </a:p>
+          <a:p>
+            <a:pPr marL="108000">
+              <a:spcAft>
+                <a:spcPts val="1414"/>
+              </a:spcAft>
+              <a:buClr>
+                <a:srgbClr val="EF2929"/>
+              </a:buClr>
+              <a:buSzPct val="45000"/>
+            </a:pPr>
+            <a:endParaRPr lang="en-CA" sz="2400" spc="-1" dirty="0">
+              <a:solidFill>
+                <a:srgbClr val="333333"/>
+              </a:solidFill>
+              <a:latin typeface="Noto Sans Regular"/>
+            </a:endParaRPr>
+          </a:p>
+          <a:p>
+            <a:pPr marL="108000">
+              <a:spcAft>
+                <a:spcPts val="1414"/>
+              </a:spcAft>
+              <a:buClr>
+                <a:srgbClr val="EF2929"/>
+              </a:buClr>
+              <a:buSzPct val="45000"/>
+            </a:pPr>
+            <a:endParaRPr lang="en-CA" sz="2400" b="1" strike="noStrike" spc="-1" dirty="0">
+              <a:solidFill>
+                <a:srgbClr val="333333"/>
+              </a:solidFill>
+              <a:latin typeface="Noto Sans Regular"/>
+            </a:endParaRPr>
+          </a:p>
+        </p:txBody>
+      </p:sp>
+      <p:pic>
+        <p:nvPicPr>
+          <p:cNvPr id="2" name="Picture 1">
+            <a:extLst>
+              <a:ext uri="{FF2B5EF4-FFF2-40B4-BE49-F238E27FC236}">
+                <a16:creationId xmlns:a16="http://schemas.microsoft.com/office/drawing/2014/main" id="{8E84CFC7-6130-4330-9B79-1FE2F9E0AF8F}"/>
+              </a:ext>
+            </a:extLst>
+          </p:cNvPr>
+          <p:cNvPicPr>
+            <a:picLocks noChangeAspect="1"/>
+          </p:cNvPicPr>
+          <p:nvPr/>
+        </p:nvPicPr>
+        <p:blipFill>
+          <a:blip r:embed="rId3"/>
+          <a:stretch>
+            <a:fillRect/>
+          </a:stretch>
+        </p:blipFill>
+        <p:spPr>
+          <a:xfrm>
+            <a:off x="4601176" y="2415059"/>
+            <a:ext cx="3371133" cy="1478724"/>
+          </a:xfrm>
+          <a:prstGeom prst="rect">
+            <a:avLst/>
+          </a:prstGeom>
+        </p:spPr>
+      </p:pic>
+      <p:graphicFrame>
+        <p:nvGraphicFramePr>
+          <p:cNvPr id="9" name="Table 8">
+            <a:extLst>
+              <a:ext uri="{FF2B5EF4-FFF2-40B4-BE49-F238E27FC236}">
+                <a16:creationId xmlns:a16="http://schemas.microsoft.com/office/drawing/2014/main" id="{98391E23-7D36-4552-9BE4-12EC6E1401A1}"/>
+              </a:ext>
+            </a:extLst>
+          </p:cNvPr>
+          <p:cNvGraphicFramePr>
+            <a:graphicFrameLocks noGrp="1"/>
+          </p:cNvGraphicFramePr>
+          <p:nvPr>
+            <p:extLst>
+              <p:ext uri="{D42A27DB-BD31-4B8C-83A1-F6EECF244321}">
+                <p14:modId xmlns:p14="http://schemas.microsoft.com/office/powerpoint/2010/main" val="1125626201"/>
+              </p:ext>
+            </p:extLst>
+          </p:nvPr>
+        </p:nvGraphicFramePr>
+        <p:xfrm>
+          <a:off x="335116" y="3893783"/>
+          <a:ext cx="8015134" cy="1188720"/>
+        </p:xfrm>
+        <a:graphic>
+          <a:graphicData uri="http://schemas.openxmlformats.org/drawingml/2006/table">
+            <a:tbl>
+              <a:tblPr firstRow="1" bandRow="1">
+                <a:tableStyleId>{5940675A-B579-460E-94D1-54222C63F5DA}</a:tableStyleId>
+              </a:tblPr>
+              <a:tblGrid>
+                <a:gridCol w="2731114">
+                  <a:extLst>
+                    <a:ext uri="{9D8B030D-6E8A-4147-A177-3AD203B41FA5}">
+                      <a16:colId xmlns:a16="http://schemas.microsoft.com/office/drawing/2014/main" val="819937693"/>
+                    </a:ext>
+                  </a:extLst>
+                </a:gridCol>
+                <a:gridCol w="5284020">
+                  <a:extLst>
+                    <a:ext uri="{9D8B030D-6E8A-4147-A177-3AD203B41FA5}">
+                      <a16:colId xmlns:a16="http://schemas.microsoft.com/office/drawing/2014/main" val="2621454154"/>
+                    </a:ext>
+                  </a:extLst>
+                </a:gridCol>
+              </a:tblGrid>
+              <a:tr h="370840">
+                <a:tc>
+                  <a:txBody>
+                    <a:bodyPr/>
+                    <a:lstStyle/>
+                    <a:p>
+                      <a:r>
+                        <a:rPr lang="en-CA" sz="2000" spc="-1" dirty="0">
+                          <a:solidFill>
+                            <a:schemeClr val="tx1">
+                              <a:lumMod val="95000"/>
+                              <a:lumOff val="5000"/>
+                            </a:schemeClr>
+                          </a:solidFill>
+                          <a:latin typeface="Noto Sans Regular"/>
+                        </a:rPr>
+                        <a:t>L1 Norm:</a:t>
+                      </a:r>
+                      <a:endParaRPr lang="en-CA" sz="2000" dirty="0">
+                        <a:solidFill>
+                          <a:schemeClr val="tx1">
+                            <a:lumMod val="95000"/>
+                            <a:lumOff val="5000"/>
+                          </a:schemeClr>
+                        </a:solidFill>
+                      </a:endParaRPr>
+                    </a:p>
+                  </a:txBody>
+                  <a:tcPr/>
+                </a:tc>
+                <a:tc>
+                  <a:txBody>
+                    <a:bodyPr/>
+                    <a:lstStyle/>
+                    <a:p>
+                      <a:r>
+                        <a:rPr lang="en-CA" sz="2000" dirty="0">
+                          <a:solidFill>
+                            <a:schemeClr val="tx1">
+                              <a:lumMod val="95000"/>
+                              <a:lumOff val="5000"/>
+                            </a:schemeClr>
+                          </a:solidFill>
+                        </a:rPr>
+                        <a:t>Sum of absolute values</a:t>
+                      </a:r>
+                    </a:p>
+                  </a:txBody>
+                  <a:tcPr/>
+                </a:tc>
+                <a:extLst>
+                  <a:ext uri="{0D108BD9-81ED-4DB2-BD59-A6C34878D82A}">
+                    <a16:rowId xmlns:a16="http://schemas.microsoft.com/office/drawing/2014/main" val="1762693921"/>
+                  </a:ext>
+                </a:extLst>
+              </a:tr>
+              <a:tr h="370840">
+                <a:tc>
+                  <a:txBody>
+                    <a:bodyPr/>
+                    <a:lstStyle/>
+                    <a:p>
+                      <a:r>
+                        <a:rPr lang="en-CA" sz="2000" spc="-1" dirty="0">
+                          <a:solidFill>
+                            <a:schemeClr val="tx1">
+                              <a:lumMod val="95000"/>
+                              <a:lumOff val="5000"/>
+                            </a:schemeClr>
+                          </a:solidFill>
+                          <a:latin typeface="Noto Sans Regular"/>
+                        </a:rPr>
+                        <a:t>L2 Norm:</a:t>
+                      </a:r>
+                      <a:endParaRPr lang="en-CA" sz="2000" dirty="0">
+                        <a:solidFill>
+                          <a:schemeClr val="tx1">
+                            <a:lumMod val="95000"/>
+                            <a:lumOff val="5000"/>
+                          </a:schemeClr>
+                        </a:solidFill>
+                      </a:endParaRPr>
+                    </a:p>
+                  </a:txBody>
+                  <a:tcPr/>
+                </a:tc>
+                <a:tc>
+                  <a:txBody>
+                    <a:bodyPr/>
+                    <a:lstStyle/>
+                    <a:p>
+                      <a:r>
+                        <a:rPr lang="en-CA" sz="2000" dirty="0">
+                          <a:solidFill>
+                            <a:schemeClr val="tx1">
+                              <a:lumMod val="95000"/>
+                              <a:lumOff val="5000"/>
+                            </a:schemeClr>
+                          </a:solidFill>
+                        </a:rPr>
+                        <a:t>Euclidian Distance</a:t>
+                      </a:r>
+                    </a:p>
+                  </a:txBody>
+                  <a:tcPr/>
+                </a:tc>
+                <a:extLst>
+                  <a:ext uri="{0D108BD9-81ED-4DB2-BD59-A6C34878D82A}">
+                    <a16:rowId xmlns:a16="http://schemas.microsoft.com/office/drawing/2014/main" val="2898708778"/>
+                  </a:ext>
+                </a:extLst>
+              </a:tr>
+              <a:tr h="370840">
+                <a:tc>
+                  <a:txBody>
+                    <a:bodyPr/>
+                    <a:lstStyle/>
+                    <a:p>
+                      <a:r>
+                        <a:rPr lang="en-CA" sz="2000" dirty="0">
+                          <a:solidFill>
+                            <a:schemeClr val="tx1">
+                              <a:lumMod val="95000"/>
+                              <a:lumOff val="5000"/>
+                            </a:schemeClr>
+                          </a:solidFill>
+                        </a:rPr>
+                        <a:t>Infinity Norm:</a:t>
+                      </a:r>
+                    </a:p>
+                  </a:txBody>
+                  <a:tcPr/>
+                </a:tc>
+                <a:tc>
+                  <a:txBody>
+                    <a:bodyPr/>
+                    <a:lstStyle/>
+                    <a:p>
+                      <a:r>
+                        <a:rPr lang="en-CA" sz="2000" dirty="0">
+                          <a:solidFill>
+                            <a:schemeClr val="tx1">
+                              <a:lumMod val="95000"/>
+                              <a:lumOff val="5000"/>
+                            </a:schemeClr>
+                          </a:solidFill>
+                        </a:rPr>
+                        <a:t>Magnitude of largest element</a:t>
+                      </a:r>
+                    </a:p>
+                  </a:txBody>
+                  <a:tcPr/>
+                </a:tc>
+                <a:extLst>
+                  <a:ext uri="{0D108BD9-81ED-4DB2-BD59-A6C34878D82A}">
+                    <a16:rowId xmlns:a16="http://schemas.microsoft.com/office/drawing/2014/main" val="390491850"/>
+                  </a:ext>
+                </a:extLst>
+              </a:tr>
+            </a:tbl>
+          </a:graphicData>
+        </a:graphic>
+      </p:graphicFrame>
+      <p:sp>
+        <p:nvSpPr>
+          <p:cNvPr id="10" name="TextShape 2">
+            <a:extLst>
+              <a:ext uri="{FF2B5EF4-FFF2-40B4-BE49-F238E27FC236}">
+                <a16:creationId xmlns:a16="http://schemas.microsoft.com/office/drawing/2014/main" id="{39E5EC97-F74E-42A4-AA4D-5EAB0A06500E}"/>
+              </a:ext>
+            </a:extLst>
+          </p:cNvPr>
+          <p:cNvSpPr txBox="1"/>
+          <p:nvPr/>
+        </p:nvSpPr>
+        <p:spPr>
+          <a:xfrm>
+            <a:off x="153676" y="5182434"/>
+            <a:ext cx="8990323" cy="726765"/>
+          </a:xfrm>
+          <a:prstGeom prst="rect">
+            <a:avLst/>
+          </a:prstGeom>
+          <a:noFill/>
+          <a:ln>
+            <a:noFill/>
+          </a:ln>
+        </p:spPr>
+        <p:txBody>
+          <a:bodyPr lIns="0" tIns="0" rIns="0" bIns="0"/>
+          <a:lstStyle/>
+          <a:p>
+            <a:pPr marL="108000">
+              <a:spcAft>
+                <a:spcPts val="1414"/>
+              </a:spcAft>
+              <a:buClr>
+                <a:srgbClr val="EF2929"/>
+              </a:buClr>
+              <a:buSzPct val="100000"/>
+            </a:pPr>
+            <a:r>
+              <a:rPr lang="en-CA" sz="2400" b="1" spc="-1" dirty="0">
+                <a:solidFill>
+                  <a:srgbClr val="333333"/>
+                </a:solidFill>
+                <a:latin typeface="Noto Sans Regular"/>
+              </a:rPr>
+              <a:t>L2 Norm Squared</a:t>
+            </a:r>
+            <a:r>
+              <a:rPr lang="en-CA" sz="2400" b="1" strike="noStrike" spc="-1" dirty="0">
+                <a:solidFill>
+                  <a:srgbClr val="333333"/>
+                </a:solidFill>
+                <a:latin typeface="Noto Sans Regular"/>
+              </a:rPr>
+              <a:t>: </a:t>
+            </a:r>
+            <a:r>
+              <a:rPr lang="en-CA" sz="2400" strike="noStrike" spc="-1" dirty="0">
+                <a:solidFill>
+                  <a:srgbClr val="333333"/>
+                </a:solidFill>
+                <a:latin typeface="Noto Sans Regular"/>
+              </a:rPr>
+              <a:t>Also frequency used</a:t>
+            </a:r>
+            <a:r>
+              <a:rPr lang="en-CA" sz="2400" spc="-1" dirty="0">
+                <a:solidFill>
+                  <a:srgbClr val="333333"/>
+                </a:solidFill>
+                <a:latin typeface="Noto Sans Regular"/>
+              </a:rPr>
+              <a:t>. Several equivalent representations:</a:t>
+            </a:r>
+          </a:p>
+          <a:p>
+            <a:pPr marL="108000">
+              <a:spcAft>
+                <a:spcPts val="1414"/>
+              </a:spcAft>
+              <a:buClr>
+                <a:srgbClr val="EF2929"/>
+              </a:buClr>
+              <a:buSzPct val="100000"/>
+            </a:pPr>
+            <a:endParaRPr lang="en-CA" sz="2400" spc="-1" dirty="0">
+              <a:solidFill>
+                <a:srgbClr val="333333"/>
+              </a:solidFill>
+              <a:latin typeface="Noto Sans Regular"/>
+            </a:endParaRPr>
+          </a:p>
+          <a:p>
+            <a:pPr marL="108000">
+              <a:spcAft>
+                <a:spcPts val="1414"/>
+              </a:spcAft>
+              <a:buClr>
+                <a:srgbClr val="EF2929"/>
+              </a:buClr>
+              <a:buSzPct val="45000"/>
+            </a:pPr>
+            <a:endParaRPr lang="en-CA" sz="2400" spc="-1" dirty="0">
+              <a:solidFill>
+                <a:srgbClr val="333333"/>
+              </a:solidFill>
+              <a:latin typeface="Noto Sans Regular"/>
+            </a:endParaRPr>
+          </a:p>
+          <a:p>
+            <a:pPr marL="108000">
+              <a:spcAft>
+                <a:spcPts val="1414"/>
+              </a:spcAft>
+              <a:buClr>
+                <a:srgbClr val="EF2929"/>
+              </a:buClr>
+              <a:buSzPct val="45000"/>
+            </a:pPr>
+            <a:endParaRPr lang="en-CA" sz="2400" spc="-1" dirty="0">
+              <a:solidFill>
+                <a:srgbClr val="333333"/>
+              </a:solidFill>
+              <a:latin typeface="Noto Sans Regular"/>
+            </a:endParaRPr>
+          </a:p>
+          <a:p>
+            <a:pPr marL="108000">
+              <a:spcAft>
+                <a:spcPts val="1414"/>
+              </a:spcAft>
+              <a:buClr>
+                <a:srgbClr val="EF2929"/>
+              </a:buClr>
+              <a:buSzPct val="45000"/>
+            </a:pPr>
+            <a:endParaRPr lang="en-CA" sz="2400" b="1" strike="noStrike" spc="-1" dirty="0">
+              <a:solidFill>
+                <a:srgbClr val="333333"/>
+              </a:solidFill>
+              <a:latin typeface="Noto Sans Regular"/>
+            </a:endParaRPr>
+          </a:p>
+        </p:txBody>
+      </p:sp>
+      <mc:AlternateContent xmlns:mc="http://schemas.openxmlformats.org/markup-compatibility/2006" xmlns:a14="http://schemas.microsoft.com/office/drawing/2010/main">
+        <mc:Choice Requires="a14">
+          <p:sp>
+            <p:nvSpPr>
+              <p:cNvPr id="3" name="TextBox 2">
+                <a:extLst>
+                  <a:ext uri="{FF2B5EF4-FFF2-40B4-BE49-F238E27FC236}">
+                    <a16:creationId xmlns:a16="http://schemas.microsoft.com/office/drawing/2014/main" id="{587064F6-B399-4CCE-ADE6-D90E8E0C9716}"/>
+                  </a:ext>
+                </a:extLst>
+              </p:cNvPr>
+              <p:cNvSpPr txBox="1"/>
+              <p:nvPr/>
+            </p:nvSpPr>
+            <p:spPr>
+              <a:xfrm>
+                <a:off x="2861219" y="5847312"/>
+                <a:ext cx="3529428" cy="1321259"/>
+              </a:xfrm>
+              <a:prstGeom prst="rect">
+                <a:avLst/>
+              </a:prstGeom>
+              <a:noFill/>
+            </p:spPr>
+            <p:txBody>
+              <a:bodyPr wrap="none" rtlCol="0">
+                <a:spAutoFit/>
+              </a:bodyPr>
+              <a:lstStyle/>
+              <a:p>
+                <a:pPr/>
+                <a14:m>
+                  <m:oMathPara xmlns:m="http://schemas.openxmlformats.org/officeDocument/2006/math">
+                    <m:oMathParaPr>
+                      <m:jc m:val="centerGroup"/>
+                    </m:oMathParaPr>
+                    <m:oMath xmlns:m="http://schemas.openxmlformats.org/officeDocument/2006/math">
+                      <m:nary>
+                        <m:naryPr>
+                          <m:chr m:val="∑"/>
+                          <m:ctrlPr>
+                            <a:rPr lang="en-CA" sz="2200" i="1" spc="-1" smtClean="0">
+                              <a:solidFill>
+                                <a:srgbClr val="333333"/>
+                              </a:solidFill>
+                              <a:latin typeface="Cambria Math" panose="02040503050406030204" pitchFamily="18" charset="0"/>
+                            </a:rPr>
+                          </m:ctrlPr>
+                        </m:naryPr>
+                        <m:sub>
+                          <m:r>
+                            <a:rPr lang="en-CA" sz="2200" i="1" spc="-1">
+                              <a:solidFill>
+                                <a:srgbClr val="333333"/>
+                              </a:solidFill>
+                              <a:latin typeface="Cambria Math" panose="02040503050406030204" pitchFamily="18" charset="0"/>
+                            </a:rPr>
+                            <m:t>𝑖</m:t>
+                          </m:r>
+                        </m:sub>
+                        <m:sup>
+                          <m:r>
+                            <a:rPr lang="en-CA" sz="2200" i="1" spc="-1">
+                              <a:solidFill>
+                                <a:srgbClr val="333333"/>
+                              </a:solidFill>
+                              <a:latin typeface="Cambria Math" panose="02040503050406030204" pitchFamily="18" charset="0"/>
+                            </a:rPr>
+                            <m:t>𝑀</m:t>
+                          </m:r>
+                        </m:sup>
+                        <m:e>
+                          <m:sSup>
+                            <m:sSupPr>
+                              <m:ctrlPr>
+                                <a:rPr lang="en-CA" sz="2200" i="1" spc="-1">
+                                  <a:solidFill>
+                                    <a:srgbClr val="333333"/>
+                                  </a:solidFill>
+                                  <a:latin typeface="Cambria Math" panose="02040503050406030204" pitchFamily="18" charset="0"/>
+                                </a:rPr>
+                              </m:ctrlPr>
+                            </m:sSupPr>
+                            <m:e>
+                              <m:d>
+                                <m:dPr>
+                                  <m:ctrlPr>
+                                    <a:rPr lang="en-CA" sz="2200" i="1" spc="-1">
+                                      <a:solidFill>
+                                        <a:srgbClr val="333333"/>
+                                      </a:solidFill>
+                                      <a:latin typeface="Cambria Math" panose="02040503050406030204" pitchFamily="18" charset="0"/>
+                                    </a:rPr>
+                                  </m:ctrlPr>
+                                </m:dPr>
+                                <m:e>
+                                  <m:sSub>
+                                    <m:sSubPr>
+                                      <m:ctrlPr>
+                                        <a:rPr lang="en-CA" sz="2200" i="1" spc="-1">
+                                          <a:solidFill>
+                                            <a:srgbClr val="333333"/>
+                                          </a:solidFill>
+                                          <a:latin typeface="Cambria Math" panose="02040503050406030204" pitchFamily="18" charset="0"/>
+                                        </a:rPr>
+                                      </m:ctrlPr>
+                                    </m:sSubPr>
+                                    <m:e>
+                                      <m:r>
+                                        <a:rPr lang="en-CA" sz="2200" i="1" spc="-1">
+                                          <a:solidFill>
+                                            <a:srgbClr val="333333"/>
+                                          </a:solidFill>
+                                          <a:latin typeface="Cambria Math" panose="02040503050406030204" pitchFamily="18" charset="0"/>
+                                        </a:rPr>
+                                        <m:t>𝑢</m:t>
+                                      </m:r>
+                                    </m:e>
+                                    <m:sub>
+                                      <m:r>
+                                        <a:rPr lang="en-CA" sz="2200" i="1" spc="-1">
+                                          <a:solidFill>
+                                            <a:srgbClr val="333333"/>
+                                          </a:solidFill>
+                                          <a:latin typeface="Cambria Math" panose="02040503050406030204" pitchFamily="18" charset="0"/>
+                                        </a:rPr>
+                                        <m:t>𝑖</m:t>
+                                      </m:r>
+                                    </m:sub>
+                                  </m:sSub>
+                                </m:e>
+                              </m:d>
+                            </m:e>
+                            <m:sup>
+                              <m:r>
+                                <a:rPr lang="en-CA" sz="2200" i="1" spc="-1">
+                                  <a:solidFill>
+                                    <a:srgbClr val="333333"/>
+                                  </a:solidFill>
+                                  <a:latin typeface="Cambria Math" panose="02040503050406030204" pitchFamily="18" charset="0"/>
+                                </a:rPr>
+                                <m:t>2</m:t>
+                              </m:r>
+                            </m:sup>
+                          </m:sSup>
+                        </m:e>
+                      </m:nary>
+                      <m:r>
+                        <a:rPr lang="en-CA" sz="2200" i="1" spc="-1">
+                          <a:solidFill>
+                            <a:srgbClr val="333333"/>
+                          </a:solidFill>
+                          <a:latin typeface="Cambria Math" panose="02040503050406030204" pitchFamily="18" charset="0"/>
+                        </a:rPr>
+                        <m:t>=</m:t>
+                      </m:r>
+                      <m:sSubSup>
+                        <m:sSubSupPr>
+                          <m:ctrlPr>
+                            <a:rPr lang="en-CA" sz="2200" b="0" i="1" spc="-1" smtClean="0">
+                              <a:solidFill>
+                                <a:srgbClr val="333333"/>
+                              </a:solidFill>
+                              <a:latin typeface="Cambria Math" panose="02040503050406030204" pitchFamily="18" charset="0"/>
+                            </a:rPr>
+                          </m:ctrlPr>
+                        </m:sSubSupPr>
+                        <m:e>
+                          <m:d>
+                            <m:dPr>
+                              <m:begChr m:val="|"/>
+                              <m:endChr m:val="|"/>
+                              <m:ctrlPr>
+                                <a:rPr lang="en-CA" sz="2200" i="1" spc="-1">
+                                  <a:solidFill>
+                                    <a:srgbClr val="333333"/>
+                                  </a:solidFill>
+                                  <a:latin typeface="Cambria Math" panose="02040503050406030204" pitchFamily="18" charset="0"/>
+                                </a:rPr>
+                              </m:ctrlPr>
+                            </m:dPr>
+                            <m:e>
+                              <m:d>
+                                <m:dPr>
+                                  <m:begChr m:val="|"/>
+                                  <m:endChr m:val="|"/>
+                                  <m:ctrlPr>
+                                    <a:rPr lang="en-CA" sz="2200" i="1" spc="-1">
+                                      <a:solidFill>
+                                        <a:srgbClr val="333333"/>
+                                      </a:solidFill>
+                                      <a:latin typeface="Cambria Math" panose="02040503050406030204" pitchFamily="18" charset="0"/>
+                                    </a:rPr>
+                                  </m:ctrlPr>
+                                </m:dPr>
+                                <m:e>
+                                  <m:r>
+                                    <a:rPr lang="en-CA" sz="2200" b="1" i="1" spc="-1">
+                                      <a:solidFill>
+                                        <a:srgbClr val="333333"/>
+                                      </a:solidFill>
+                                      <a:latin typeface="Cambria Math" panose="02040503050406030204" pitchFamily="18" charset="0"/>
+                                    </a:rPr>
+                                    <m:t>𝒖</m:t>
+                                  </m:r>
+                                </m:e>
+                              </m:d>
+                            </m:e>
+                          </m:d>
+                        </m:e>
+                        <m:sub>
+                          <m:r>
+                            <a:rPr lang="en-CA" sz="2200" b="0" i="1" spc="-1" smtClean="0">
+                              <a:solidFill>
+                                <a:srgbClr val="333333"/>
+                              </a:solidFill>
+                              <a:latin typeface="Cambria Math" panose="02040503050406030204" pitchFamily="18" charset="0"/>
+                            </a:rPr>
+                            <m:t>2</m:t>
+                          </m:r>
+                        </m:sub>
+                        <m:sup>
+                          <m:r>
+                            <a:rPr lang="en-CA" sz="2200" i="1" spc="-1">
+                              <a:solidFill>
+                                <a:srgbClr val="333333"/>
+                              </a:solidFill>
+                              <a:latin typeface="Cambria Math" panose="02040503050406030204" pitchFamily="18" charset="0"/>
+                            </a:rPr>
+                            <m:t>2</m:t>
+                          </m:r>
+                        </m:sup>
+                      </m:sSubSup>
+                      <m:r>
+                        <a:rPr lang="en-CA" sz="2200" i="1" spc="-1">
+                          <a:solidFill>
+                            <a:srgbClr val="333333"/>
+                          </a:solidFill>
+                          <a:latin typeface="Cambria Math" panose="02040503050406030204" pitchFamily="18" charset="0"/>
+                        </a:rPr>
+                        <m:t> =</m:t>
+                      </m:r>
+                      <m:sSup>
+                        <m:sSupPr>
+                          <m:ctrlPr>
+                            <a:rPr lang="en-CA" sz="2200" i="1" spc="-1">
+                              <a:solidFill>
+                                <a:srgbClr val="333333"/>
+                              </a:solidFill>
+                              <a:latin typeface="Cambria Math" panose="02040503050406030204" pitchFamily="18" charset="0"/>
+                            </a:rPr>
+                          </m:ctrlPr>
+                        </m:sSupPr>
+                        <m:e>
+                          <m:r>
+                            <a:rPr lang="en-CA" sz="2200" b="1" i="1" spc="-1">
+                              <a:solidFill>
+                                <a:srgbClr val="333333"/>
+                              </a:solidFill>
+                              <a:latin typeface="Cambria Math" panose="02040503050406030204" pitchFamily="18" charset="0"/>
+                            </a:rPr>
+                            <m:t>𝒖</m:t>
+                          </m:r>
+                        </m:e>
+                        <m:sup>
+                          <m:r>
+                            <a:rPr lang="en-CA" sz="2200" i="1" spc="-1">
+                              <a:solidFill>
+                                <a:srgbClr val="333333"/>
+                              </a:solidFill>
+                              <a:latin typeface="Cambria Math" panose="02040503050406030204" pitchFamily="18" charset="0"/>
+                            </a:rPr>
+                            <m:t>𝑇</m:t>
+                          </m:r>
+                        </m:sup>
+                      </m:sSup>
+                      <m:r>
+                        <a:rPr lang="en-CA" sz="2200" b="1" i="1" spc="-1">
+                          <a:solidFill>
+                            <a:srgbClr val="333333"/>
+                          </a:solidFill>
+                          <a:latin typeface="Cambria Math" panose="02040503050406030204" pitchFamily="18" charset="0"/>
+                        </a:rPr>
+                        <m:t>𝒖</m:t>
+                      </m:r>
+                    </m:oMath>
+                  </m:oMathPara>
+                </a14:m>
+                <a:endParaRPr lang="en-CA" sz="2200" b="1" spc="-1" dirty="0">
+                  <a:solidFill>
+                    <a:srgbClr val="333333"/>
+                  </a:solidFill>
+                  <a:latin typeface="Noto Sans Regular"/>
+                </a:endParaRPr>
+              </a:p>
+              <a:p>
+                <a:endParaRPr lang="en-CA" dirty="0"/>
+              </a:p>
+            </p:txBody>
+          </p:sp>
+        </mc:Choice>
+        <mc:Fallback xmlns="">
+          <p:sp>
+            <p:nvSpPr>
+              <p:cNvPr id="3" name="TextBox 2">
+                <a:extLst>
+                  <a:ext uri="{FF2B5EF4-FFF2-40B4-BE49-F238E27FC236}">
+                    <a16:creationId xmlns:a16="http://schemas.microsoft.com/office/drawing/2014/main" id="{587064F6-B399-4CCE-ADE6-D90E8E0C9716}"/>
+                  </a:ext>
+                </a:extLst>
+              </p:cNvPr>
+              <p:cNvSpPr txBox="1">
+                <a:spLocks noRot="1" noChangeAspect="1" noMove="1" noResize="1" noEditPoints="1" noAdjustHandles="1" noChangeArrowheads="1" noChangeShapeType="1" noTextEdit="1"/>
+              </p:cNvSpPr>
+              <p:nvPr/>
+            </p:nvSpPr>
+            <p:spPr>
+              <a:xfrm>
+                <a:off x="2861219" y="5847312"/>
+                <a:ext cx="3529428" cy="1321259"/>
+              </a:xfrm>
+              <a:prstGeom prst="rect">
+                <a:avLst/>
+              </a:prstGeom>
+              <a:blipFill>
+                <a:blip r:embed="rId4"/>
+                <a:stretch>
+                  <a:fillRect/>
+                </a:stretch>
+              </a:blipFill>
+            </p:spPr>
+            <p:txBody>
+              <a:bodyPr/>
+              <a:lstStyle/>
+              <a:p>
+                <a:r>
+                  <a:rPr lang="en-CA">
+                    <a:noFill/>
+                  </a:rPr>
+                  <a:t> </a:t>
+                </a:r>
+              </a:p>
+            </p:txBody>
+          </p:sp>
+        </mc:Fallback>
+      </mc:AlternateContent>
+    </p:spTree>
+    <p:extLst>
+      <p:ext uri="{BB962C8B-B14F-4D97-AF65-F5344CB8AC3E}">
+        <p14:creationId xmlns:p14="http://schemas.microsoft.com/office/powerpoint/2010/main" val="1146325612"/>
+      </p:ext>
+    </p:extLst>
+  </p:cSld>
+  <p:clrMapOvr>
+    <a:masterClrMapping/>
+  </p:clrMapOvr>
+</p:sld>
+</file>
+
+<file path=ppt/slides/slide8.xml><?xml version="1.0" encoding="utf-8"?>
+<p:sld xmlns:a="http://schemas.openxmlformats.org/drawingml/2006/main" xmlns:r="http://schemas.openxmlformats.org/officeDocument/2006/relationships" xmlns:p="http://schemas.openxmlformats.org/presentationml/2006/main">
+  <p:cSld>
+    <p:spTree>
+      <p:nvGrpSpPr>
+        <p:cNvPr id="1" name=""/>
+        <p:cNvGrpSpPr/>
+        <p:nvPr/>
+      </p:nvGrpSpPr>
+      <p:grpSpPr>
+        <a:xfrm>
+          <a:off x="0" y="0"/>
+          <a:ext cx="0" cy="0"/>
+          <a:chOff x="0" y="0"/>
+          <a:chExt cx="0" cy="0"/>
+        </a:xfrm>
+      </p:grpSpPr>
+      <p:sp>
+        <p:nvSpPr>
+          <p:cNvPr id="4" name="Slide Number Placeholder 3">
+            <a:extLst>
+              <a:ext uri="{FF2B5EF4-FFF2-40B4-BE49-F238E27FC236}">
+                <a16:creationId xmlns:a16="http://schemas.microsoft.com/office/drawing/2014/main" id="{BB42BA6F-63F1-47A7-9EC4-AEB3F8AEE033}"/>
+              </a:ext>
+            </a:extLst>
+          </p:cNvPr>
+          <p:cNvSpPr>
+            <a:spLocks noGrp="1"/>
+          </p:cNvSpPr>
+          <p:nvPr>
+            <p:ph type="sldNum" sz="quarter" idx="12"/>
+          </p:nvPr>
+        </p:nvSpPr>
+        <p:spPr/>
+        <p:txBody>
+          <a:bodyPr/>
+          <a:lstStyle/>
+          <a:p>
+            <a:fld id="{8F2D09F1-5447-4EA4-8EA6-0865537200C5}" type="slidenum">
+              <a:rPr lang="en-CA" smtClean="0"/>
+              <a:t>8</a:t>
             </a:fld>
             <a:endParaRPr lang="en-CA"/>
           </a:p>
@@ -35641,7 +37722,7 @@
 </p:sld>
 </file>
 
-<file path=ppt/slides/slide8.xml><?xml version="1.0" encoding="utf-8"?>
+<file path=ppt/slides/slide9.xml><?xml version="1.0" encoding="utf-8"?>
 <p:sld xmlns:a="http://schemas.openxmlformats.org/drawingml/2006/main" xmlns:r="http://schemas.openxmlformats.org/officeDocument/2006/relationships" xmlns:p="http://schemas.openxmlformats.org/presentationml/2006/main">
   <p:cSld>
     <p:spTree>
@@ -35705,853 +37786,6 @@
     <p:extLst>
       <p:ext uri="{BB962C8B-B14F-4D97-AF65-F5344CB8AC3E}">
         <p14:creationId xmlns:p14="http://schemas.microsoft.com/office/powerpoint/2010/main" val="2392817821"/>
-      </p:ext>
-    </p:extLst>
-  </p:cSld>
-  <p:clrMapOvr>
-    <a:masterClrMapping/>
-  </p:clrMapOvr>
-</p:sld>
-</file>
-
-<file path=ppt/slides/slide9.xml><?xml version="1.0" encoding="utf-8"?>
-<p:sld xmlns:a="http://schemas.openxmlformats.org/drawingml/2006/main" xmlns:r="http://schemas.openxmlformats.org/officeDocument/2006/relationships" xmlns:p="http://schemas.openxmlformats.org/presentationml/2006/main">
-  <p:cSld>
-    <p:spTree>
-      <p:nvGrpSpPr>
-        <p:cNvPr id="1" name=""/>
-        <p:cNvGrpSpPr/>
-        <p:nvPr/>
-      </p:nvGrpSpPr>
-      <p:grpSpPr>
-        <a:xfrm>
-          <a:off x="0" y="0"/>
-          <a:ext cx="0" cy="0"/>
-          <a:chOff x="0" y="0"/>
-          <a:chExt cx="0" cy="0"/>
-        </a:xfrm>
-      </p:grpSpPr>
-      <p:sp>
-        <p:nvSpPr>
-          <p:cNvPr id="4" name="Slide Number Placeholder 3">
-            <a:extLst>
-              <a:ext uri="{FF2B5EF4-FFF2-40B4-BE49-F238E27FC236}">
-                <a16:creationId xmlns:a16="http://schemas.microsoft.com/office/drawing/2014/main" id="{BB42BA6F-63F1-47A7-9EC4-AEB3F8AEE033}"/>
-              </a:ext>
-            </a:extLst>
-          </p:cNvPr>
-          <p:cNvSpPr>
-            <a:spLocks noGrp="1"/>
-          </p:cNvSpPr>
-          <p:nvPr>
-            <p:ph type="sldNum" sz="quarter" idx="12"/>
-          </p:nvPr>
-        </p:nvSpPr>
-        <p:spPr/>
-        <p:txBody>
-          <a:bodyPr/>
-          <a:lstStyle/>
-          <a:p>
-            <a:fld id="{8F2D09F1-5447-4EA4-8EA6-0865537200C5}" type="slidenum">
-              <a:rPr lang="en-CA" smtClean="0"/>
-              <a:t>9</a:t>
-            </a:fld>
-            <a:endParaRPr lang="en-CA"/>
-          </a:p>
-        </p:txBody>
-      </p:sp>
-      <p:sp>
-        <p:nvSpPr>
-          <p:cNvPr id="5" name="TextShape 1">
-            <a:extLst>
-              <a:ext uri="{FF2B5EF4-FFF2-40B4-BE49-F238E27FC236}">
-                <a16:creationId xmlns:a16="http://schemas.microsoft.com/office/drawing/2014/main" id="{4E464BCD-5165-4EA8-A7C4-01702A446797}"/>
-              </a:ext>
-            </a:extLst>
-          </p:cNvPr>
-          <p:cNvSpPr txBox="1"/>
-          <p:nvPr/>
-        </p:nvSpPr>
-        <p:spPr>
-          <a:xfrm>
-            <a:off x="720000" y="300960"/>
-            <a:ext cx="8855640" cy="1262520"/>
-          </a:xfrm>
-          <a:prstGeom prst="rect">
-            <a:avLst/>
-          </a:prstGeom>
-          <a:noFill/>
-          <a:ln>
-            <a:noFill/>
-          </a:ln>
-        </p:spPr>
-        <p:txBody>
-          <a:bodyPr lIns="0" tIns="0" rIns="0" bIns="0" anchor="ctr"/>
-          <a:lstStyle/>
-          <a:p>
-            <a:r>
-              <a:rPr lang="en-CA" sz="4400" b="1" strike="noStrike" spc="-1" dirty="0">
-                <a:solidFill>
-                  <a:srgbClr val="333333"/>
-                </a:solidFill>
-                <a:latin typeface="Noto Sans Regular"/>
-              </a:rPr>
-              <a:t>Homogenous Coordinates</a:t>
-            </a:r>
-          </a:p>
-        </p:txBody>
-      </p:sp>
-      <mc:AlternateContent xmlns:mc="http://schemas.openxmlformats.org/markup-compatibility/2006">
-        <mc:Choice xmlns:a14="http://schemas.microsoft.com/office/drawing/2010/main" Requires="a14">
-          <p:sp>
-            <p:nvSpPr>
-              <p:cNvPr id="6" name="TextShape 2">
-                <a:extLst>
-                  <a:ext uri="{FF2B5EF4-FFF2-40B4-BE49-F238E27FC236}">
-                    <a16:creationId xmlns:a16="http://schemas.microsoft.com/office/drawing/2014/main" id="{60BEF98C-8896-4CC1-BA48-04B35A72CF20}"/>
-                  </a:ext>
-                </a:extLst>
-              </p:cNvPr>
-              <p:cNvSpPr txBox="1"/>
-              <p:nvPr/>
-            </p:nvSpPr>
-            <p:spPr>
-              <a:xfrm>
-                <a:off x="252000" y="1542091"/>
-                <a:ext cx="8640000" cy="5179385"/>
-              </a:xfrm>
-              <a:prstGeom prst="rect">
-                <a:avLst/>
-              </a:prstGeom>
-              <a:noFill/>
-              <a:ln>
-                <a:noFill/>
-              </a:ln>
-            </p:spPr>
-            <p:txBody>
-              <a:bodyPr lIns="0" tIns="0" rIns="0" bIns="0"/>
-              <a:lstStyle/>
-              <a:p>
-                <a:pPr marL="565200" indent="-457200">
-                  <a:spcAft>
-                    <a:spcPts val="1414"/>
-                  </a:spcAft>
-                  <a:buClr>
-                    <a:srgbClr val="EF2929"/>
-                  </a:buClr>
-                  <a:buSzPct val="100000"/>
-                  <a:buFont typeface="Arial" panose="020B0604020202020204" pitchFamily="34" charset="0"/>
-                  <a:buChar char="•"/>
-                </a:pPr>
-                <a:r>
-                  <a:rPr lang="en-CA" sz="2400" spc="-1" dirty="0">
-                    <a:solidFill>
-                      <a:srgbClr val="333333"/>
-                    </a:solidFill>
-                    <a:latin typeface="Noto Sans Regular"/>
-                  </a:rPr>
-                  <a:t>Point augmented with an additional coordinate to represent the point at different scales</a:t>
-                </a:r>
-              </a:p>
-              <a:p>
-                <a:pPr marL="108000">
-                  <a:spcAft>
-                    <a:spcPts val="1414"/>
-                  </a:spcAft>
-                  <a:buClr>
-                    <a:srgbClr val="EF2929"/>
-                  </a:buClr>
-                  <a:buSzPct val="100000"/>
-                </a:pPr>
-                <a:r>
-                  <a:rPr lang="en-CA" sz="2400" b="1" spc="-1" dirty="0">
-                    <a:solidFill>
-                      <a:srgbClr val="333333"/>
-                    </a:solidFill>
-                    <a:latin typeface="Noto Sans Regular"/>
-                  </a:rPr>
-                  <a:t>Normalized (scaling = 1) Homogenous Coordinates</a:t>
-                </a:r>
-              </a:p>
-              <a:p>
-                <a:pPr marL="108000">
-                  <a:spcAft>
-                    <a:spcPts val="1414"/>
-                  </a:spcAft>
-                  <a:buClr>
-                    <a:srgbClr val="EF2929"/>
-                  </a:buClr>
-                  <a:buSzPct val="100000"/>
-                </a:pPr>
-                <a:endParaRPr lang="en-CA" sz="2400" b="1" spc="-1" dirty="0">
-                  <a:solidFill>
-                    <a:srgbClr val="333333"/>
-                  </a:solidFill>
-                  <a:latin typeface="Noto Sans Regular"/>
-                </a:endParaRPr>
-              </a:p>
-              <a:p>
-                <a:pPr marL="108000">
-                  <a:spcAft>
-                    <a:spcPts val="1414"/>
-                  </a:spcAft>
-                  <a:buClr>
-                    <a:srgbClr val="EF2929"/>
-                  </a:buClr>
-                  <a:buSzPct val="100000"/>
-                </a:pPr>
-                <a:endParaRPr lang="en-CA" sz="2400" b="1" spc="-1" dirty="0">
-                  <a:solidFill>
-                    <a:srgbClr val="333333"/>
-                  </a:solidFill>
-                  <a:latin typeface="Noto Sans Regular"/>
-                </a:endParaRPr>
-              </a:p>
-              <a:p>
-                <a:pPr marL="108000">
-                  <a:spcAft>
-                    <a:spcPts val="1414"/>
-                  </a:spcAft>
-                  <a:buClr>
-                    <a:srgbClr val="EF2929"/>
-                  </a:buClr>
-                  <a:buSzPct val="100000"/>
-                </a:pPr>
-                <a:endParaRPr lang="en-CA" sz="2400" b="1" spc="-1" dirty="0">
-                  <a:solidFill>
-                    <a:srgbClr val="333333"/>
-                  </a:solidFill>
-                  <a:latin typeface="Noto Sans Regular"/>
-                </a:endParaRPr>
-              </a:p>
-              <a:p>
-                <a:pPr marL="108000">
-                  <a:spcAft>
-                    <a:spcPts val="1414"/>
-                  </a:spcAft>
-                  <a:buClr>
-                    <a:srgbClr val="EF2929"/>
-                  </a:buClr>
-                  <a:buSzPct val="100000"/>
-                </a:pPr>
-                <a:r>
-                  <a:rPr lang="en-CA" sz="2400" b="1" spc="-1" dirty="0">
-                    <a:solidFill>
-                      <a:srgbClr val="333333"/>
-                    </a:solidFill>
-                    <a:latin typeface="Noto Sans Regular"/>
-                  </a:rPr>
-                  <a:t>Non-Normalized (scaling </a:t>
-                </a:r>
-                <a14:m>
-                  <m:oMath xmlns:m="http://schemas.openxmlformats.org/officeDocument/2006/math">
-                    <m:r>
-                      <a:rPr lang="en-CA" sz="2400" b="1" i="1" spc="-1">
-                        <a:solidFill>
-                          <a:srgbClr val="333333"/>
-                        </a:solidFill>
-                        <a:latin typeface="Cambria Math" panose="02040503050406030204" pitchFamily="18" charset="0"/>
-                      </a:rPr>
-                      <m:t>≠</m:t>
-                    </m:r>
-                    <m:r>
-                      <a:rPr lang="en-CA" sz="2400" b="1" spc="-1">
-                        <a:solidFill>
-                          <a:srgbClr val="333333"/>
-                        </a:solidFill>
-                        <a:latin typeface="Cambria Math" panose="02040503050406030204" pitchFamily="18" charset="0"/>
-                      </a:rPr>
-                      <m:t>𝟏</m:t>
-                    </m:r>
-                  </m:oMath>
-                </a14:m>
-                <a:r>
-                  <a:rPr lang="en-CA" sz="2400" b="1" spc="-1" dirty="0">
-                    <a:solidFill>
-                      <a:srgbClr val="333333"/>
-                    </a:solidFill>
-                    <a:latin typeface="Noto Sans Regular"/>
-                  </a:rPr>
-                  <a:t>) Homogenous Coordinates</a:t>
-                </a:r>
-              </a:p>
-              <a:p>
-                <a:pPr marL="108000">
-                  <a:spcAft>
-                    <a:spcPts val="1414"/>
-                  </a:spcAft>
-                  <a:buClr>
-                    <a:srgbClr val="EF2929"/>
-                  </a:buClr>
-                  <a:buSzPct val="100000"/>
-                </a:pPr>
-                <a:endParaRPr lang="en-CA" sz="2400" b="1" spc="-1" dirty="0">
-                  <a:solidFill>
-                    <a:srgbClr val="333333"/>
-                  </a:solidFill>
-                  <a:latin typeface="Noto Sans Regular"/>
-                </a:endParaRPr>
-              </a:p>
-            </p:txBody>
-          </p:sp>
-        </mc:Choice>
-        <mc:Fallback>
-          <p:sp>
-            <p:nvSpPr>
-              <p:cNvPr id="6" name="TextShape 2">
-                <a:extLst>
-                  <a:ext uri="{FF2B5EF4-FFF2-40B4-BE49-F238E27FC236}">
-                    <a16:creationId xmlns:a16="http://schemas.microsoft.com/office/drawing/2014/main" id="{60BEF98C-8896-4CC1-BA48-04B35A72CF20}"/>
-                  </a:ext>
-                </a:extLst>
-              </p:cNvPr>
-              <p:cNvSpPr txBox="1">
-                <a:spLocks noRot="1" noChangeAspect="1" noMove="1" noResize="1" noEditPoints="1" noAdjustHandles="1" noChangeArrowheads="1" noChangeShapeType="1" noTextEdit="1"/>
-              </p:cNvSpPr>
-              <p:nvPr/>
-            </p:nvSpPr>
-            <p:spPr>
-              <a:xfrm>
-                <a:off x="252000" y="1542091"/>
-                <a:ext cx="8640000" cy="5179385"/>
-              </a:xfrm>
-              <a:prstGeom prst="rect">
-                <a:avLst/>
-              </a:prstGeom>
-              <a:blipFill>
-                <a:blip r:embed="rId2"/>
-                <a:stretch>
-                  <a:fillRect l="-846" t="-1882" r="-917"/>
-                </a:stretch>
-              </a:blipFill>
-              <a:ln>
-                <a:noFill/>
-              </a:ln>
-            </p:spPr>
-            <p:txBody>
-              <a:bodyPr/>
-              <a:lstStyle/>
-              <a:p>
-                <a:r>
-                  <a:rPr lang="en-CA">
-                    <a:noFill/>
-                  </a:rPr>
-                  <a:t> </a:t>
-                </a:r>
-              </a:p>
-            </p:txBody>
-          </p:sp>
-        </mc:Fallback>
-      </mc:AlternateContent>
-      <p:pic>
-        <p:nvPicPr>
-          <p:cNvPr id="7" name="Picture 6">
-            <a:extLst>
-              <a:ext uri="{FF2B5EF4-FFF2-40B4-BE49-F238E27FC236}">
-                <a16:creationId xmlns:a16="http://schemas.microsoft.com/office/drawing/2014/main" id="{C8DEFF1D-B58C-47A2-B5F6-61244DE67FC8}"/>
-              </a:ext>
-            </a:extLst>
-          </p:cNvPr>
-          <p:cNvPicPr/>
-          <p:nvPr/>
-        </p:nvPicPr>
-        <p:blipFill>
-          <a:blip r:embed="rId3"/>
-          <a:stretch>
-            <a:fillRect/>
-          </a:stretch>
-        </p:blipFill>
-        <p:spPr>
-          <a:xfrm>
-            <a:off x="3634248" y="3030263"/>
-            <a:ext cx="1488358" cy="1474012"/>
-          </a:xfrm>
-          <a:prstGeom prst="rect">
-            <a:avLst/>
-          </a:prstGeom>
-        </p:spPr>
-      </p:pic>
-      <mc:AlternateContent xmlns:mc="http://schemas.openxmlformats.org/markup-compatibility/2006" xmlns:a14="http://schemas.microsoft.com/office/drawing/2010/main">
-        <mc:Choice Requires="a14">
-          <p:sp>
-            <p:nvSpPr>
-              <p:cNvPr id="3" name="TextBox 2">
-                <a:extLst>
-                  <a:ext uri="{FF2B5EF4-FFF2-40B4-BE49-F238E27FC236}">
-                    <a16:creationId xmlns:a16="http://schemas.microsoft.com/office/drawing/2014/main" id="{7C862544-5F38-488A-A13B-C5EA3E19F210}"/>
-                  </a:ext>
-                </a:extLst>
-              </p:cNvPr>
-              <p:cNvSpPr txBox="1"/>
-              <p:nvPr/>
-            </p:nvSpPr>
-            <p:spPr>
-              <a:xfrm>
-                <a:off x="1779639" y="5315909"/>
-                <a:ext cx="2989006" cy="1314912"/>
-              </a:xfrm>
-              <a:prstGeom prst="rect">
-                <a:avLst/>
-              </a:prstGeom>
-              <a:noFill/>
-            </p:spPr>
-            <p:txBody>
-              <a:bodyPr wrap="square" rtlCol="0">
-                <a:spAutoFit/>
-              </a:bodyPr>
-              <a:lstStyle/>
-              <a:p>
-                <a:pPr/>
-                <a14:m>
-                  <m:oMathPara xmlns:m="http://schemas.openxmlformats.org/officeDocument/2006/math">
-                    <m:oMathParaPr>
-                      <m:jc m:val="centerGroup"/>
-                    </m:oMathParaPr>
-                    <m:oMath xmlns:m="http://schemas.openxmlformats.org/officeDocument/2006/math">
-                      <m:r>
-                        <a:rPr lang="en-CA" sz="2400" b="0" i="1" smtClean="0">
-                          <a:latin typeface="Cambria Math" panose="02040503050406030204" pitchFamily="18" charset="0"/>
-                        </a:rPr>
-                        <m:t>𝑝</m:t>
-                      </m:r>
-                      <m:r>
-                        <a:rPr lang="en-CA" sz="2400" b="0" i="1" smtClean="0">
-                          <a:latin typeface="Cambria Math" panose="02040503050406030204" pitchFamily="18" charset="0"/>
-                        </a:rPr>
-                        <m:t>=</m:t>
-                      </m:r>
-                      <m:d>
-                        <m:dPr>
-                          <m:begChr m:val="["/>
-                          <m:endChr m:val="]"/>
-                          <m:ctrlPr>
-                            <a:rPr lang="en-CA" sz="2400" b="0" i="1" smtClean="0">
-                              <a:latin typeface="Cambria Math" panose="02040503050406030204" pitchFamily="18" charset="0"/>
-                            </a:rPr>
-                          </m:ctrlPr>
-                        </m:dPr>
-                        <m:e>
-                          <m:m>
-                            <m:mPr>
-                              <m:mcs>
-                                <m:mc>
-                                  <m:mcPr>
-                                    <m:count m:val="1"/>
-                                    <m:mcJc m:val="center"/>
-                                  </m:mcPr>
-                                </m:mc>
-                              </m:mcs>
-                              <m:ctrlPr>
-                                <a:rPr lang="en-CA" sz="2400" i="1" smtClean="0">
-                                  <a:latin typeface="Cambria Math" panose="02040503050406030204" pitchFamily="18" charset="0"/>
-                                </a:rPr>
-                              </m:ctrlPr>
-                            </m:mPr>
-                            <m:mr>
-                              <m:e>
-                                <m:r>
-                                  <m:rPr>
-                                    <m:brk m:alnAt="7"/>
-                                  </m:rPr>
-                                  <a:rPr lang="en-CA" sz="2400" b="0" i="1" smtClean="0">
-                                    <a:latin typeface="Cambria Math" panose="02040503050406030204" pitchFamily="18" charset="0"/>
-                                  </a:rPr>
-                                  <m:t>𝑥</m:t>
-                                </m:r>
-                              </m:e>
-                            </m:mr>
-                            <m:mr>
-                              <m:e>
-                                <m:r>
-                                  <a:rPr lang="en-CA" sz="2400" b="0" i="1" smtClean="0">
-                                    <a:latin typeface="Cambria Math" panose="02040503050406030204" pitchFamily="18" charset="0"/>
-                                  </a:rPr>
-                                  <m:t>𝑦</m:t>
-                                </m:r>
-                              </m:e>
-                            </m:mr>
-                            <m:mr>
-                              <m:e>
-                                <m:m>
-                                  <m:mPr>
-                                    <m:mcs>
-                                      <m:mc>
-                                        <m:mcPr>
-                                          <m:count m:val="1"/>
-                                          <m:mcJc m:val="center"/>
-                                        </m:mcPr>
-                                      </m:mc>
-                                    </m:mcs>
-                                    <m:ctrlPr>
-                                      <a:rPr lang="en-CA" sz="2400" i="1" smtClean="0">
-                                        <a:latin typeface="Cambria Math" panose="02040503050406030204" pitchFamily="18" charset="0"/>
-                                      </a:rPr>
-                                    </m:ctrlPr>
-                                  </m:mPr>
-                                  <m:mr>
-                                    <m:e>
-                                      <m:r>
-                                        <m:rPr>
-                                          <m:brk m:alnAt="7"/>
-                                        </m:rPr>
-                                        <a:rPr lang="en-CA" sz="2400" b="0" i="1" smtClean="0">
-                                          <a:latin typeface="Cambria Math" panose="02040503050406030204" pitchFamily="18" charset="0"/>
-                                        </a:rPr>
-                                        <m:t>𝑧</m:t>
-                                      </m:r>
-                                    </m:e>
-                                  </m:mr>
-                                  <m:mr>
-                                    <m:e>
-                                      <m:r>
-                                        <a:rPr lang="en-CA" sz="2400" b="0" i="1" smtClean="0">
-                                          <a:latin typeface="Cambria Math" panose="02040503050406030204" pitchFamily="18" charset="0"/>
-                                        </a:rPr>
-                                        <m:t>1</m:t>
-                                      </m:r>
-                                    </m:e>
-                                  </m:mr>
-                                </m:m>
-                              </m:e>
-                            </m:mr>
-                          </m:m>
-                        </m:e>
-                      </m:d>
-                      <m:r>
-                        <a:rPr lang="en-CA" sz="2400" b="0" i="1" smtClean="0">
-                          <a:latin typeface="Cambria Math" panose="02040503050406030204" pitchFamily="18" charset="0"/>
-                        </a:rPr>
-                        <m:t>→</m:t>
-                      </m:r>
-                      <m:acc>
-                        <m:accPr>
-                          <m:chr m:val="̃"/>
-                          <m:ctrlPr>
-                            <a:rPr lang="en-CA" sz="2400" b="0" i="1" smtClean="0">
-                              <a:latin typeface="Cambria Math" panose="02040503050406030204" pitchFamily="18" charset="0"/>
-                            </a:rPr>
-                          </m:ctrlPr>
-                        </m:accPr>
-                        <m:e>
-                          <m:r>
-                            <a:rPr lang="en-CA" sz="2400" b="0" i="1" smtClean="0">
-                              <a:latin typeface="Cambria Math" panose="02040503050406030204" pitchFamily="18" charset="0"/>
-                            </a:rPr>
-                            <m:t>𝑝</m:t>
-                          </m:r>
-                        </m:e>
-                      </m:acc>
-                      <m:r>
-                        <a:rPr lang="en-CA" sz="2400" b="0" i="1" smtClean="0">
-                          <a:latin typeface="Cambria Math" panose="02040503050406030204" pitchFamily="18" charset="0"/>
-                        </a:rPr>
-                        <m:t>=</m:t>
-                      </m:r>
-                      <m:d>
-                        <m:dPr>
-                          <m:begChr m:val="["/>
-                          <m:endChr m:val="]"/>
-                          <m:ctrlPr>
-                            <a:rPr lang="en-CA" sz="2400" i="1">
-                              <a:latin typeface="Cambria Math" panose="02040503050406030204" pitchFamily="18" charset="0"/>
-                            </a:rPr>
-                          </m:ctrlPr>
-                        </m:dPr>
-                        <m:e>
-                          <m:m>
-                            <m:mPr>
-                              <m:mcs>
-                                <m:mc>
-                                  <m:mcPr>
-                                    <m:count m:val="1"/>
-                                    <m:mcJc m:val="center"/>
-                                  </m:mcPr>
-                                </m:mc>
-                              </m:mcs>
-                              <m:ctrlPr>
-                                <a:rPr lang="en-CA" sz="2400" i="1">
-                                  <a:latin typeface="Cambria Math" panose="02040503050406030204" pitchFamily="18" charset="0"/>
-                                </a:rPr>
-                              </m:ctrlPr>
-                            </m:mPr>
-                            <m:mr>
-                              <m:e>
-                                <m:r>
-                                  <m:rPr>
-                                    <m:brk m:alnAt="7"/>
-                                  </m:rPr>
-                                  <a:rPr lang="en-CA" sz="2400" b="0" i="1" smtClean="0">
-                                    <a:latin typeface="Cambria Math" panose="02040503050406030204" pitchFamily="18" charset="0"/>
-                                  </a:rPr>
-                                  <m:t>𝑤</m:t>
-                                </m:r>
-                                <m:r>
-                                  <a:rPr lang="en-CA" sz="2400" b="0" i="1" smtClean="0">
-                                    <a:latin typeface="Cambria Math" panose="02040503050406030204" pitchFamily="18" charset="0"/>
-                                  </a:rPr>
-                                  <m:t>𝑥</m:t>
-                                </m:r>
-                              </m:e>
-                            </m:mr>
-                            <m:mr>
-                              <m:e>
-                                <m:r>
-                                  <a:rPr lang="en-CA" sz="2400" b="0" i="1" smtClean="0">
-                                    <a:latin typeface="Cambria Math" panose="02040503050406030204" pitchFamily="18" charset="0"/>
-                                  </a:rPr>
-                                  <m:t>𝑤𝑦</m:t>
-                                </m:r>
-                              </m:e>
-                            </m:mr>
-                            <m:mr>
-                              <m:e>
-                                <m:m>
-                                  <m:mPr>
-                                    <m:mcs>
-                                      <m:mc>
-                                        <m:mcPr>
-                                          <m:count m:val="1"/>
-                                          <m:mcJc m:val="center"/>
-                                        </m:mcPr>
-                                      </m:mc>
-                                    </m:mcs>
-                                    <m:ctrlPr>
-                                      <a:rPr lang="en-CA" sz="2400" i="1">
-                                        <a:latin typeface="Cambria Math" panose="02040503050406030204" pitchFamily="18" charset="0"/>
-                                      </a:rPr>
-                                    </m:ctrlPr>
-                                  </m:mPr>
-                                  <m:mr>
-                                    <m:e>
-                                      <m:r>
-                                        <m:rPr>
-                                          <m:brk m:alnAt="7"/>
-                                        </m:rPr>
-                                        <a:rPr lang="en-CA" sz="2400" b="0" i="1" smtClean="0">
-                                          <a:latin typeface="Cambria Math" panose="02040503050406030204" pitchFamily="18" charset="0"/>
-                                        </a:rPr>
-                                        <m:t>𝑤</m:t>
-                                      </m:r>
-                                      <m:r>
-                                        <a:rPr lang="en-CA" sz="2400" b="0" i="1" smtClean="0">
-                                          <a:latin typeface="Cambria Math" panose="02040503050406030204" pitchFamily="18" charset="0"/>
-                                        </a:rPr>
-                                        <m:t>𝑧</m:t>
-                                      </m:r>
-                                    </m:e>
-                                  </m:mr>
-                                  <m:mr>
-                                    <m:e>
-                                      <m:r>
-                                        <a:rPr lang="en-CA" sz="2400" b="0" i="1" smtClean="0">
-                                          <a:latin typeface="Cambria Math" panose="02040503050406030204" pitchFamily="18" charset="0"/>
-                                        </a:rPr>
-                                        <m:t>𝑤</m:t>
-                                      </m:r>
-                                    </m:e>
-                                  </m:mr>
-                                </m:m>
-                              </m:e>
-                            </m:mr>
-                          </m:m>
-                        </m:e>
-                      </m:d>
-                    </m:oMath>
-                  </m:oMathPara>
-                </a14:m>
-                <a:endParaRPr lang="en-CA" sz="2400" dirty="0"/>
-              </a:p>
-            </p:txBody>
-          </p:sp>
-        </mc:Choice>
-        <mc:Fallback xmlns="">
-          <p:sp>
-            <p:nvSpPr>
-              <p:cNvPr id="3" name="TextBox 2">
-                <a:extLst>
-                  <a:ext uri="{FF2B5EF4-FFF2-40B4-BE49-F238E27FC236}">
-                    <a16:creationId xmlns:a16="http://schemas.microsoft.com/office/drawing/2014/main" id="{7C862544-5F38-488A-A13B-C5EA3E19F210}"/>
-                  </a:ext>
-                </a:extLst>
-              </p:cNvPr>
-              <p:cNvSpPr txBox="1">
-                <a:spLocks noRot="1" noChangeAspect="1" noMove="1" noResize="1" noEditPoints="1" noAdjustHandles="1" noChangeArrowheads="1" noChangeShapeType="1" noTextEdit="1"/>
-              </p:cNvSpPr>
-              <p:nvPr/>
-            </p:nvSpPr>
-            <p:spPr>
-              <a:xfrm>
-                <a:off x="1779639" y="5315909"/>
-                <a:ext cx="2989006" cy="1314912"/>
-              </a:xfrm>
-              <a:prstGeom prst="rect">
-                <a:avLst/>
-              </a:prstGeom>
-              <a:blipFill>
-                <a:blip r:embed="rId4"/>
-                <a:stretch>
-                  <a:fillRect/>
-                </a:stretch>
-              </a:blipFill>
-            </p:spPr>
-            <p:txBody>
-              <a:bodyPr/>
-              <a:lstStyle/>
-              <a:p>
-                <a:r>
-                  <a:rPr lang="en-CA">
-                    <a:noFill/>
-                  </a:rPr>
-                  <a:t> </a:t>
-                </a:r>
-              </a:p>
-            </p:txBody>
-          </p:sp>
-        </mc:Fallback>
-      </mc:AlternateContent>
-      <mc:AlternateContent xmlns:mc="http://schemas.openxmlformats.org/markup-compatibility/2006" xmlns:a14="http://schemas.microsoft.com/office/drawing/2010/main">
-        <mc:Choice Requires="a14">
-          <p:sp>
-            <p:nvSpPr>
-              <p:cNvPr id="9" name="TextBox 8">
-                <a:extLst>
-                  <a:ext uri="{FF2B5EF4-FFF2-40B4-BE49-F238E27FC236}">
-                    <a16:creationId xmlns:a16="http://schemas.microsoft.com/office/drawing/2014/main" id="{1F79E1D9-E84B-4DDF-8681-4E88A8194AAA}"/>
-                  </a:ext>
-                </a:extLst>
-              </p:cNvPr>
-              <p:cNvSpPr txBox="1"/>
-              <p:nvPr/>
-            </p:nvSpPr>
-            <p:spPr>
-              <a:xfrm>
-                <a:off x="4803691" y="5636150"/>
-                <a:ext cx="2251587" cy="784767"/>
-              </a:xfrm>
-              <a:prstGeom prst="rect">
-                <a:avLst/>
-              </a:prstGeom>
-              <a:noFill/>
-            </p:spPr>
-            <p:txBody>
-              <a:bodyPr wrap="square" rtlCol="0">
-                <a:spAutoFit/>
-              </a:bodyPr>
-              <a:lstStyle/>
-              <a:p>
-                <a:pPr/>
-                <a14:m>
-                  <m:oMathPara xmlns:m="http://schemas.openxmlformats.org/officeDocument/2006/math">
-                    <m:oMathParaPr>
-                      <m:jc m:val="centerGroup"/>
-                    </m:oMathParaPr>
-                    <m:oMath xmlns:m="http://schemas.openxmlformats.org/officeDocument/2006/math">
-                      <m:r>
-                        <a:rPr lang="en-CA" sz="2400" b="0" i="1" smtClean="0">
-                          <a:latin typeface="Cambria Math" panose="02040503050406030204" pitchFamily="18" charset="0"/>
-                        </a:rPr>
-                        <m:t>𝑝</m:t>
-                      </m:r>
-                      <m:r>
-                        <a:rPr lang="en-CA" sz="2400" b="0" i="1" smtClean="0">
-                          <a:latin typeface="Cambria Math" panose="02040503050406030204" pitchFamily="18" charset="0"/>
-                        </a:rPr>
-                        <m:t>=</m:t>
-                      </m:r>
-                      <m:acc>
-                        <m:accPr>
-                          <m:chr m:val="̃"/>
-                          <m:ctrlPr>
-                            <a:rPr lang="en-CA" sz="2400" b="0" i="1" smtClean="0">
-                              <a:latin typeface="Cambria Math" panose="02040503050406030204" pitchFamily="18" charset="0"/>
-                            </a:rPr>
-                          </m:ctrlPr>
-                        </m:accPr>
-                        <m:e>
-                          <m:f>
-                            <m:fPr>
-                              <m:ctrlPr>
-                                <a:rPr lang="en-CA" sz="2400" b="0" i="1" smtClean="0">
-                                  <a:latin typeface="Cambria Math" panose="02040503050406030204" pitchFamily="18" charset="0"/>
-                                </a:rPr>
-                              </m:ctrlPr>
-                            </m:fPr>
-                            <m:num>
-                              <m:r>
-                                <a:rPr lang="en-CA" sz="2400" b="0" i="1" smtClean="0">
-                                  <a:latin typeface="Cambria Math" panose="02040503050406030204" pitchFamily="18" charset="0"/>
-                                </a:rPr>
-                                <m:t>𝑝</m:t>
-                              </m:r>
-                            </m:num>
-                            <m:den>
-                              <m:r>
-                                <a:rPr lang="en-CA" sz="2400" b="0" i="1" smtClean="0">
-                                  <a:latin typeface="Cambria Math" panose="02040503050406030204" pitchFamily="18" charset="0"/>
-                                </a:rPr>
-                                <m:t>𝑤</m:t>
-                              </m:r>
-                            </m:den>
-                          </m:f>
-                        </m:e>
-                      </m:acc>
-                    </m:oMath>
-                  </m:oMathPara>
-                </a14:m>
-                <a:endParaRPr lang="en-CA" sz="2400" dirty="0"/>
-              </a:p>
-            </p:txBody>
-          </p:sp>
-        </mc:Choice>
-        <mc:Fallback xmlns="">
-          <p:sp>
-            <p:nvSpPr>
-              <p:cNvPr id="9" name="TextBox 8">
-                <a:extLst>
-                  <a:ext uri="{FF2B5EF4-FFF2-40B4-BE49-F238E27FC236}">
-                    <a16:creationId xmlns:a16="http://schemas.microsoft.com/office/drawing/2014/main" id="{1F79E1D9-E84B-4DDF-8681-4E88A8194AAA}"/>
-                  </a:ext>
-                </a:extLst>
-              </p:cNvPr>
-              <p:cNvSpPr txBox="1">
-                <a:spLocks noRot="1" noChangeAspect="1" noMove="1" noResize="1" noEditPoints="1" noAdjustHandles="1" noChangeArrowheads="1" noChangeShapeType="1" noTextEdit="1"/>
-              </p:cNvSpPr>
-              <p:nvPr/>
-            </p:nvSpPr>
-            <p:spPr>
-              <a:xfrm>
-                <a:off x="4803691" y="5636150"/>
-                <a:ext cx="2251587" cy="784767"/>
-              </a:xfrm>
-              <a:prstGeom prst="rect">
-                <a:avLst/>
-              </a:prstGeom>
-              <a:blipFill>
-                <a:blip r:embed="rId5"/>
-                <a:stretch>
-                  <a:fillRect/>
-                </a:stretch>
-              </a:blipFill>
-            </p:spPr>
-            <p:txBody>
-              <a:bodyPr/>
-              <a:lstStyle/>
-              <a:p>
-                <a:r>
-                  <a:rPr lang="en-CA">
-                    <a:noFill/>
-                  </a:rPr>
-                  <a:t> </a:t>
-                </a:r>
-              </a:p>
-            </p:txBody>
-          </p:sp>
-        </mc:Fallback>
-      </mc:AlternateContent>
-    </p:spTree>
-    <p:extLst>
-      <p:ext uri="{BB962C8B-B14F-4D97-AF65-F5344CB8AC3E}">
-        <p14:creationId xmlns:p14="http://schemas.microsoft.com/office/powerpoint/2010/main" val="2988499868"/>
       </p:ext>
     </p:extLst>
   </p:cSld>

</xml_diff>